<commit_message>
Start and Lengeds Scene edit
</commit_message>
<xml_diff>
--- a/Projects/SW_Design/UI/UI_design.pptx
+++ b/Projects/SW_Design/UI/UI_design.pptx
@@ -12,8 +12,9 @@
     <p:sldId id="260" r:id="rId6"/>
     <p:sldId id="261" r:id="rId7"/>
     <p:sldId id="262" r:id="rId8"/>
-    <p:sldId id="263" r:id="rId9"/>
-    <p:sldId id="264" r:id="rId10"/>
+    <p:sldId id="265" r:id="rId9"/>
+    <p:sldId id="263" r:id="rId10"/>
+    <p:sldId id="264" r:id="rId11"/>
   </p:sldIdLst>
   <p:sldSz cx="12192000" cy="6858000"/>
   <p:notesSz cx="6858000" cy="9144000"/>
@@ -112,6 +113,11 @@
       </a:defRPr>
     </a:lvl9pPr>
   </p:defaultTextStyle>
+  <p:extLst>
+    <p:ext uri="{EFAFB233-063F-42B5-8137-9DF3F51BA10A}">
+      <p15:sldGuideLst xmlns:p15="http://schemas.microsoft.com/office/powerpoint/2012/main"/>
+    </p:ext>
+  </p:extLst>
 </p:presentation>
 </file>
 
@@ -262,7 +268,7 @@
           <a:p>
             <a:fld id="{EB44E886-23E1-4ADA-9C75-D80585AEE320}" type="datetimeFigureOut">
               <a:rPr lang="ko-KR" altLang="en-US" smtClean="0"/>
-              <a:t>2019-11-11</a:t>
+              <a:t>2019-11-12</a:t>
             </a:fld>
             <a:endParaRPr lang="ko-KR" altLang="en-US"/>
           </a:p>
@@ -460,7 +466,7 @@
           <a:p>
             <a:fld id="{EB44E886-23E1-4ADA-9C75-D80585AEE320}" type="datetimeFigureOut">
               <a:rPr lang="ko-KR" altLang="en-US" smtClean="0"/>
-              <a:t>2019-11-11</a:t>
+              <a:t>2019-11-12</a:t>
             </a:fld>
             <a:endParaRPr lang="ko-KR" altLang="en-US"/>
           </a:p>
@@ -668,7 +674,7 @@
           <a:p>
             <a:fld id="{EB44E886-23E1-4ADA-9C75-D80585AEE320}" type="datetimeFigureOut">
               <a:rPr lang="ko-KR" altLang="en-US" smtClean="0"/>
-              <a:t>2019-11-11</a:t>
+              <a:t>2019-11-12</a:t>
             </a:fld>
             <a:endParaRPr lang="ko-KR" altLang="en-US"/>
           </a:p>
@@ -866,7 +872,7 @@
           <a:p>
             <a:fld id="{EB44E886-23E1-4ADA-9C75-D80585AEE320}" type="datetimeFigureOut">
               <a:rPr lang="ko-KR" altLang="en-US" smtClean="0"/>
-              <a:t>2019-11-11</a:t>
+              <a:t>2019-11-12</a:t>
             </a:fld>
             <a:endParaRPr lang="ko-KR" altLang="en-US"/>
           </a:p>
@@ -1141,7 +1147,7 @@
           <a:p>
             <a:fld id="{EB44E886-23E1-4ADA-9C75-D80585AEE320}" type="datetimeFigureOut">
               <a:rPr lang="ko-KR" altLang="en-US" smtClean="0"/>
-              <a:t>2019-11-11</a:t>
+              <a:t>2019-11-12</a:t>
             </a:fld>
             <a:endParaRPr lang="ko-KR" altLang="en-US"/>
           </a:p>
@@ -1406,7 +1412,7 @@
           <a:p>
             <a:fld id="{EB44E886-23E1-4ADA-9C75-D80585AEE320}" type="datetimeFigureOut">
               <a:rPr lang="ko-KR" altLang="en-US" smtClean="0"/>
-              <a:t>2019-11-11</a:t>
+              <a:t>2019-11-12</a:t>
             </a:fld>
             <a:endParaRPr lang="ko-KR" altLang="en-US"/>
           </a:p>
@@ -1818,7 +1824,7 @@
           <a:p>
             <a:fld id="{EB44E886-23E1-4ADA-9C75-D80585AEE320}" type="datetimeFigureOut">
               <a:rPr lang="ko-KR" altLang="en-US" smtClean="0"/>
-              <a:t>2019-11-11</a:t>
+              <a:t>2019-11-12</a:t>
             </a:fld>
             <a:endParaRPr lang="ko-KR" altLang="en-US"/>
           </a:p>
@@ -1959,7 +1965,7 @@
           <a:p>
             <a:fld id="{EB44E886-23E1-4ADA-9C75-D80585AEE320}" type="datetimeFigureOut">
               <a:rPr lang="ko-KR" altLang="en-US" smtClean="0"/>
-              <a:t>2019-11-11</a:t>
+              <a:t>2019-11-12</a:t>
             </a:fld>
             <a:endParaRPr lang="ko-KR" altLang="en-US"/>
           </a:p>
@@ -2072,7 +2078,7 @@
           <a:p>
             <a:fld id="{EB44E886-23E1-4ADA-9C75-D80585AEE320}" type="datetimeFigureOut">
               <a:rPr lang="ko-KR" altLang="en-US" smtClean="0"/>
-              <a:t>2019-11-11</a:t>
+              <a:t>2019-11-12</a:t>
             </a:fld>
             <a:endParaRPr lang="ko-KR" altLang="en-US"/>
           </a:p>
@@ -2383,7 +2389,7 @@
           <a:p>
             <a:fld id="{EB44E886-23E1-4ADA-9C75-D80585AEE320}" type="datetimeFigureOut">
               <a:rPr lang="ko-KR" altLang="en-US" smtClean="0"/>
-              <a:t>2019-11-11</a:t>
+              <a:t>2019-11-12</a:t>
             </a:fld>
             <a:endParaRPr lang="ko-KR" altLang="en-US"/>
           </a:p>
@@ -2671,7 +2677,7 @@
           <a:p>
             <a:fld id="{EB44E886-23E1-4ADA-9C75-D80585AEE320}" type="datetimeFigureOut">
               <a:rPr lang="ko-KR" altLang="en-US" smtClean="0"/>
-              <a:t>2019-11-11</a:t>
+              <a:t>2019-11-12</a:t>
             </a:fld>
             <a:endParaRPr lang="ko-KR" altLang="en-US"/>
           </a:p>
@@ -2912,7 +2918,7 @@
           <a:p>
             <a:fld id="{EB44E886-23E1-4ADA-9C75-D80585AEE320}" type="datetimeFigureOut">
               <a:rPr lang="ko-KR" altLang="en-US" smtClean="0"/>
-              <a:t>2019-11-11</a:t>
+              <a:t>2019-11-12</a:t>
             </a:fld>
             <a:endParaRPr lang="ko-KR" altLang="en-US"/>
           </a:p>
@@ -3472,6 +3478,818 @@
 </p:sld>
 </file>
 
+<file path=ppt/slides/slide10.xml><?xml version="1.0" encoding="utf-8"?>
+<p:sld xmlns:a="http://schemas.openxmlformats.org/drawingml/2006/main" xmlns:r="http://schemas.openxmlformats.org/officeDocument/2006/relationships" xmlns:p="http://schemas.openxmlformats.org/presentationml/2006/main">
+  <p:cSld>
+    <p:spTree>
+      <p:nvGrpSpPr>
+        <p:cNvPr id="1" name=""/>
+        <p:cNvGrpSpPr/>
+        <p:nvPr/>
+      </p:nvGrpSpPr>
+      <p:grpSpPr>
+        <a:xfrm>
+          <a:off x="0" y="0"/>
+          <a:ext cx="0" cy="0"/>
+          <a:chOff x="0" y="0"/>
+          <a:chExt cx="0" cy="0"/>
+        </a:xfrm>
+      </p:grpSpPr>
+      <p:sp>
+        <p:nvSpPr>
+          <p:cNvPr id="10" name="직사각형 9">
+            <a:extLst>
+              <a:ext uri="{FF2B5EF4-FFF2-40B4-BE49-F238E27FC236}">
+                <a16:creationId xmlns:a16="http://schemas.microsoft.com/office/drawing/2014/main" id="{242180D3-26D3-4B23-9A8C-AC150521A362}"/>
+              </a:ext>
+            </a:extLst>
+          </p:cNvPr>
+          <p:cNvSpPr/>
+          <p:nvPr/>
+        </p:nvSpPr>
+        <p:spPr>
+          <a:xfrm>
+            <a:off x="487680" y="1143000"/>
+            <a:ext cx="9509760" cy="5455920"/>
+          </a:xfrm>
+          <a:prstGeom prst="rect">
+            <a:avLst/>
+          </a:prstGeom>
+        </p:spPr>
+        <p:style>
+          <a:lnRef idx="2">
+            <a:schemeClr val="accent1">
+              <a:shade val="50000"/>
+            </a:schemeClr>
+          </a:lnRef>
+          <a:fillRef idx="1">
+            <a:schemeClr val="accent1"/>
+          </a:fillRef>
+          <a:effectRef idx="0">
+            <a:schemeClr val="accent1"/>
+          </a:effectRef>
+          <a:fontRef idx="minor">
+            <a:schemeClr val="lt1"/>
+          </a:fontRef>
+        </p:style>
+        <p:txBody>
+          <a:bodyPr rtlCol="0" anchor="ctr"/>
+          <a:lstStyle/>
+          <a:p>
+            <a:pPr algn="ctr"/>
+            <a:endParaRPr lang="ko-KR" altLang="en-US"/>
+          </a:p>
+        </p:txBody>
+      </p:sp>
+      <p:sp>
+        <p:nvSpPr>
+          <p:cNvPr id="5" name="TextBox 4">
+            <a:extLst>
+              <a:ext uri="{FF2B5EF4-FFF2-40B4-BE49-F238E27FC236}">
+                <a16:creationId xmlns:a16="http://schemas.microsoft.com/office/drawing/2014/main" id="{1B295513-7EB2-44FC-9CDF-30F2EAF94BC2}"/>
+              </a:ext>
+            </a:extLst>
+          </p:cNvPr>
+          <p:cNvSpPr txBox="1"/>
+          <p:nvPr/>
+        </p:nvSpPr>
+        <p:spPr>
+          <a:xfrm>
+            <a:off x="2194560" y="2506980"/>
+            <a:ext cx="928459" cy="461665"/>
+          </a:xfrm>
+          <a:prstGeom prst="rect">
+            <a:avLst/>
+          </a:prstGeom>
+          <a:noFill/>
+        </p:spPr>
+        <p:txBody>
+          <a:bodyPr wrap="none" rtlCol="0">
+            <a:spAutoFit/>
+          </a:bodyPr>
+          <a:lstStyle/>
+          <a:p>
+            <a:r>
+              <a:rPr lang="en-US" altLang="ko-KR" sz="2400" dirty="0">
+                <a:latin typeface="Aharoni" panose="02010803020104030203" pitchFamily="2" charset="-79"/>
+                <a:cs typeface="Aharoni" panose="02010803020104030203" pitchFamily="2" charset="-79"/>
+              </a:rPr>
+              <a:t>PLAY</a:t>
+            </a:r>
+            <a:endParaRPr lang="ko-KR" altLang="en-US" sz="2400" dirty="0">
+              <a:latin typeface="Aharoni" panose="02010803020104030203" pitchFamily="2" charset="-79"/>
+              <a:cs typeface="Aharoni" panose="02010803020104030203" pitchFamily="2" charset="-79"/>
+            </a:endParaRPr>
+          </a:p>
+        </p:txBody>
+      </p:sp>
+      <p:sp>
+        <p:nvSpPr>
+          <p:cNvPr id="7" name="TextBox 6">
+            <a:extLst>
+              <a:ext uri="{FF2B5EF4-FFF2-40B4-BE49-F238E27FC236}">
+                <a16:creationId xmlns:a16="http://schemas.microsoft.com/office/drawing/2014/main" id="{089E75B9-6D37-47B3-802A-FDF2C89F5F9E}"/>
+              </a:ext>
+            </a:extLst>
+          </p:cNvPr>
+          <p:cNvSpPr txBox="1"/>
+          <p:nvPr/>
+        </p:nvSpPr>
+        <p:spPr>
+          <a:xfrm>
+            <a:off x="3712419" y="2484118"/>
+            <a:ext cx="1048685" cy="400110"/>
+          </a:xfrm>
+          <a:prstGeom prst="rect">
+            <a:avLst/>
+          </a:prstGeom>
+          <a:noFill/>
+        </p:spPr>
+        <p:txBody>
+          <a:bodyPr wrap="none" rtlCol="0">
+            <a:spAutoFit/>
+          </a:bodyPr>
+          <a:lstStyle/>
+          <a:p>
+            <a:r>
+              <a:rPr lang="en-US" altLang="ko-KR" sz="2000" dirty="0">
+                <a:latin typeface="Impact" panose="020B0806030902050204" pitchFamily="34" charset="0"/>
+                <a:cs typeface="Aharoni" panose="02010803020104030203" pitchFamily="2" charset="-79"/>
+              </a:rPr>
+              <a:t>LEGENDS</a:t>
+            </a:r>
+            <a:endParaRPr lang="ko-KR" altLang="en-US" sz="2000" dirty="0">
+              <a:latin typeface="Impact" panose="020B0806030902050204" pitchFamily="34" charset="0"/>
+              <a:cs typeface="Aharoni" panose="02010803020104030203" pitchFamily="2" charset="-79"/>
+            </a:endParaRPr>
+          </a:p>
+        </p:txBody>
+      </p:sp>
+      <p:sp>
+        <p:nvSpPr>
+          <p:cNvPr id="8" name="TextBox 7">
+            <a:extLst>
+              <a:ext uri="{FF2B5EF4-FFF2-40B4-BE49-F238E27FC236}">
+                <a16:creationId xmlns:a16="http://schemas.microsoft.com/office/drawing/2014/main" id="{235E8297-2768-4BE9-9E2F-7DC505131776}"/>
+              </a:ext>
+            </a:extLst>
+          </p:cNvPr>
+          <p:cNvSpPr txBox="1"/>
+          <p:nvPr/>
+        </p:nvSpPr>
+        <p:spPr>
+          <a:xfrm>
+            <a:off x="5270133" y="2484118"/>
+            <a:ext cx="889987" cy="369332"/>
+          </a:xfrm>
+          <a:prstGeom prst="rect">
+            <a:avLst/>
+          </a:prstGeom>
+          <a:noFill/>
+        </p:spPr>
+        <p:txBody>
+          <a:bodyPr wrap="none" rtlCol="0">
+            <a:spAutoFit/>
+          </a:bodyPr>
+          <a:lstStyle/>
+          <a:p>
+            <a:r>
+              <a:rPr lang="en-US" altLang="ko-KR" dirty="0">
+                <a:latin typeface="Algerian" panose="020B0604020202020204" pitchFamily="82" charset="0"/>
+              </a:rPr>
+              <a:t>ITEMS</a:t>
+            </a:r>
+            <a:endParaRPr lang="ko-KR" altLang="en-US" dirty="0">
+              <a:latin typeface="Algerian" panose="020B0604020202020204" pitchFamily="82" charset="0"/>
+            </a:endParaRPr>
+          </a:p>
+        </p:txBody>
+      </p:sp>
+      <p:sp>
+        <p:nvSpPr>
+          <p:cNvPr id="9" name="TextBox 8">
+            <a:extLst>
+              <a:ext uri="{FF2B5EF4-FFF2-40B4-BE49-F238E27FC236}">
+                <a16:creationId xmlns:a16="http://schemas.microsoft.com/office/drawing/2014/main" id="{63063001-30E0-415C-8D89-F56C97A5333F}"/>
+              </a:ext>
+            </a:extLst>
+          </p:cNvPr>
+          <p:cNvSpPr txBox="1"/>
+          <p:nvPr/>
+        </p:nvSpPr>
+        <p:spPr>
+          <a:xfrm>
+            <a:off x="6749520" y="2484118"/>
+            <a:ext cx="975588" cy="369332"/>
+          </a:xfrm>
+          <a:prstGeom prst="rect">
+            <a:avLst/>
+          </a:prstGeom>
+          <a:noFill/>
+        </p:spPr>
+        <p:txBody>
+          <a:bodyPr wrap="none" rtlCol="0">
+            <a:spAutoFit/>
+          </a:bodyPr>
+          <a:lstStyle/>
+          <a:p>
+            <a:r>
+              <a:rPr lang="en-US" altLang="ko-KR" dirty="0">
+                <a:latin typeface="Cooper Black" panose="020B0604020202020204" pitchFamily="18" charset="0"/>
+              </a:rPr>
+              <a:t>STORE</a:t>
+            </a:r>
+            <a:endParaRPr lang="ko-KR" altLang="en-US" dirty="0">
+              <a:latin typeface="Cooper Black" panose="020B0604020202020204" pitchFamily="18" charset="0"/>
+            </a:endParaRPr>
+          </a:p>
+        </p:txBody>
+      </p:sp>
+      <p:sp>
+        <p:nvSpPr>
+          <p:cNvPr id="11" name="TextBox 10">
+            <a:extLst>
+              <a:ext uri="{FF2B5EF4-FFF2-40B4-BE49-F238E27FC236}">
+                <a16:creationId xmlns:a16="http://schemas.microsoft.com/office/drawing/2014/main" id="{AC23B053-198D-49D2-945C-98E50902D98E}"/>
+              </a:ext>
+            </a:extLst>
+          </p:cNvPr>
+          <p:cNvSpPr txBox="1"/>
+          <p:nvPr/>
+        </p:nvSpPr>
+        <p:spPr>
+          <a:xfrm>
+            <a:off x="2310007" y="3198167"/>
+            <a:ext cx="697563" cy="400110"/>
+          </a:xfrm>
+          <a:prstGeom prst="rect">
+            <a:avLst/>
+          </a:prstGeom>
+          <a:noFill/>
+        </p:spPr>
+        <p:txBody>
+          <a:bodyPr wrap="none" rtlCol="0">
+            <a:spAutoFit/>
+          </a:bodyPr>
+          <a:lstStyle/>
+          <a:p>
+            <a:r>
+              <a:rPr lang="en-US" altLang="ko-KR" sz="2000" b="1" dirty="0">
+                <a:solidFill>
+                  <a:schemeClr val="bg1">
+                    <a:lumMod val="85000"/>
+                  </a:schemeClr>
+                </a:solidFill>
+                <a:latin typeface="Calibri" panose="020F0502020204030204" pitchFamily="34" charset="0"/>
+                <a:cs typeface="Calibri" panose="020F0502020204030204" pitchFamily="34" charset="0"/>
+              </a:rPr>
+              <a:t>PLAY</a:t>
+            </a:r>
+            <a:endParaRPr lang="ko-KR" altLang="en-US" sz="2000" b="1" dirty="0">
+              <a:solidFill>
+                <a:schemeClr val="bg1">
+                  <a:lumMod val="85000"/>
+                </a:schemeClr>
+              </a:solidFill>
+              <a:latin typeface="Calibri" panose="020F0502020204030204" pitchFamily="34" charset="0"/>
+              <a:cs typeface="Calibri" panose="020F0502020204030204" pitchFamily="34" charset="0"/>
+            </a:endParaRPr>
+          </a:p>
+        </p:txBody>
+      </p:sp>
+      <p:sp>
+        <p:nvSpPr>
+          <p:cNvPr id="12" name="TextBox 11">
+            <a:extLst>
+              <a:ext uri="{FF2B5EF4-FFF2-40B4-BE49-F238E27FC236}">
+                <a16:creationId xmlns:a16="http://schemas.microsoft.com/office/drawing/2014/main" id="{E6535514-8E4C-4BFD-ADAC-1F0538529941}"/>
+              </a:ext>
+            </a:extLst>
+          </p:cNvPr>
+          <p:cNvSpPr txBox="1"/>
+          <p:nvPr/>
+        </p:nvSpPr>
+        <p:spPr>
+          <a:xfrm>
+            <a:off x="3712419" y="3198167"/>
+            <a:ext cx="1155509" cy="400110"/>
+          </a:xfrm>
+          <a:prstGeom prst="rect">
+            <a:avLst/>
+          </a:prstGeom>
+          <a:noFill/>
+        </p:spPr>
+        <p:txBody>
+          <a:bodyPr wrap="none" rtlCol="0">
+            <a:spAutoFit/>
+          </a:bodyPr>
+          <a:lstStyle/>
+          <a:p>
+            <a:r>
+              <a:rPr lang="en-US" altLang="ko-KR" sz="2000" b="1" dirty="0">
+                <a:solidFill>
+                  <a:schemeClr val="bg1">
+                    <a:lumMod val="85000"/>
+                  </a:schemeClr>
+                </a:solidFill>
+                <a:latin typeface="Calibri" panose="020F0502020204030204" pitchFamily="34" charset="0"/>
+                <a:cs typeface="Calibri" panose="020F0502020204030204" pitchFamily="34" charset="0"/>
+              </a:rPr>
+              <a:t>LEGENDS</a:t>
+            </a:r>
+            <a:endParaRPr lang="ko-KR" altLang="en-US" sz="2000" b="1" dirty="0">
+              <a:solidFill>
+                <a:schemeClr val="bg1">
+                  <a:lumMod val="85000"/>
+                </a:schemeClr>
+              </a:solidFill>
+              <a:latin typeface="Calibri" panose="020F0502020204030204" pitchFamily="34" charset="0"/>
+              <a:cs typeface="Calibri" panose="020F0502020204030204" pitchFamily="34" charset="0"/>
+            </a:endParaRPr>
+          </a:p>
+        </p:txBody>
+      </p:sp>
+      <p:sp>
+        <p:nvSpPr>
+          <p:cNvPr id="13" name="TextBox 12">
+            <a:extLst>
+              <a:ext uri="{FF2B5EF4-FFF2-40B4-BE49-F238E27FC236}">
+                <a16:creationId xmlns:a16="http://schemas.microsoft.com/office/drawing/2014/main" id="{D1730865-6F48-480F-A293-24AEAD463D15}"/>
+              </a:ext>
+            </a:extLst>
+          </p:cNvPr>
+          <p:cNvSpPr txBox="1"/>
+          <p:nvPr/>
+        </p:nvSpPr>
+        <p:spPr>
+          <a:xfrm>
+            <a:off x="5270133" y="3198167"/>
+            <a:ext cx="851515" cy="400110"/>
+          </a:xfrm>
+          <a:prstGeom prst="rect">
+            <a:avLst/>
+          </a:prstGeom>
+          <a:noFill/>
+        </p:spPr>
+        <p:txBody>
+          <a:bodyPr wrap="none" rtlCol="0">
+            <a:spAutoFit/>
+          </a:bodyPr>
+          <a:lstStyle/>
+          <a:p>
+            <a:r>
+              <a:rPr lang="en-US" altLang="ko-KR" sz="2000" b="1" dirty="0">
+                <a:solidFill>
+                  <a:schemeClr val="bg1">
+                    <a:lumMod val="85000"/>
+                  </a:schemeClr>
+                </a:solidFill>
+                <a:latin typeface="Calibri" panose="020F0502020204030204" pitchFamily="34" charset="0"/>
+                <a:cs typeface="Calibri" panose="020F0502020204030204" pitchFamily="34" charset="0"/>
+              </a:rPr>
+              <a:t>ITEMS</a:t>
+            </a:r>
+            <a:endParaRPr lang="ko-KR" altLang="en-US" b="1" dirty="0">
+              <a:solidFill>
+                <a:schemeClr val="bg1">
+                  <a:lumMod val="85000"/>
+                </a:schemeClr>
+              </a:solidFill>
+              <a:latin typeface="Calibri" panose="020F0502020204030204" pitchFamily="34" charset="0"/>
+              <a:cs typeface="Calibri" panose="020F0502020204030204" pitchFamily="34" charset="0"/>
+            </a:endParaRPr>
+          </a:p>
+        </p:txBody>
+      </p:sp>
+      <p:sp>
+        <p:nvSpPr>
+          <p:cNvPr id="14" name="TextBox 13">
+            <a:extLst>
+              <a:ext uri="{FF2B5EF4-FFF2-40B4-BE49-F238E27FC236}">
+                <a16:creationId xmlns:a16="http://schemas.microsoft.com/office/drawing/2014/main" id="{D3941BC2-E88B-4396-8986-9D856FF999D3}"/>
+              </a:ext>
+            </a:extLst>
+          </p:cNvPr>
+          <p:cNvSpPr txBox="1"/>
+          <p:nvPr/>
+        </p:nvSpPr>
+        <p:spPr>
+          <a:xfrm>
+            <a:off x="6749520" y="3188314"/>
+            <a:ext cx="866199" cy="400110"/>
+          </a:xfrm>
+          <a:prstGeom prst="rect">
+            <a:avLst/>
+          </a:prstGeom>
+          <a:noFill/>
+        </p:spPr>
+        <p:txBody>
+          <a:bodyPr wrap="none" rtlCol="0">
+            <a:spAutoFit/>
+          </a:bodyPr>
+          <a:lstStyle/>
+          <a:p>
+            <a:r>
+              <a:rPr lang="en-US" altLang="ko-KR" sz="2000" b="1" dirty="0">
+                <a:solidFill>
+                  <a:schemeClr val="bg1">
+                    <a:lumMod val="85000"/>
+                  </a:schemeClr>
+                </a:solidFill>
+                <a:latin typeface="Calibri" panose="020F0502020204030204" pitchFamily="34" charset="0"/>
+                <a:cs typeface="Calibri" panose="020F0502020204030204" pitchFamily="34" charset="0"/>
+              </a:rPr>
+              <a:t>STORE</a:t>
+            </a:r>
+            <a:endParaRPr lang="ko-KR" altLang="en-US" b="1" dirty="0">
+              <a:solidFill>
+                <a:schemeClr val="bg1">
+                  <a:lumMod val="85000"/>
+                </a:schemeClr>
+              </a:solidFill>
+              <a:latin typeface="Calibri" panose="020F0502020204030204" pitchFamily="34" charset="0"/>
+              <a:cs typeface="Calibri" panose="020F0502020204030204" pitchFamily="34" charset="0"/>
+            </a:endParaRPr>
+          </a:p>
+        </p:txBody>
+      </p:sp>
+      <p:sp>
+        <p:nvSpPr>
+          <p:cNvPr id="15" name="TextBox 14">
+            <a:extLst>
+              <a:ext uri="{FF2B5EF4-FFF2-40B4-BE49-F238E27FC236}">
+                <a16:creationId xmlns:a16="http://schemas.microsoft.com/office/drawing/2014/main" id="{D98C9B6A-888D-4F62-ACC5-210E69B867A5}"/>
+              </a:ext>
+            </a:extLst>
+          </p:cNvPr>
+          <p:cNvSpPr txBox="1"/>
+          <p:nvPr/>
+        </p:nvSpPr>
+        <p:spPr>
+          <a:xfrm>
+            <a:off x="2288623" y="4020503"/>
+            <a:ext cx="834396" cy="400110"/>
+          </a:xfrm>
+          <a:prstGeom prst="rect">
+            <a:avLst/>
+          </a:prstGeom>
+          <a:noFill/>
+        </p:spPr>
+        <p:txBody>
+          <a:bodyPr wrap="none" rtlCol="0">
+            <a:spAutoFit/>
+          </a:bodyPr>
+          <a:lstStyle/>
+          <a:p>
+            <a:r>
+              <a:rPr lang="en-US" altLang="ko-KR" sz="2000" b="1" dirty="0">
+                <a:solidFill>
+                  <a:schemeClr val="bg1">
+                    <a:lumMod val="85000"/>
+                  </a:schemeClr>
+                </a:solidFill>
+                <a:latin typeface="Calibri" panose="020F0502020204030204" pitchFamily="34" charset="0"/>
+                <a:cs typeface="Calibri" panose="020F0502020204030204" pitchFamily="34" charset="0"/>
+              </a:rPr>
+              <a:t>START</a:t>
+            </a:r>
+            <a:endParaRPr lang="ko-KR" altLang="en-US" sz="2000" b="1" dirty="0">
+              <a:solidFill>
+                <a:schemeClr val="bg1">
+                  <a:lumMod val="85000"/>
+                </a:schemeClr>
+              </a:solidFill>
+              <a:latin typeface="Calibri" panose="020F0502020204030204" pitchFamily="34" charset="0"/>
+              <a:cs typeface="Calibri" panose="020F0502020204030204" pitchFamily="34" charset="0"/>
+            </a:endParaRPr>
+          </a:p>
+        </p:txBody>
+      </p:sp>
+      <p:sp>
+        <p:nvSpPr>
+          <p:cNvPr id="17" name="TextBox 16">
+            <a:extLst>
+              <a:ext uri="{FF2B5EF4-FFF2-40B4-BE49-F238E27FC236}">
+                <a16:creationId xmlns:a16="http://schemas.microsoft.com/office/drawing/2014/main" id="{D98C9B6A-888D-4F62-ACC5-210E69B867A5}"/>
+              </a:ext>
+            </a:extLst>
+          </p:cNvPr>
+          <p:cNvSpPr txBox="1"/>
+          <p:nvPr/>
+        </p:nvSpPr>
+        <p:spPr>
+          <a:xfrm>
+            <a:off x="5119632" y="4025291"/>
+            <a:ext cx="1494768" cy="400110"/>
+          </a:xfrm>
+          <a:prstGeom prst="rect">
+            <a:avLst/>
+          </a:prstGeom>
+          <a:noFill/>
+        </p:spPr>
+        <p:txBody>
+          <a:bodyPr wrap="none" rtlCol="0">
+            <a:spAutoFit/>
+          </a:bodyPr>
+          <a:lstStyle/>
+          <a:p>
+            <a:r>
+              <a:rPr lang="en-US" altLang="ko-KR" sz="2000" b="1" dirty="0" smtClean="0">
+                <a:solidFill>
+                  <a:schemeClr val="bg1">
+                    <a:lumMod val="85000"/>
+                  </a:schemeClr>
+                </a:solidFill>
+                <a:latin typeface="Calibri" panose="020F0502020204030204" pitchFamily="34" charset="0"/>
+                <a:cs typeface="Calibri" panose="020F0502020204030204" pitchFamily="34" charset="0"/>
+              </a:rPr>
+              <a:t>DUNGEON 1</a:t>
+            </a:r>
+            <a:endParaRPr lang="ko-KR" altLang="en-US" sz="2000" b="1" dirty="0">
+              <a:solidFill>
+                <a:schemeClr val="bg1">
+                  <a:lumMod val="85000"/>
+                </a:schemeClr>
+              </a:solidFill>
+              <a:latin typeface="Calibri" panose="020F0502020204030204" pitchFamily="34" charset="0"/>
+              <a:cs typeface="Calibri" panose="020F0502020204030204" pitchFamily="34" charset="0"/>
+            </a:endParaRPr>
+          </a:p>
+        </p:txBody>
+      </p:sp>
+      <p:sp>
+        <p:nvSpPr>
+          <p:cNvPr id="18" name="TextBox 17">
+            <a:extLst>
+              <a:ext uri="{FF2B5EF4-FFF2-40B4-BE49-F238E27FC236}">
+                <a16:creationId xmlns:a16="http://schemas.microsoft.com/office/drawing/2014/main" id="{D98C9B6A-888D-4F62-ACC5-210E69B867A5}"/>
+              </a:ext>
+            </a:extLst>
+          </p:cNvPr>
+          <p:cNvSpPr txBox="1"/>
+          <p:nvPr/>
+        </p:nvSpPr>
+        <p:spPr>
+          <a:xfrm>
+            <a:off x="6772104" y="4025291"/>
+            <a:ext cx="1494768" cy="400110"/>
+          </a:xfrm>
+          <a:prstGeom prst="rect">
+            <a:avLst/>
+          </a:prstGeom>
+          <a:noFill/>
+        </p:spPr>
+        <p:txBody>
+          <a:bodyPr wrap="none" rtlCol="0">
+            <a:spAutoFit/>
+          </a:bodyPr>
+          <a:lstStyle/>
+          <a:p>
+            <a:r>
+              <a:rPr lang="en-US" altLang="ko-KR" sz="2000" b="1" dirty="0" smtClean="0">
+                <a:solidFill>
+                  <a:schemeClr val="bg1">
+                    <a:lumMod val="85000"/>
+                  </a:schemeClr>
+                </a:solidFill>
+                <a:latin typeface="Calibri" panose="020F0502020204030204" pitchFamily="34" charset="0"/>
+                <a:cs typeface="Calibri" panose="020F0502020204030204" pitchFamily="34" charset="0"/>
+              </a:rPr>
+              <a:t>DUNGEON 2</a:t>
+            </a:r>
+            <a:endParaRPr lang="ko-KR" altLang="en-US" sz="2000" b="1" dirty="0">
+              <a:solidFill>
+                <a:schemeClr val="bg1">
+                  <a:lumMod val="85000"/>
+                </a:schemeClr>
+              </a:solidFill>
+              <a:latin typeface="Calibri" panose="020F0502020204030204" pitchFamily="34" charset="0"/>
+              <a:cs typeface="Calibri" panose="020F0502020204030204" pitchFamily="34" charset="0"/>
+            </a:endParaRPr>
+          </a:p>
+        </p:txBody>
+      </p:sp>
+      <p:sp>
+        <p:nvSpPr>
+          <p:cNvPr id="19" name="TextBox 18">
+            <a:extLst>
+              <a:ext uri="{FF2B5EF4-FFF2-40B4-BE49-F238E27FC236}">
+                <a16:creationId xmlns:a16="http://schemas.microsoft.com/office/drawing/2014/main" id="{D98C9B6A-888D-4F62-ACC5-210E69B867A5}"/>
+              </a:ext>
+            </a:extLst>
+          </p:cNvPr>
+          <p:cNvSpPr txBox="1"/>
+          <p:nvPr/>
+        </p:nvSpPr>
+        <p:spPr>
+          <a:xfrm>
+            <a:off x="3546768" y="4038557"/>
+            <a:ext cx="1248612" cy="400110"/>
+          </a:xfrm>
+          <a:prstGeom prst="rect">
+            <a:avLst/>
+          </a:prstGeom>
+          <a:noFill/>
+        </p:spPr>
+        <p:txBody>
+          <a:bodyPr wrap="none" rtlCol="0">
+            <a:spAutoFit/>
+          </a:bodyPr>
+          <a:lstStyle/>
+          <a:p>
+            <a:r>
+              <a:rPr lang="en-US" altLang="ko-KR" sz="2000" b="1" dirty="0" smtClean="0">
+                <a:solidFill>
+                  <a:schemeClr val="bg1">
+                    <a:lumMod val="85000"/>
+                  </a:schemeClr>
+                </a:solidFill>
+                <a:latin typeface="Calibri" panose="020F0502020204030204" pitchFamily="34" charset="0"/>
+                <a:cs typeface="Calibri" panose="020F0502020204030204" pitchFamily="34" charset="0"/>
+              </a:rPr>
+              <a:t>TUTORIAL</a:t>
+            </a:r>
+            <a:endParaRPr lang="ko-KR" altLang="en-US" sz="2000" b="1" dirty="0">
+              <a:solidFill>
+                <a:schemeClr val="bg1">
+                  <a:lumMod val="85000"/>
+                </a:schemeClr>
+              </a:solidFill>
+              <a:latin typeface="Calibri" panose="020F0502020204030204" pitchFamily="34" charset="0"/>
+              <a:cs typeface="Calibri" panose="020F0502020204030204" pitchFamily="34" charset="0"/>
+            </a:endParaRPr>
+          </a:p>
+        </p:txBody>
+      </p:sp>
+      <p:sp>
+        <p:nvSpPr>
+          <p:cNvPr id="20" name="TextBox 19">
+            <a:extLst>
+              <a:ext uri="{FF2B5EF4-FFF2-40B4-BE49-F238E27FC236}">
+                <a16:creationId xmlns:a16="http://schemas.microsoft.com/office/drawing/2014/main" id="{D98C9B6A-888D-4F62-ACC5-210E69B867A5}"/>
+              </a:ext>
+            </a:extLst>
+          </p:cNvPr>
+          <p:cNvSpPr txBox="1"/>
+          <p:nvPr/>
+        </p:nvSpPr>
+        <p:spPr>
+          <a:xfrm>
+            <a:off x="2041086" y="4722642"/>
+            <a:ext cx="1235403" cy="400110"/>
+          </a:xfrm>
+          <a:prstGeom prst="rect">
+            <a:avLst/>
+          </a:prstGeom>
+          <a:noFill/>
+        </p:spPr>
+        <p:txBody>
+          <a:bodyPr wrap="none" rtlCol="0">
+            <a:spAutoFit/>
+          </a:bodyPr>
+          <a:lstStyle/>
+          <a:p>
+            <a:r>
+              <a:rPr lang="en-US" altLang="ko-KR" sz="2000" b="1" dirty="0" smtClean="0">
+                <a:solidFill>
+                  <a:schemeClr val="bg1">
+                    <a:lumMod val="85000"/>
+                  </a:schemeClr>
+                </a:solidFill>
+                <a:latin typeface="Calibri" panose="020F0502020204030204" pitchFamily="34" charset="0"/>
+                <a:cs typeface="Calibri" panose="020F0502020204030204" pitchFamily="34" charset="0"/>
+              </a:rPr>
+              <a:t>WARRIOR</a:t>
+            </a:r>
+            <a:endParaRPr lang="ko-KR" altLang="en-US" sz="2000" b="1" dirty="0">
+              <a:solidFill>
+                <a:schemeClr val="bg1">
+                  <a:lumMod val="85000"/>
+                </a:schemeClr>
+              </a:solidFill>
+              <a:latin typeface="Calibri" panose="020F0502020204030204" pitchFamily="34" charset="0"/>
+              <a:cs typeface="Calibri" panose="020F0502020204030204" pitchFamily="34" charset="0"/>
+            </a:endParaRPr>
+          </a:p>
+        </p:txBody>
+      </p:sp>
+      <p:sp>
+        <p:nvSpPr>
+          <p:cNvPr id="21" name="TextBox 20">
+            <a:extLst>
+              <a:ext uri="{FF2B5EF4-FFF2-40B4-BE49-F238E27FC236}">
+                <a16:creationId xmlns:a16="http://schemas.microsoft.com/office/drawing/2014/main" id="{D98C9B6A-888D-4F62-ACC5-210E69B867A5}"/>
+              </a:ext>
+            </a:extLst>
+          </p:cNvPr>
+          <p:cNvSpPr txBox="1"/>
+          <p:nvPr/>
+        </p:nvSpPr>
+        <p:spPr>
+          <a:xfrm>
+            <a:off x="3559977" y="4752606"/>
+            <a:ext cx="1050031" cy="400110"/>
+          </a:xfrm>
+          <a:prstGeom prst="rect">
+            <a:avLst/>
+          </a:prstGeom>
+          <a:noFill/>
+        </p:spPr>
+        <p:txBody>
+          <a:bodyPr wrap="none" rtlCol="0">
+            <a:spAutoFit/>
+          </a:bodyPr>
+          <a:lstStyle/>
+          <a:p>
+            <a:r>
+              <a:rPr lang="en-US" altLang="ko-KR" sz="2000" b="1" dirty="0" smtClean="0">
+                <a:solidFill>
+                  <a:schemeClr val="bg1">
+                    <a:lumMod val="85000"/>
+                  </a:schemeClr>
+                </a:solidFill>
+                <a:latin typeface="Calibri" panose="020F0502020204030204" pitchFamily="34" charset="0"/>
+                <a:cs typeface="Calibri" panose="020F0502020204030204" pitchFamily="34" charset="0"/>
+              </a:rPr>
+              <a:t>ARCHER</a:t>
+            </a:r>
+            <a:endParaRPr lang="ko-KR" altLang="en-US" sz="2000" b="1" dirty="0">
+              <a:solidFill>
+                <a:schemeClr val="bg1">
+                  <a:lumMod val="85000"/>
+                </a:schemeClr>
+              </a:solidFill>
+              <a:latin typeface="Calibri" panose="020F0502020204030204" pitchFamily="34" charset="0"/>
+              <a:cs typeface="Calibri" panose="020F0502020204030204" pitchFamily="34" charset="0"/>
+            </a:endParaRPr>
+          </a:p>
+        </p:txBody>
+      </p:sp>
+      <p:sp>
+        <p:nvSpPr>
+          <p:cNvPr id="22" name="TextBox 21">
+            <a:extLst>
+              <a:ext uri="{FF2B5EF4-FFF2-40B4-BE49-F238E27FC236}">
+                <a16:creationId xmlns:a16="http://schemas.microsoft.com/office/drawing/2014/main" id="{D98C9B6A-888D-4F62-ACC5-210E69B867A5}"/>
+              </a:ext>
+            </a:extLst>
+          </p:cNvPr>
+          <p:cNvSpPr txBox="1"/>
+          <p:nvPr/>
+        </p:nvSpPr>
+        <p:spPr>
+          <a:xfrm>
+            <a:off x="5061918" y="4732517"/>
+            <a:ext cx="1067793" cy="400110"/>
+          </a:xfrm>
+          <a:prstGeom prst="rect">
+            <a:avLst/>
+          </a:prstGeom>
+          <a:noFill/>
+        </p:spPr>
+        <p:txBody>
+          <a:bodyPr wrap="none" rtlCol="0">
+            <a:spAutoFit/>
+          </a:bodyPr>
+          <a:lstStyle/>
+          <a:p>
+            <a:r>
+              <a:rPr lang="en-US" altLang="ko-KR" sz="2000" b="1" dirty="0" smtClean="0">
+                <a:solidFill>
+                  <a:schemeClr val="bg1">
+                    <a:lumMod val="85000"/>
+                  </a:schemeClr>
+                </a:solidFill>
+                <a:latin typeface="Calibri" panose="020F0502020204030204" pitchFamily="34" charset="0"/>
+                <a:cs typeface="Calibri" panose="020F0502020204030204" pitchFamily="34" charset="0"/>
+              </a:rPr>
+              <a:t>WIZARD</a:t>
+            </a:r>
+            <a:endParaRPr lang="ko-KR" altLang="en-US" sz="2000" b="1" dirty="0">
+              <a:solidFill>
+                <a:schemeClr val="bg1">
+                  <a:lumMod val="85000"/>
+                </a:schemeClr>
+              </a:solidFill>
+              <a:latin typeface="Calibri" panose="020F0502020204030204" pitchFamily="34" charset="0"/>
+              <a:cs typeface="Calibri" panose="020F0502020204030204" pitchFamily="34" charset="0"/>
+            </a:endParaRPr>
+          </a:p>
+        </p:txBody>
+      </p:sp>
+    </p:spTree>
+    <p:extLst>
+      <p:ext uri="{BB962C8B-B14F-4D97-AF65-F5344CB8AC3E}">
+        <p14:creationId xmlns:p14="http://schemas.microsoft.com/office/powerpoint/2010/main" val="531432603"/>
+      </p:ext>
+    </p:extLst>
+  </p:cSld>
+  <p:clrMapOvr>
+    <a:masterClrMapping/>
+  </p:clrMapOvr>
+</p:sld>
+</file>
+
 <file path=ppt/slides/slide2.xml><?xml version="1.0" encoding="utf-8"?>
 <p:sld xmlns:a="http://schemas.openxmlformats.org/drawingml/2006/main" xmlns:r="http://schemas.openxmlformats.org/officeDocument/2006/relationships" xmlns:p="http://schemas.openxmlformats.org/presentationml/2006/main">
   <p:cSld>
@@ -4557,7 +5375,7 @@
         </p:nvGrpSpPr>
         <p:grpSpPr>
           <a:xfrm>
-            <a:off x="731520" y="1341120"/>
+            <a:off x="856211" y="210589"/>
             <a:ext cx="2994660" cy="1341120"/>
             <a:chOff x="731520" y="1341120"/>
             <a:chExt cx="2994660" cy="1341120"/>
@@ -4686,7 +5504,7 @@
         </p:nvGrpSpPr>
         <p:grpSpPr>
           <a:xfrm>
-            <a:off x="4015740" y="1341120"/>
+            <a:off x="4140431" y="210589"/>
             <a:ext cx="2994660" cy="1341120"/>
             <a:chOff x="731520" y="1341120"/>
             <a:chExt cx="2994660" cy="1341120"/>
@@ -4815,7 +5633,7 @@
         </p:nvGrpSpPr>
         <p:grpSpPr>
           <a:xfrm>
-            <a:off x="480060" y="3505201"/>
+            <a:off x="604751" y="2374670"/>
             <a:ext cx="2994660" cy="1341120"/>
             <a:chOff x="731520" y="1341120"/>
             <a:chExt cx="2994660" cy="1341120"/>
@@ -4942,7 +5760,7 @@
         </p:nvSpPr>
         <p:spPr>
           <a:xfrm>
-            <a:off x="3979546" y="3505202"/>
+            <a:off x="4104237" y="2374671"/>
             <a:ext cx="2994660" cy="1341120"/>
           </a:xfrm>
           <a:prstGeom prst="rect">
@@ -4996,7 +5814,7 @@
         </p:nvSpPr>
         <p:spPr>
           <a:xfrm>
-            <a:off x="4015739" y="3543301"/>
+            <a:off x="4140430" y="2412770"/>
             <a:ext cx="2920841" cy="1097280"/>
           </a:xfrm>
           <a:prstGeom prst="rect">
@@ -5050,7 +5868,7 @@
         </p:nvSpPr>
         <p:spPr>
           <a:xfrm>
-            <a:off x="3979546" y="4640582"/>
+            <a:off x="4104237" y="3510051"/>
             <a:ext cx="2994660" cy="205740"/>
           </a:xfrm>
           <a:prstGeom prst="rect">
@@ -5102,7 +5920,7 @@
         </p:nvSpPr>
         <p:spPr>
           <a:xfrm>
-            <a:off x="7442839" y="3505202"/>
+            <a:off x="7567530" y="2374671"/>
             <a:ext cx="2994660" cy="1341120"/>
           </a:xfrm>
           <a:prstGeom prst="rect">
@@ -5154,7 +5972,7 @@
         </p:nvSpPr>
         <p:spPr>
           <a:xfrm>
-            <a:off x="7479032" y="3543301"/>
+            <a:off x="7603723" y="2412770"/>
             <a:ext cx="2920841" cy="1097280"/>
           </a:xfrm>
           <a:prstGeom prst="rect">
@@ -5208,7 +6026,7 @@
         </p:nvSpPr>
         <p:spPr>
           <a:xfrm>
-            <a:off x="7442839" y="4640582"/>
+            <a:off x="7567530" y="3510051"/>
             <a:ext cx="2994660" cy="205740"/>
           </a:xfrm>
           <a:prstGeom prst="rect">
@@ -5260,7 +6078,7 @@
         </p:nvSpPr>
         <p:spPr>
           <a:xfrm>
-            <a:off x="7831459" y="1341120"/>
+            <a:off x="7956150" y="210589"/>
             <a:ext cx="2933700" cy="1135380"/>
           </a:xfrm>
           <a:prstGeom prst="rect">
@@ -5301,6 +6119,312 @@
           </a:p>
         </p:txBody>
       </p:sp>
+      <p:sp>
+        <p:nvSpPr>
+          <p:cNvPr id="24" name="직사각형 17">
+            <a:extLst>
+              <a:ext uri="{FF2B5EF4-FFF2-40B4-BE49-F238E27FC236}">
+                <a16:creationId xmlns:a16="http://schemas.microsoft.com/office/drawing/2014/main" id="{5755DCF8-42D7-4DBB-B9E9-10E1696791DC}"/>
+              </a:ext>
+            </a:extLst>
+          </p:cNvPr>
+          <p:cNvSpPr/>
+          <p:nvPr/>
+        </p:nvSpPr>
+        <p:spPr>
+          <a:xfrm>
+            <a:off x="4104237" y="4386351"/>
+            <a:ext cx="2994660" cy="1341120"/>
+          </a:xfrm>
+          <a:prstGeom prst="rect">
+            <a:avLst/>
+          </a:prstGeom>
+          <a:solidFill>
+            <a:schemeClr val="bg2">
+              <a:lumMod val="90000"/>
+            </a:schemeClr>
+          </a:solidFill>
+          <a:ln>
+            <a:noFill/>
+          </a:ln>
+        </p:spPr>
+        <p:style>
+          <a:lnRef idx="2">
+            <a:schemeClr val="accent1">
+              <a:shade val="50000"/>
+            </a:schemeClr>
+          </a:lnRef>
+          <a:fillRef idx="1">
+            <a:schemeClr val="accent1"/>
+          </a:fillRef>
+          <a:effectRef idx="0">
+            <a:schemeClr val="accent1"/>
+          </a:effectRef>
+          <a:fontRef idx="minor">
+            <a:schemeClr val="lt1"/>
+          </a:fontRef>
+        </p:style>
+        <p:txBody>
+          <a:bodyPr rtlCol="0" anchor="ctr"/>
+          <a:lstStyle/>
+          <a:p>
+            <a:pPr algn="ctr"/>
+            <a:endParaRPr lang="ko-KR" altLang="en-US"/>
+          </a:p>
+        </p:txBody>
+      </p:sp>
+      <p:sp>
+        <p:nvSpPr>
+          <p:cNvPr id="25" name="직사각형 18">
+            <a:extLst>
+              <a:ext uri="{FF2B5EF4-FFF2-40B4-BE49-F238E27FC236}">
+                <a16:creationId xmlns:a16="http://schemas.microsoft.com/office/drawing/2014/main" id="{351ECF53-01F0-4C7A-9107-ED78D9E0F0D2}"/>
+              </a:ext>
+            </a:extLst>
+          </p:cNvPr>
+          <p:cNvSpPr/>
+          <p:nvPr/>
+        </p:nvSpPr>
+        <p:spPr>
+          <a:xfrm>
+            <a:off x="4140430" y="4457702"/>
+            <a:ext cx="2920841" cy="1219892"/>
+          </a:xfrm>
+          <a:prstGeom prst="rect">
+            <a:avLst/>
+          </a:prstGeom>
+          <a:solidFill>
+            <a:srgbClr val="767171">
+              <a:alpha val="80000"/>
+            </a:srgbClr>
+          </a:solidFill>
+          <a:ln>
+            <a:noFill/>
+          </a:ln>
+        </p:spPr>
+        <p:style>
+          <a:lnRef idx="2">
+            <a:schemeClr val="accent1">
+              <a:shade val="50000"/>
+            </a:schemeClr>
+          </a:lnRef>
+          <a:fillRef idx="1">
+            <a:schemeClr val="accent1"/>
+          </a:fillRef>
+          <a:effectRef idx="0">
+            <a:schemeClr val="accent1"/>
+          </a:effectRef>
+          <a:fontRef idx="minor">
+            <a:schemeClr val="lt1"/>
+          </a:fontRef>
+        </p:style>
+        <p:txBody>
+          <a:bodyPr rtlCol="0" anchor="ctr"/>
+          <a:lstStyle/>
+          <a:p>
+            <a:pPr algn="ctr"/>
+            <a:endParaRPr lang="ko-KR" altLang="en-US"/>
+          </a:p>
+        </p:txBody>
+      </p:sp>
+      <p:sp>
+        <p:nvSpPr>
+          <p:cNvPr id="2" name="L-Shape 1"/>
+          <p:cNvSpPr/>
+          <p:nvPr/>
+        </p:nvSpPr>
+        <p:spPr>
+          <a:xfrm rot="13386141">
+            <a:off x="6650637" y="5259253"/>
+            <a:ext cx="221524" cy="214784"/>
+          </a:xfrm>
+          <a:prstGeom prst="corner">
+            <a:avLst/>
+          </a:prstGeom>
+          <a:solidFill>
+            <a:srgbClr val="D0CECE"/>
+          </a:solidFill>
+          <a:ln>
+            <a:noFill/>
+          </a:ln>
+        </p:spPr>
+        <p:style>
+          <a:lnRef idx="2">
+            <a:schemeClr val="accent1">
+              <a:shade val="50000"/>
+            </a:schemeClr>
+          </a:lnRef>
+          <a:fillRef idx="1">
+            <a:schemeClr val="accent1"/>
+          </a:fillRef>
+          <a:effectRef idx="0">
+            <a:schemeClr val="accent1"/>
+          </a:effectRef>
+          <a:fontRef idx="minor">
+            <a:schemeClr val="lt1"/>
+          </a:fontRef>
+        </p:style>
+        <p:txBody>
+          <a:bodyPr rtlCol="0" anchor="ctr"/>
+          <a:lstStyle/>
+          <a:p>
+            <a:pPr algn="ctr"/>
+            <a:endParaRPr lang="en-US"/>
+          </a:p>
+        </p:txBody>
+      </p:sp>
+      <p:sp>
+        <p:nvSpPr>
+          <p:cNvPr id="28" name="직사각형 17">
+            <a:extLst>
+              <a:ext uri="{FF2B5EF4-FFF2-40B4-BE49-F238E27FC236}">
+                <a16:creationId xmlns:a16="http://schemas.microsoft.com/office/drawing/2014/main" id="{5755DCF8-42D7-4DBB-B9E9-10E1696791DC}"/>
+              </a:ext>
+            </a:extLst>
+          </p:cNvPr>
+          <p:cNvSpPr/>
+          <p:nvPr/>
+        </p:nvSpPr>
+        <p:spPr>
+          <a:xfrm>
+            <a:off x="7529904" y="4386351"/>
+            <a:ext cx="2994660" cy="1341120"/>
+          </a:xfrm>
+          <a:prstGeom prst="rect">
+            <a:avLst/>
+          </a:prstGeom>
+          <a:solidFill>
+            <a:srgbClr val="EE7E22"/>
+          </a:solidFill>
+          <a:ln>
+            <a:noFill/>
+          </a:ln>
+        </p:spPr>
+        <p:style>
+          <a:lnRef idx="2">
+            <a:schemeClr val="accent1">
+              <a:shade val="50000"/>
+            </a:schemeClr>
+          </a:lnRef>
+          <a:fillRef idx="1">
+            <a:schemeClr val="accent1"/>
+          </a:fillRef>
+          <a:effectRef idx="0">
+            <a:schemeClr val="accent1"/>
+          </a:effectRef>
+          <a:fontRef idx="minor">
+            <a:schemeClr val="lt1"/>
+          </a:fontRef>
+        </p:style>
+        <p:txBody>
+          <a:bodyPr rtlCol="0" anchor="ctr"/>
+          <a:lstStyle/>
+          <a:p>
+            <a:pPr algn="ctr"/>
+            <a:endParaRPr lang="ko-KR" altLang="en-US"/>
+          </a:p>
+        </p:txBody>
+      </p:sp>
+      <p:sp>
+        <p:nvSpPr>
+          <p:cNvPr id="29" name="직사각형 18">
+            <a:extLst>
+              <a:ext uri="{FF2B5EF4-FFF2-40B4-BE49-F238E27FC236}">
+                <a16:creationId xmlns:a16="http://schemas.microsoft.com/office/drawing/2014/main" id="{351ECF53-01F0-4C7A-9107-ED78D9E0F0D2}"/>
+              </a:ext>
+            </a:extLst>
+          </p:cNvPr>
+          <p:cNvSpPr/>
+          <p:nvPr/>
+        </p:nvSpPr>
+        <p:spPr>
+          <a:xfrm>
+            <a:off x="7566097" y="4457702"/>
+            <a:ext cx="2920841" cy="1219892"/>
+          </a:xfrm>
+          <a:prstGeom prst="rect">
+            <a:avLst/>
+          </a:prstGeom>
+          <a:solidFill>
+            <a:srgbClr val="767171">
+              <a:alpha val="80000"/>
+            </a:srgbClr>
+          </a:solidFill>
+          <a:ln>
+            <a:noFill/>
+          </a:ln>
+        </p:spPr>
+        <p:style>
+          <a:lnRef idx="2">
+            <a:schemeClr val="accent1">
+              <a:shade val="50000"/>
+            </a:schemeClr>
+          </a:lnRef>
+          <a:fillRef idx="1">
+            <a:schemeClr val="accent1"/>
+          </a:fillRef>
+          <a:effectRef idx="0">
+            <a:schemeClr val="accent1"/>
+          </a:effectRef>
+          <a:fontRef idx="minor">
+            <a:schemeClr val="lt1"/>
+          </a:fontRef>
+        </p:style>
+        <p:txBody>
+          <a:bodyPr rtlCol="0" anchor="ctr"/>
+          <a:lstStyle/>
+          <a:p>
+            <a:pPr algn="ctr"/>
+            <a:endParaRPr lang="ko-KR" altLang="en-US"/>
+          </a:p>
+        </p:txBody>
+      </p:sp>
+      <p:sp>
+        <p:nvSpPr>
+          <p:cNvPr id="30" name="L-Shape 29"/>
+          <p:cNvSpPr/>
+          <p:nvPr/>
+        </p:nvSpPr>
+        <p:spPr>
+          <a:xfrm rot="13386141">
+            <a:off x="10076304" y="5259253"/>
+            <a:ext cx="221524" cy="214784"/>
+          </a:xfrm>
+          <a:prstGeom prst="corner">
+            <a:avLst/>
+          </a:prstGeom>
+          <a:solidFill>
+            <a:srgbClr val="EE7E22"/>
+          </a:solidFill>
+          <a:ln>
+            <a:noFill/>
+          </a:ln>
+        </p:spPr>
+        <p:style>
+          <a:lnRef idx="2">
+            <a:schemeClr val="accent1">
+              <a:shade val="50000"/>
+            </a:schemeClr>
+          </a:lnRef>
+          <a:fillRef idx="1">
+            <a:schemeClr val="accent1"/>
+          </a:fillRef>
+          <a:effectRef idx="0">
+            <a:schemeClr val="accent1"/>
+          </a:effectRef>
+          <a:fontRef idx="minor">
+            <a:schemeClr val="lt1"/>
+          </a:fontRef>
+        </p:style>
+        <p:txBody>
+          <a:bodyPr rtlCol="0" anchor="ctr"/>
+          <a:lstStyle/>
+          <a:p>
+            <a:pPr algn="ctr"/>
+            <a:endParaRPr lang="en-US"/>
+          </a:p>
+        </p:txBody>
+      </p:sp>
     </p:spTree>
     <p:extLst>
       <p:ext uri="{BB962C8B-B14F-4D97-AF65-F5344CB8AC3E}">
@@ -5315,6 +6439,305 @@
 </file>
 
 <file path=ppt/slides/slide8.xml><?xml version="1.0" encoding="utf-8"?>
+<p:sld xmlns:a="http://schemas.openxmlformats.org/drawingml/2006/main" xmlns:r="http://schemas.openxmlformats.org/officeDocument/2006/relationships" xmlns:p="http://schemas.openxmlformats.org/presentationml/2006/main">
+  <p:cSld>
+    <p:spTree>
+      <p:nvGrpSpPr>
+        <p:cNvPr id="1" name=""/>
+        <p:cNvGrpSpPr/>
+        <p:nvPr/>
+      </p:nvGrpSpPr>
+      <p:grpSpPr>
+        <a:xfrm>
+          <a:off x="0" y="0"/>
+          <a:ext cx="0" cy="0"/>
+          <a:chOff x="0" y="0"/>
+          <a:chExt cx="0" cy="0"/>
+        </a:xfrm>
+      </p:grpSpPr>
+      <p:sp>
+        <p:nvSpPr>
+          <p:cNvPr id="8" name="Snip Diagonal Corner Rectangle 7"/>
+          <p:cNvSpPr/>
+          <p:nvPr/>
+        </p:nvSpPr>
+        <p:spPr>
+          <a:xfrm flipH="1">
+            <a:off x="940116" y="1889761"/>
+            <a:ext cx="7553498" cy="4153592"/>
+          </a:xfrm>
+          <a:prstGeom prst="snip2DiagRect">
+            <a:avLst>
+              <a:gd name="adj1" fmla="val 0"/>
+              <a:gd name="adj2" fmla="val 15315"/>
+            </a:avLst>
+          </a:prstGeom>
+          <a:solidFill>
+            <a:srgbClr val="000000">
+              <a:alpha val="69804"/>
+            </a:srgbClr>
+          </a:solidFill>
+          <a:ln>
+            <a:noFill/>
+          </a:ln>
+        </p:spPr>
+        <p:style>
+          <a:lnRef idx="2">
+            <a:schemeClr val="accent1">
+              <a:shade val="50000"/>
+            </a:schemeClr>
+          </a:lnRef>
+          <a:fillRef idx="1">
+            <a:schemeClr val="accent1"/>
+          </a:fillRef>
+          <a:effectRef idx="0">
+            <a:schemeClr val="accent1"/>
+          </a:effectRef>
+          <a:fontRef idx="minor">
+            <a:schemeClr val="lt1"/>
+          </a:fontRef>
+        </p:style>
+        <p:txBody>
+          <a:bodyPr rtlCol="0" anchor="ctr"/>
+          <a:lstStyle/>
+          <a:p>
+            <a:pPr algn="ctr"/>
+            <a:endParaRPr lang="en-US"/>
+          </a:p>
+        </p:txBody>
+      </p:sp>
+      <p:grpSp>
+        <p:nvGrpSpPr>
+          <p:cNvPr id="9" name="Group 8"/>
+          <p:cNvGrpSpPr/>
+          <p:nvPr/>
+        </p:nvGrpSpPr>
+        <p:grpSpPr>
+          <a:xfrm>
+            <a:off x="1438101" y="3192087"/>
+            <a:ext cx="1687484" cy="1680557"/>
+            <a:chOff x="1487978" y="856211"/>
+            <a:chExt cx="2535382" cy="2427317"/>
+          </a:xfrm>
+        </p:grpSpPr>
+        <p:sp>
+          <p:nvSpPr>
+            <p:cNvPr id="4" name="Snip Diagonal Corner Rectangle 3"/>
+            <p:cNvSpPr/>
+            <p:nvPr/>
+          </p:nvSpPr>
+          <p:spPr>
+            <a:xfrm>
+              <a:off x="1487978" y="856211"/>
+              <a:ext cx="2535382" cy="2427317"/>
+            </a:xfrm>
+            <a:prstGeom prst="snip2DiagRect">
+              <a:avLst/>
+            </a:prstGeom>
+            <a:solidFill>
+              <a:srgbClr val="D0CECE"/>
+            </a:solidFill>
+            <a:ln>
+              <a:noFill/>
+            </a:ln>
+          </p:spPr>
+          <p:style>
+            <a:lnRef idx="2">
+              <a:schemeClr val="accent1">
+                <a:shade val="50000"/>
+              </a:schemeClr>
+            </a:lnRef>
+            <a:fillRef idx="1">
+              <a:schemeClr val="accent1"/>
+            </a:fillRef>
+            <a:effectRef idx="0">
+              <a:schemeClr val="accent1"/>
+            </a:effectRef>
+            <a:fontRef idx="minor">
+              <a:schemeClr val="lt1"/>
+            </a:fontRef>
+          </p:style>
+          <p:txBody>
+            <a:bodyPr rtlCol="0" anchor="ctr"/>
+            <a:lstStyle/>
+            <a:p>
+              <a:pPr algn="ctr"/>
+              <a:endParaRPr lang="en-US"/>
+            </a:p>
+          </p:txBody>
+        </p:sp>
+        <p:sp>
+          <p:nvSpPr>
+            <p:cNvPr id="5" name="Snip Diagonal Corner Rectangle 4"/>
+            <p:cNvSpPr/>
+            <p:nvPr/>
+          </p:nvSpPr>
+          <p:spPr>
+            <a:xfrm>
+              <a:off x="1640378" y="1008612"/>
+              <a:ext cx="2228589" cy="2133600"/>
+            </a:xfrm>
+            <a:prstGeom prst="snip2DiagRect">
+              <a:avLst/>
+            </a:prstGeom>
+            <a:solidFill>
+              <a:srgbClr val="AFABAB">
+                <a:alpha val="80000"/>
+              </a:srgbClr>
+            </a:solidFill>
+            <a:ln>
+              <a:noFill/>
+            </a:ln>
+          </p:spPr>
+          <p:style>
+            <a:lnRef idx="2">
+              <a:schemeClr val="accent1">
+                <a:shade val="50000"/>
+              </a:schemeClr>
+            </a:lnRef>
+            <a:fillRef idx="1">
+              <a:schemeClr val="accent1"/>
+            </a:fillRef>
+            <a:effectRef idx="0">
+              <a:schemeClr val="accent1"/>
+            </a:effectRef>
+            <a:fontRef idx="minor">
+              <a:schemeClr val="lt1"/>
+            </a:fontRef>
+          </p:style>
+          <p:txBody>
+            <a:bodyPr rtlCol="0" anchor="ctr"/>
+            <a:lstStyle/>
+            <a:p>
+              <a:pPr algn="ctr"/>
+              <a:endParaRPr lang="en-US"/>
+            </a:p>
+          </p:txBody>
+        </p:sp>
+      </p:grpSp>
+      <p:grpSp>
+        <p:nvGrpSpPr>
+          <p:cNvPr id="10" name="Group 9"/>
+          <p:cNvGrpSpPr/>
+          <p:nvPr/>
+        </p:nvGrpSpPr>
+        <p:grpSpPr>
+          <a:xfrm>
+            <a:off x="4651867" y="3151215"/>
+            <a:ext cx="1684713" cy="1762299"/>
+            <a:chOff x="6112625" y="997527"/>
+            <a:chExt cx="2535382" cy="2427317"/>
+          </a:xfrm>
+        </p:grpSpPr>
+        <p:sp>
+          <p:nvSpPr>
+            <p:cNvPr id="6" name="Snip Diagonal Corner Rectangle 5"/>
+            <p:cNvSpPr/>
+            <p:nvPr/>
+          </p:nvSpPr>
+          <p:spPr>
+            <a:xfrm>
+              <a:off x="6112625" y="997527"/>
+              <a:ext cx="2535382" cy="2427317"/>
+            </a:xfrm>
+            <a:prstGeom prst="snip2DiagRect">
+              <a:avLst/>
+            </a:prstGeom>
+            <a:solidFill>
+              <a:srgbClr val="EE7E22"/>
+            </a:solidFill>
+            <a:ln>
+              <a:noFill/>
+            </a:ln>
+          </p:spPr>
+          <p:style>
+            <a:lnRef idx="2">
+              <a:schemeClr val="accent1">
+                <a:shade val="50000"/>
+              </a:schemeClr>
+            </a:lnRef>
+            <a:fillRef idx="1">
+              <a:schemeClr val="accent1"/>
+            </a:fillRef>
+            <a:effectRef idx="0">
+              <a:schemeClr val="accent1"/>
+            </a:effectRef>
+            <a:fontRef idx="minor">
+              <a:schemeClr val="lt1"/>
+            </a:fontRef>
+          </p:style>
+          <p:txBody>
+            <a:bodyPr rtlCol="0" anchor="ctr"/>
+            <a:lstStyle/>
+            <a:p>
+              <a:pPr algn="ctr"/>
+              <a:endParaRPr lang="en-US"/>
+            </a:p>
+          </p:txBody>
+        </p:sp>
+        <p:sp>
+          <p:nvSpPr>
+            <p:cNvPr id="7" name="Snip Diagonal Corner Rectangle 6"/>
+            <p:cNvSpPr/>
+            <p:nvPr/>
+          </p:nvSpPr>
+          <p:spPr>
+            <a:xfrm>
+              <a:off x="6265025" y="1149928"/>
+              <a:ext cx="2228589" cy="2133600"/>
+            </a:xfrm>
+            <a:prstGeom prst="snip2DiagRect">
+              <a:avLst/>
+            </a:prstGeom>
+            <a:solidFill>
+              <a:srgbClr val="AFABAB">
+                <a:alpha val="80000"/>
+              </a:srgbClr>
+            </a:solidFill>
+            <a:ln>
+              <a:noFill/>
+            </a:ln>
+          </p:spPr>
+          <p:style>
+            <a:lnRef idx="2">
+              <a:schemeClr val="accent1">
+                <a:shade val="50000"/>
+              </a:schemeClr>
+            </a:lnRef>
+            <a:fillRef idx="1">
+              <a:schemeClr val="accent1"/>
+            </a:fillRef>
+            <a:effectRef idx="0">
+              <a:schemeClr val="accent1"/>
+            </a:effectRef>
+            <a:fontRef idx="minor">
+              <a:schemeClr val="lt1"/>
+            </a:fontRef>
+          </p:style>
+          <p:txBody>
+            <a:bodyPr rtlCol="0" anchor="ctr"/>
+            <a:lstStyle/>
+            <a:p>
+              <a:pPr algn="ctr"/>
+              <a:endParaRPr lang="en-US"/>
+            </a:p>
+          </p:txBody>
+        </p:sp>
+      </p:grpSp>
+    </p:spTree>
+    <p:extLst>
+      <p:ext uri="{BB962C8B-B14F-4D97-AF65-F5344CB8AC3E}">
+        <p14:creationId xmlns:p14="http://schemas.microsoft.com/office/powerpoint/2010/main" val="542620260"/>
+      </p:ext>
+    </p:extLst>
+  </p:cSld>
+  <p:clrMapOvr>
+    <a:masterClrMapping/>
+  </p:clrMapOvr>
+</p:sld>
+</file>
+
+<file path=ppt/slides/slide9.xml><?xml version="1.0" encoding="utf-8"?>
 <p:sld xmlns:a="http://schemas.openxmlformats.org/drawingml/2006/main" xmlns:r="http://schemas.openxmlformats.org/officeDocument/2006/relationships" xmlns:p="http://schemas.openxmlformats.org/presentationml/2006/main">
   <p:cSld>
     <p:spTree>
@@ -5604,506 +7027,6 @@
     <p:extLst>
       <p:ext uri="{BB962C8B-B14F-4D97-AF65-F5344CB8AC3E}">
         <p14:creationId xmlns:p14="http://schemas.microsoft.com/office/powerpoint/2010/main" val="1162952411"/>
-      </p:ext>
-    </p:extLst>
-  </p:cSld>
-  <p:clrMapOvr>
-    <a:masterClrMapping/>
-  </p:clrMapOvr>
-</p:sld>
-</file>
-
-<file path=ppt/slides/slide9.xml><?xml version="1.0" encoding="utf-8"?>
-<p:sld xmlns:a="http://schemas.openxmlformats.org/drawingml/2006/main" xmlns:r="http://schemas.openxmlformats.org/officeDocument/2006/relationships" xmlns:p="http://schemas.openxmlformats.org/presentationml/2006/main">
-  <p:cSld>
-    <p:spTree>
-      <p:nvGrpSpPr>
-        <p:cNvPr id="1" name=""/>
-        <p:cNvGrpSpPr/>
-        <p:nvPr/>
-      </p:nvGrpSpPr>
-      <p:grpSpPr>
-        <a:xfrm>
-          <a:off x="0" y="0"/>
-          <a:ext cx="0" cy="0"/>
-          <a:chOff x="0" y="0"/>
-          <a:chExt cx="0" cy="0"/>
-        </a:xfrm>
-      </p:grpSpPr>
-      <p:sp>
-        <p:nvSpPr>
-          <p:cNvPr id="10" name="직사각형 9">
-            <a:extLst>
-              <a:ext uri="{FF2B5EF4-FFF2-40B4-BE49-F238E27FC236}">
-                <a16:creationId xmlns:a16="http://schemas.microsoft.com/office/drawing/2014/main" id="{242180D3-26D3-4B23-9A8C-AC150521A362}"/>
-              </a:ext>
-            </a:extLst>
-          </p:cNvPr>
-          <p:cNvSpPr/>
-          <p:nvPr/>
-        </p:nvSpPr>
-        <p:spPr>
-          <a:xfrm>
-            <a:off x="487680" y="1143000"/>
-            <a:ext cx="9509760" cy="5455920"/>
-          </a:xfrm>
-          <a:prstGeom prst="rect">
-            <a:avLst/>
-          </a:prstGeom>
-        </p:spPr>
-        <p:style>
-          <a:lnRef idx="2">
-            <a:schemeClr val="accent1">
-              <a:shade val="50000"/>
-            </a:schemeClr>
-          </a:lnRef>
-          <a:fillRef idx="1">
-            <a:schemeClr val="accent1"/>
-          </a:fillRef>
-          <a:effectRef idx="0">
-            <a:schemeClr val="accent1"/>
-          </a:effectRef>
-          <a:fontRef idx="minor">
-            <a:schemeClr val="lt1"/>
-          </a:fontRef>
-        </p:style>
-        <p:txBody>
-          <a:bodyPr rtlCol="0" anchor="ctr"/>
-          <a:lstStyle/>
-          <a:p>
-            <a:pPr algn="ctr"/>
-            <a:endParaRPr lang="ko-KR" altLang="en-US"/>
-          </a:p>
-        </p:txBody>
-      </p:sp>
-      <p:sp>
-        <p:nvSpPr>
-          <p:cNvPr id="5" name="TextBox 4">
-            <a:extLst>
-              <a:ext uri="{FF2B5EF4-FFF2-40B4-BE49-F238E27FC236}">
-                <a16:creationId xmlns:a16="http://schemas.microsoft.com/office/drawing/2014/main" id="{1B295513-7EB2-44FC-9CDF-30F2EAF94BC2}"/>
-              </a:ext>
-            </a:extLst>
-          </p:cNvPr>
-          <p:cNvSpPr txBox="1"/>
-          <p:nvPr/>
-        </p:nvSpPr>
-        <p:spPr>
-          <a:xfrm>
-            <a:off x="2194560" y="2506980"/>
-            <a:ext cx="928459" cy="461665"/>
-          </a:xfrm>
-          <a:prstGeom prst="rect">
-            <a:avLst/>
-          </a:prstGeom>
-          <a:noFill/>
-        </p:spPr>
-        <p:txBody>
-          <a:bodyPr wrap="none" rtlCol="0">
-            <a:spAutoFit/>
-          </a:bodyPr>
-          <a:lstStyle/>
-          <a:p>
-            <a:r>
-              <a:rPr lang="en-US" altLang="ko-KR" sz="2400" dirty="0">
-                <a:latin typeface="Aharoni" panose="02010803020104030203" pitchFamily="2" charset="-79"/>
-                <a:cs typeface="Aharoni" panose="02010803020104030203" pitchFamily="2" charset="-79"/>
-              </a:rPr>
-              <a:t>PLAY</a:t>
-            </a:r>
-            <a:endParaRPr lang="ko-KR" altLang="en-US" sz="2400" dirty="0">
-              <a:latin typeface="Aharoni" panose="02010803020104030203" pitchFamily="2" charset="-79"/>
-              <a:cs typeface="Aharoni" panose="02010803020104030203" pitchFamily="2" charset="-79"/>
-            </a:endParaRPr>
-          </a:p>
-        </p:txBody>
-      </p:sp>
-      <p:sp>
-        <p:nvSpPr>
-          <p:cNvPr id="7" name="TextBox 6">
-            <a:extLst>
-              <a:ext uri="{FF2B5EF4-FFF2-40B4-BE49-F238E27FC236}">
-                <a16:creationId xmlns:a16="http://schemas.microsoft.com/office/drawing/2014/main" id="{089E75B9-6D37-47B3-802A-FDF2C89F5F9E}"/>
-              </a:ext>
-            </a:extLst>
-          </p:cNvPr>
-          <p:cNvSpPr txBox="1"/>
-          <p:nvPr/>
-        </p:nvSpPr>
-        <p:spPr>
-          <a:xfrm>
-            <a:off x="3712419" y="2484118"/>
-            <a:ext cx="1048685" cy="400110"/>
-          </a:xfrm>
-          <a:prstGeom prst="rect">
-            <a:avLst/>
-          </a:prstGeom>
-          <a:noFill/>
-        </p:spPr>
-        <p:txBody>
-          <a:bodyPr wrap="none" rtlCol="0">
-            <a:spAutoFit/>
-          </a:bodyPr>
-          <a:lstStyle/>
-          <a:p>
-            <a:r>
-              <a:rPr lang="en-US" altLang="ko-KR" sz="2000" dirty="0">
-                <a:latin typeface="Impact" panose="020B0806030902050204" pitchFamily="34" charset="0"/>
-                <a:cs typeface="Aharoni" panose="02010803020104030203" pitchFamily="2" charset="-79"/>
-              </a:rPr>
-              <a:t>LEGENDS</a:t>
-            </a:r>
-            <a:endParaRPr lang="ko-KR" altLang="en-US" sz="2000" dirty="0">
-              <a:latin typeface="Impact" panose="020B0806030902050204" pitchFamily="34" charset="0"/>
-              <a:cs typeface="Aharoni" panose="02010803020104030203" pitchFamily="2" charset="-79"/>
-            </a:endParaRPr>
-          </a:p>
-        </p:txBody>
-      </p:sp>
-      <p:sp>
-        <p:nvSpPr>
-          <p:cNvPr id="8" name="TextBox 7">
-            <a:extLst>
-              <a:ext uri="{FF2B5EF4-FFF2-40B4-BE49-F238E27FC236}">
-                <a16:creationId xmlns:a16="http://schemas.microsoft.com/office/drawing/2014/main" id="{235E8297-2768-4BE9-9E2F-7DC505131776}"/>
-              </a:ext>
-            </a:extLst>
-          </p:cNvPr>
-          <p:cNvSpPr txBox="1"/>
-          <p:nvPr/>
-        </p:nvSpPr>
-        <p:spPr>
-          <a:xfrm>
-            <a:off x="5270133" y="2484118"/>
-            <a:ext cx="889987" cy="369332"/>
-          </a:xfrm>
-          <a:prstGeom prst="rect">
-            <a:avLst/>
-          </a:prstGeom>
-          <a:noFill/>
-        </p:spPr>
-        <p:txBody>
-          <a:bodyPr wrap="none" rtlCol="0">
-            <a:spAutoFit/>
-          </a:bodyPr>
-          <a:lstStyle/>
-          <a:p>
-            <a:r>
-              <a:rPr lang="en-US" altLang="ko-KR" dirty="0">
-                <a:latin typeface="Algerian" panose="020B0604020202020204" pitchFamily="82" charset="0"/>
-              </a:rPr>
-              <a:t>ITEMS</a:t>
-            </a:r>
-            <a:endParaRPr lang="ko-KR" altLang="en-US" dirty="0">
-              <a:latin typeface="Algerian" panose="020B0604020202020204" pitchFamily="82" charset="0"/>
-            </a:endParaRPr>
-          </a:p>
-        </p:txBody>
-      </p:sp>
-      <p:sp>
-        <p:nvSpPr>
-          <p:cNvPr id="9" name="TextBox 8">
-            <a:extLst>
-              <a:ext uri="{FF2B5EF4-FFF2-40B4-BE49-F238E27FC236}">
-                <a16:creationId xmlns:a16="http://schemas.microsoft.com/office/drawing/2014/main" id="{63063001-30E0-415C-8D89-F56C97A5333F}"/>
-              </a:ext>
-            </a:extLst>
-          </p:cNvPr>
-          <p:cNvSpPr txBox="1"/>
-          <p:nvPr/>
-        </p:nvSpPr>
-        <p:spPr>
-          <a:xfrm>
-            <a:off x="6749520" y="2484118"/>
-            <a:ext cx="975588" cy="369332"/>
-          </a:xfrm>
-          <a:prstGeom prst="rect">
-            <a:avLst/>
-          </a:prstGeom>
-          <a:noFill/>
-        </p:spPr>
-        <p:txBody>
-          <a:bodyPr wrap="none" rtlCol="0">
-            <a:spAutoFit/>
-          </a:bodyPr>
-          <a:lstStyle/>
-          <a:p>
-            <a:r>
-              <a:rPr lang="en-US" altLang="ko-KR" dirty="0">
-                <a:latin typeface="Cooper Black" panose="020B0604020202020204" pitchFamily="18" charset="0"/>
-              </a:rPr>
-              <a:t>STORE</a:t>
-            </a:r>
-            <a:endParaRPr lang="ko-KR" altLang="en-US" dirty="0">
-              <a:latin typeface="Cooper Black" panose="020B0604020202020204" pitchFamily="18" charset="0"/>
-            </a:endParaRPr>
-          </a:p>
-        </p:txBody>
-      </p:sp>
-      <p:sp>
-        <p:nvSpPr>
-          <p:cNvPr id="11" name="TextBox 10">
-            <a:extLst>
-              <a:ext uri="{FF2B5EF4-FFF2-40B4-BE49-F238E27FC236}">
-                <a16:creationId xmlns:a16="http://schemas.microsoft.com/office/drawing/2014/main" id="{AC23B053-198D-49D2-945C-98E50902D98E}"/>
-              </a:ext>
-            </a:extLst>
-          </p:cNvPr>
-          <p:cNvSpPr txBox="1"/>
-          <p:nvPr/>
-        </p:nvSpPr>
-        <p:spPr>
-          <a:xfrm>
-            <a:off x="2310007" y="3198167"/>
-            <a:ext cx="697563" cy="400110"/>
-          </a:xfrm>
-          <a:prstGeom prst="rect">
-            <a:avLst/>
-          </a:prstGeom>
-          <a:noFill/>
-        </p:spPr>
-        <p:txBody>
-          <a:bodyPr wrap="none" rtlCol="0">
-            <a:spAutoFit/>
-          </a:bodyPr>
-          <a:lstStyle/>
-          <a:p>
-            <a:r>
-              <a:rPr lang="en-US" altLang="ko-KR" sz="2000" b="1" dirty="0">
-                <a:solidFill>
-                  <a:schemeClr val="bg1">
-                    <a:lumMod val="85000"/>
-                  </a:schemeClr>
-                </a:solidFill>
-                <a:latin typeface="Calibri" panose="020F0502020204030204" pitchFamily="34" charset="0"/>
-                <a:cs typeface="Calibri" panose="020F0502020204030204" pitchFamily="34" charset="0"/>
-              </a:rPr>
-              <a:t>PLAY</a:t>
-            </a:r>
-            <a:endParaRPr lang="ko-KR" altLang="en-US" sz="2000" b="1" dirty="0">
-              <a:solidFill>
-                <a:schemeClr val="bg1">
-                  <a:lumMod val="85000"/>
-                </a:schemeClr>
-              </a:solidFill>
-              <a:latin typeface="Calibri" panose="020F0502020204030204" pitchFamily="34" charset="0"/>
-              <a:cs typeface="Calibri" panose="020F0502020204030204" pitchFamily="34" charset="0"/>
-            </a:endParaRPr>
-          </a:p>
-        </p:txBody>
-      </p:sp>
-      <p:sp>
-        <p:nvSpPr>
-          <p:cNvPr id="12" name="TextBox 11">
-            <a:extLst>
-              <a:ext uri="{FF2B5EF4-FFF2-40B4-BE49-F238E27FC236}">
-                <a16:creationId xmlns:a16="http://schemas.microsoft.com/office/drawing/2014/main" id="{E6535514-8E4C-4BFD-ADAC-1F0538529941}"/>
-              </a:ext>
-            </a:extLst>
-          </p:cNvPr>
-          <p:cNvSpPr txBox="1"/>
-          <p:nvPr/>
-        </p:nvSpPr>
-        <p:spPr>
-          <a:xfrm>
-            <a:off x="3712419" y="3198167"/>
-            <a:ext cx="1155509" cy="400110"/>
-          </a:xfrm>
-          <a:prstGeom prst="rect">
-            <a:avLst/>
-          </a:prstGeom>
-          <a:noFill/>
-        </p:spPr>
-        <p:txBody>
-          <a:bodyPr wrap="none" rtlCol="0">
-            <a:spAutoFit/>
-          </a:bodyPr>
-          <a:lstStyle/>
-          <a:p>
-            <a:r>
-              <a:rPr lang="en-US" altLang="ko-KR" sz="2000" b="1" dirty="0">
-                <a:solidFill>
-                  <a:schemeClr val="bg1">
-                    <a:lumMod val="85000"/>
-                  </a:schemeClr>
-                </a:solidFill>
-                <a:latin typeface="Calibri" panose="020F0502020204030204" pitchFamily="34" charset="0"/>
-                <a:cs typeface="Calibri" panose="020F0502020204030204" pitchFamily="34" charset="0"/>
-              </a:rPr>
-              <a:t>LEGENDS</a:t>
-            </a:r>
-            <a:endParaRPr lang="ko-KR" altLang="en-US" sz="2000" b="1" dirty="0">
-              <a:solidFill>
-                <a:schemeClr val="bg1">
-                  <a:lumMod val="85000"/>
-                </a:schemeClr>
-              </a:solidFill>
-              <a:latin typeface="Calibri" panose="020F0502020204030204" pitchFamily="34" charset="0"/>
-              <a:cs typeface="Calibri" panose="020F0502020204030204" pitchFamily="34" charset="0"/>
-            </a:endParaRPr>
-          </a:p>
-        </p:txBody>
-      </p:sp>
-      <p:sp>
-        <p:nvSpPr>
-          <p:cNvPr id="13" name="TextBox 12">
-            <a:extLst>
-              <a:ext uri="{FF2B5EF4-FFF2-40B4-BE49-F238E27FC236}">
-                <a16:creationId xmlns:a16="http://schemas.microsoft.com/office/drawing/2014/main" id="{D1730865-6F48-480F-A293-24AEAD463D15}"/>
-              </a:ext>
-            </a:extLst>
-          </p:cNvPr>
-          <p:cNvSpPr txBox="1"/>
-          <p:nvPr/>
-        </p:nvSpPr>
-        <p:spPr>
-          <a:xfrm>
-            <a:off x="5270133" y="3198167"/>
-            <a:ext cx="851515" cy="400110"/>
-          </a:xfrm>
-          <a:prstGeom prst="rect">
-            <a:avLst/>
-          </a:prstGeom>
-          <a:noFill/>
-        </p:spPr>
-        <p:txBody>
-          <a:bodyPr wrap="none" rtlCol="0">
-            <a:spAutoFit/>
-          </a:bodyPr>
-          <a:lstStyle/>
-          <a:p>
-            <a:r>
-              <a:rPr lang="en-US" altLang="ko-KR" sz="2000" b="1" dirty="0">
-                <a:solidFill>
-                  <a:schemeClr val="bg1">
-                    <a:lumMod val="85000"/>
-                  </a:schemeClr>
-                </a:solidFill>
-                <a:latin typeface="Calibri" panose="020F0502020204030204" pitchFamily="34" charset="0"/>
-                <a:cs typeface="Calibri" panose="020F0502020204030204" pitchFamily="34" charset="0"/>
-              </a:rPr>
-              <a:t>ITEMS</a:t>
-            </a:r>
-            <a:endParaRPr lang="ko-KR" altLang="en-US" b="1" dirty="0">
-              <a:solidFill>
-                <a:schemeClr val="bg1">
-                  <a:lumMod val="85000"/>
-                </a:schemeClr>
-              </a:solidFill>
-              <a:latin typeface="Calibri" panose="020F0502020204030204" pitchFamily="34" charset="0"/>
-              <a:cs typeface="Calibri" panose="020F0502020204030204" pitchFamily="34" charset="0"/>
-            </a:endParaRPr>
-          </a:p>
-        </p:txBody>
-      </p:sp>
-      <p:sp>
-        <p:nvSpPr>
-          <p:cNvPr id="14" name="TextBox 13">
-            <a:extLst>
-              <a:ext uri="{FF2B5EF4-FFF2-40B4-BE49-F238E27FC236}">
-                <a16:creationId xmlns:a16="http://schemas.microsoft.com/office/drawing/2014/main" id="{D3941BC2-E88B-4396-8986-9D856FF999D3}"/>
-              </a:ext>
-            </a:extLst>
-          </p:cNvPr>
-          <p:cNvSpPr txBox="1"/>
-          <p:nvPr/>
-        </p:nvSpPr>
-        <p:spPr>
-          <a:xfrm>
-            <a:off x="6749520" y="3188314"/>
-            <a:ext cx="866199" cy="400110"/>
-          </a:xfrm>
-          <a:prstGeom prst="rect">
-            <a:avLst/>
-          </a:prstGeom>
-          <a:noFill/>
-        </p:spPr>
-        <p:txBody>
-          <a:bodyPr wrap="none" rtlCol="0">
-            <a:spAutoFit/>
-          </a:bodyPr>
-          <a:lstStyle/>
-          <a:p>
-            <a:r>
-              <a:rPr lang="en-US" altLang="ko-KR" sz="2000" b="1" dirty="0">
-                <a:solidFill>
-                  <a:schemeClr val="bg1">
-                    <a:lumMod val="85000"/>
-                  </a:schemeClr>
-                </a:solidFill>
-                <a:latin typeface="Calibri" panose="020F0502020204030204" pitchFamily="34" charset="0"/>
-                <a:cs typeface="Calibri" panose="020F0502020204030204" pitchFamily="34" charset="0"/>
-              </a:rPr>
-              <a:t>STORE</a:t>
-            </a:r>
-            <a:endParaRPr lang="ko-KR" altLang="en-US" b="1" dirty="0">
-              <a:solidFill>
-                <a:schemeClr val="bg1">
-                  <a:lumMod val="85000"/>
-                </a:schemeClr>
-              </a:solidFill>
-              <a:latin typeface="Calibri" panose="020F0502020204030204" pitchFamily="34" charset="0"/>
-              <a:cs typeface="Calibri" panose="020F0502020204030204" pitchFamily="34" charset="0"/>
-            </a:endParaRPr>
-          </a:p>
-        </p:txBody>
-      </p:sp>
-      <p:sp>
-        <p:nvSpPr>
-          <p:cNvPr id="15" name="TextBox 14">
-            <a:extLst>
-              <a:ext uri="{FF2B5EF4-FFF2-40B4-BE49-F238E27FC236}">
-                <a16:creationId xmlns:a16="http://schemas.microsoft.com/office/drawing/2014/main" id="{D98C9B6A-888D-4F62-ACC5-210E69B867A5}"/>
-              </a:ext>
-            </a:extLst>
-          </p:cNvPr>
-          <p:cNvSpPr txBox="1"/>
-          <p:nvPr/>
-        </p:nvSpPr>
-        <p:spPr>
-          <a:xfrm>
-            <a:off x="2310006" y="4068856"/>
-            <a:ext cx="834396" cy="400110"/>
-          </a:xfrm>
-          <a:prstGeom prst="rect">
-            <a:avLst/>
-          </a:prstGeom>
-          <a:noFill/>
-        </p:spPr>
-        <p:txBody>
-          <a:bodyPr wrap="none" rtlCol="0">
-            <a:spAutoFit/>
-          </a:bodyPr>
-          <a:lstStyle/>
-          <a:p>
-            <a:r>
-              <a:rPr lang="en-US" altLang="ko-KR" sz="2000" b="1" dirty="0">
-                <a:solidFill>
-                  <a:schemeClr val="bg1">
-                    <a:lumMod val="85000"/>
-                  </a:schemeClr>
-                </a:solidFill>
-                <a:latin typeface="Calibri" panose="020F0502020204030204" pitchFamily="34" charset="0"/>
-                <a:cs typeface="Calibri" panose="020F0502020204030204" pitchFamily="34" charset="0"/>
-              </a:rPr>
-              <a:t>START</a:t>
-            </a:r>
-            <a:endParaRPr lang="ko-KR" altLang="en-US" sz="2000" b="1" dirty="0">
-              <a:solidFill>
-                <a:schemeClr val="bg1">
-                  <a:lumMod val="85000"/>
-                </a:schemeClr>
-              </a:solidFill>
-              <a:latin typeface="Calibri" panose="020F0502020204030204" pitchFamily="34" charset="0"/>
-              <a:cs typeface="Calibri" panose="020F0502020204030204" pitchFamily="34" charset="0"/>
-            </a:endParaRPr>
-          </a:p>
-        </p:txBody>
-      </p:sp>
-    </p:spTree>
-    <p:extLst>
-      <p:ext uri="{BB962C8B-B14F-4D97-AF65-F5344CB8AC3E}">
-        <p14:creationId xmlns:p14="http://schemas.microsoft.com/office/powerpoint/2010/main" val="531432603"/>
       </p:ext>
     </p:extLst>
   </p:cSld>

</xml_diff>

<commit_message>
Button UI in Stage Scene and WinLose
</commit_message>
<xml_diff>
--- a/Projects/SW_Design/UI/UI_design.pptx
+++ b/Projects/SW_Design/UI/UI_design.pptx
@@ -274,7 +274,7 @@
           <a:p>
             <a:fld id="{EB44E886-23E1-4ADA-9C75-D80585AEE320}" type="datetimeFigureOut">
               <a:rPr lang="ko-KR" altLang="en-US" smtClean="0"/>
-              <a:t>2019-11-13</a:t>
+              <a:t>2019-11-14</a:t>
             </a:fld>
             <a:endParaRPr lang="ko-KR" altLang="en-US"/>
           </a:p>
@@ -472,7 +472,7 @@
           <a:p>
             <a:fld id="{EB44E886-23E1-4ADA-9C75-D80585AEE320}" type="datetimeFigureOut">
               <a:rPr lang="ko-KR" altLang="en-US" smtClean="0"/>
-              <a:t>2019-11-13</a:t>
+              <a:t>2019-11-14</a:t>
             </a:fld>
             <a:endParaRPr lang="ko-KR" altLang="en-US"/>
           </a:p>
@@ -680,7 +680,7 @@
           <a:p>
             <a:fld id="{EB44E886-23E1-4ADA-9C75-D80585AEE320}" type="datetimeFigureOut">
               <a:rPr lang="ko-KR" altLang="en-US" smtClean="0"/>
-              <a:t>2019-11-13</a:t>
+              <a:t>2019-11-14</a:t>
             </a:fld>
             <a:endParaRPr lang="ko-KR" altLang="en-US"/>
           </a:p>
@@ -878,7 +878,7 @@
           <a:p>
             <a:fld id="{EB44E886-23E1-4ADA-9C75-D80585AEE320}" type="datetimeFigureOut">
               <a:rPr lang="ko-KR" altLang="en-US" smtClean="0"/>
-              <a:t>2019-11-13</a:t>
+              <a:t>2019-11-14</a:t>
             </a:fld>
             <a:endParaRPr lang="ko-KR" altLang="en-US"/>
           </a:p>
@@ -1153,7 +1153,7 @@
           <a:p>
             <a:fld id="{EB44E886-23E1-4ADA-9C75-D80585AEE320}" type="datetimeFigureOut">
               <a:rPr lang="ko-KR" altLang="en-US" smtClean="0"/>
-              <a:t>2019-11-13</a:t>
+              <a:t>2019-11-14</a:t>
             </a:fld>
             <a:endParaRPr lang="ko-KR" altLang="en-US"/>
           </a:p>
@@ -1418,7 +1418,7 @@
           <a:p>
             <a:fld id="{EB44E886-23E1-4ADA-9C75-D80585AEE320}" type="datetimeFigureOut">
               <a:rPr lang="ko-KR" altLang="en-US" smtClean="0"/>
-              <a:t>2019-11-13</a:t>
+              <a:t>2019-11-14</a:t>
             </a:fld>
             <a:endParaRPr lang="ko-KR" altLang="en-US"/>
           </a:p>
@@ -1830,7 +1830,7 @@
           <a:p>
             <a:fld id="{EB44E886-23E1-4ADA-9C75-D80585AEE320}" type="datetimeFigureOut">
               <a:rPr lang="ko-KR" altLang="en-US" smtClean="0"/>
-              <a:t>2019-11-13</a:t>
+              <a:t>2019-11-14</a:t>
             </a:fld>
             <a:endParaRPr lang="ko-KR" altLang="en-US"/>
           </a:p>
@@ -1971,7 +1971,7 @@
           <a:p>
             <a:fld id="{EB44E886-23E1-4ADA-9C75-D80585AEE320}" type="datetimeFigureOut">
               <a:rPr lang="ko-KR" altLang="en-US" smtClean="0"/>
-              <a:t>2019-11-13</a:t>
+              <a:t>2019-11-14</a:t>
             </a:fld>
             <a:endParaRPr lang="ko-KR" altLang="en-US"/>
           </a:p>
@@ -2084,7 +2084,7 @@
           <a:p>
             <a:fld id="{EB44E886-23E1-4ADA-9C75-D80585AEE320}" type="datetimeFigureOut">
               <a:rPr lang="ko-KR" altLang="en-US" smtClean="0"/>
-              <a:t>2019-11-13</a:t>
+              <a:t>2019-11-14</a:t>
             </a:fld>
             <a:endParaRPr lang="ko-KR" altLang="en-US"/>
           </a:p>
@@ -2395,7 +2395,7 @@
           <a:p>
             <a:fld id="{EB44E886-23E1-4ADA-9C75-D80585AEE320}" type="datetimeFigureOut">
               <a:rPr lang="ko-KR" altLang="en-US" smtClean="0"/>
-              <a:t>2019-11-13</a:t>
+              <a:t>2019-11-14</a:t>
             </a:fld>
             <a:endParaRPr lang="ko-KR" altLang="en-US"/>
           </a:p>
@@ -2683,7 +2683,7 @@
           <a:p>
             <a:fld id="{EB44E886-23E1-4ADA-9C75-D80585AEE320}" type="datetimeFigureOut">
               <a:rPr lang="ko-KR" altLang="en-US" smtClean="0"/>
-              <a:t>2019-11-13</a:t>
+              <a:t>2019-11-14</a:t>
             </a:fld>
             <a:endParaRPr lang="ko-KR" altLang="en-US"/>
           </a:p>
@@ -2924,7 +2924,7 @@
           <a:p>
             <a:fld id="{EB44E886-23E1-4ADA-9C75-D80585AEE320}" type="datetimeFigureOut">
               <a:rPr lang="ko-KR" altLang="en-US" smtClean="0"/>
-              <a:t>2019-11-13</a:t>
+              <a:t>2019-11-14</a:t>
             </a:fld>
             <a:endParaRPr lang="ko-KR" altLang="en-US"/>
           </a:p>
@@ -14249,6 +14249,138 @@
           </a:p>
         </p:txBody>
       </p:sp>
+      <p:sp>
+        <p:nvSpPr>
+          <p:cNvPr id="27" name="TextBox 26">
+            <a:extLst>
+              <a:ext uri="{FF2B5EF4-FFF2-40B4-BE49-F238E27FC236}">
+                <a16:creationId xmlns:a16="http://schemas.microsoft.com/office/drawing/2014/main" id="{7F49495D-F586-44ED-8B5D-3A46E7D6062B}"/>
+              </a:ext>
+            </a:extLst>
+          </p:cNvPr>
+          <p:cNvSpPr txBox="1"/>
+          <p:nvPr/>
+        </p:nvSpPr>
+        <p:spPr>
+          <a:xfrm>
+            <a:off x="2041086" y="5803017"/>
+            <a:ext cx="1146917" cy="707886"/>
+          </a:xfrm>
+          <a:prstGeom prst="rect">
+            <a:avLst/>
+          </a:prstGeom>
+          <a:noFill/>
+        </p:spPr>
+        <p:txBody>
+          <a:bodyPr wrap="none" rtlCol="0">
+            <a:spAutoFit/>
+          </a:bodyPr>
+          <a:lstStyle/>
+          <a:p>
+            <a:r>
+              <a:rPr lang="en-US" altLang="ko-KR" sz="2000" b="1" dirty="0" smtClean="0">
+                <a:solidFill>
+                  <a:schemeClr val="bg1">
+                    <a:lumMod val="85000"/>
+                  </a:schemeClr>
+                </a:solidFill>
+                <a:latin typeface="Calibri" panose="020F0502020204030204" pitchFamily="34" charset="0"/>
+                <a:cs typeface="Calibri" panose="020F0502020204030204" pitchFamily="34" charset="0"/>
+              </a:rPr>
+              <a:t>DAGGER </a:t>
+            </a:r>
+          </a:p>
+          <a:p>
+            <a:r>
+              <a:rPr lang="en-US" altLang="ko-KR" sz="2000" b="1" dirty="0" smtClean="0">
+                <a:solidFill>
+                  <a:schemeClr val="bg1">
+                    <a:lumMod val="85000"/>
+                  </a:schemeClr>
+                </a:solidFill>
+                <a:latin typeface="Calibri" panose="020F0502020204030204" pitchFamily="34" charset="0"/>
+                <a:cs typeface="Calibri" panose="020F0502020204030204" pitchFamily="34" charset="0"/>
+              </a:rPr>
+              <a:t>STRIKE</a:t>
+            </a:r>
+            <a:endParaRPr lang="ko-KR" altLang="en-US" sz="2000" b="1" dirty="0">
+              <a:solidFill>
+                <a:schemeClr val="bg1">
+                  <a:lumMod val="85000"/>
+                </a:schemeClr>
+              </a:solidFill>
+              <a:latin typeface="Calibri" panose="020F0502020204030204" pitchFamily="34" charset="0"/>
+              <a:cs typeface="Calibri" panose="020F0502020204030204" pitchFamily="34" charset="0"/>
+            </a:endParaRPr>
+          </a:p>
+        </p:txBody>
+      </p:sp>
+      <p:sp>
+        <p:nvSpPr>
+          <p:cNvPr id="28" name="TextBox 27">
+            <a:extLst>
+              <a:ext uri="{FF2B5EF4-FFF2-40B4-BE49-F238E27FC236}">
+                <a16:creationId xmlns:a16="http://schemas.microsoft.com/office/drawing/2014/main" id="{7F49495D-F586-44ED-8B5D-3A46E7D6062B}"/>
+              </a:ext>
+            </a:extLst>
+          </p:cNvPr>
+          <p:cNvSpPr txBox="1"/>
+          <p:nvPr/>
+        </p:nvSpPr>
+        <p:spPr>
+          <a:xfrm>
+            <a:off x="3276489" y="5803017"/>
+            <a:ext cx="1303242" cy="707886"/>
+          </a:xfrm>
+          <a:prstGeom prst="rect">
+            <a:avLst/>
+          </a:prstGeom>
+          <a:noFill/>
+        </p:spPr>
+        <p:txBody>
+          <a:bodyPr wrap="none" rtlCol="0">
+            <a:spAutoFit/>
+          </a:bodyPr>
+          <a:lstStyle/>
+          <a:p>
+            <a:r>
+              <a:rPr lang="en-US" altLang="ko-KR" sz="2000" b="1" dirty="0" smtClean="0">
+                <a:solidFill>
+                  <a:schemeClr val="bg1">
+                    <a:lumMod val="85000"/>
+                  </a:schemeClr>
+                </a:solidFill>
+                <a:latin typeface="Calibri" panose="020F0502020204030204" pitchFamily="34" charset="0"/>
+                <a:cs typeface="Calibri" panose="020F0502020204030204" pitchFamily="34" charset="0"/>
+              </a:rPr>
+              <a:t>SELF</a:t>
+            </a:r>
+          </a:p>
+          <a:p>
+            <a:r>
+              <a:rPr lang="en-US" altLang="ko-KR" sz="2000" b="1" dirty="0" smtClean="0">
+                <a:solidFill>
+                  <a:schemeClr val="bg1">
+                    <a:lumMod val="85000"/>
+                  </a:schemeClr>
+                </a:solidFill>
+                <a:latin typeface="Calibri" panose="020F0502020204030204" pitchFamily="34" charset="0"/>
+                <a:cs typeface="Calibri" panose="020F0502020204030204" pitchFamily="34" charset="0"/>
+              </a:rPr>
+              <a:t>RECOVERY</a:t>
+            </a:r>
+            <a:endParaRPr lang="ko-KR" altLang="en-US" sz="2000" b="1" dirty="0">
+              <a:solidFill>
+                <a:schemeClr val="bg1">
+                  <a:lumMod val="85000"/>
+                </a:schemeClr>
+              </a:solidFill>
+              <a:latin typeface="Calibri" panose="020F0502020204030204" pitchFamily="34" charset="0"/>
+              <a:cs typeface="Calibri" panose="020F0502020204030204" pitchFamily="34" charset="0"/>
+            </a:endParaRPr>
+          </a:p>
+        </p:txBody>
+      </p:sp>
     </p:spTree>
     <p:extLst>
       <p:ext uri="{BB962C8B-B14F-4D97-AF65-F5344CB8AC3E}">
@@ -16948,6 +17080,52 @@
             <a:ext cx="221524" cy="214784"/>
           </a:xfrm>
           <a:prstGeom prst="corner">
+            <a:avLst/>
+          </a:prstGeom>
+          <a:solidFill>
+            <a:srgbClr val="EE7E22"/>
+          </a:solidFill>
+          <a:ln>
+            <a:noFill/>
+          </a:ln>
+        </p:spPr>
+        <p:style>
+          <a:lnRef idx="2">
+            <a:schemeClr val="accent1">
+              <a:shade val="50000"/>
+            </a:schemeClr>
+          </a:lnRef>
+          <a:fillRef idx="1">
+            <a:schemeClr val="accent1"/>
+          </a:fillRef>
+          <a:effectRef idx="0">
+            <a:schemeClr val="accent1"/>
+          </a:effectRef>
+          <a:fontRef idx="minor">
+            <a:schemeClr val="lt1"/>
+          </a:fontRef>
+        </p:style>
+        <p:txBody>
+          <a:bodyPr rtlCol="0" anchor="ctr"/>
+          <a:lstStyle/>
+          <a:p>
+            <a:pPr algn="ctr"/>
+            <a:endParaRPr lang="en-US"/>
+          </a:p>
+        </p:txBody>
+      </p:sp>
+      <p:sp>
+        <p:nvSpPr>
+          <p:cNvPr id="3" name="Parallelogram 2"/>
+          <p:cNvSpPr/>
+          <p:nvPr/>
+        </p:nvSpPr>
+        <p:spPr>
+          <a:xfrm>
+            <a:off x="856211" y="4386351"/>
+            <a:ext cx="2394065" cy="277089"/>
+          </a:xfrm>
+          <a:prstGeom prst="parallelogram">
             <a:avLst/>
           </a:prstGeom>
           <a:solidFill>

</xml_diff>

<commit_message>
Added Gold, Gems UI and Created Store Scene
</commit_message>
<xml_diff>
--- a/Projects/SW_Design/UI/UI_design.pptx
+++ b/Projects/SW_Design/UI/UI_design.pptx
@@ -274,7 +274,7 @@
           <a:p>
             <a:fld id="{EB44E886-23E1-4ADA-9C75-D80585AEE320}" type="datetimeFigureOut">
               <a:rPr lang="ko-KR" altLang="en-US" smtClean="0"/>
-              <a:t>2019-11-14</a:t>
+              <a:t>2019-11-15</a:t>
             </a:fld>
             <a:endParaRPr lang="ko-KR" altLang="en-US"/>
           </a:p>
@@ -472,7 +472,7 @@
           <a:p>
             <a:fld id="{EB44E886-23E1-4ADA-9C75-D80585AEE320}" type="datetimeFigureOut">
               <a:rPr lang="ko-KR" altLang="en-US" smtClean="0"/>
-              <a:t>2019-11-14</a:t>
+              <a:t>2019-11-15</a:t>
             </a:fld>
             <a:endParaRPr lang="ko-KR" altLang="en-US"/>
           </a:p>
@@ -680,7 +680,7 @@
           <a:p>
             <a:fld id="{EB44E886-23E1-4ADA-9C75-D80585AEE320}" type="datetimeFigureOut">
               <a:rPr lang="ko-KR" altLang="en-US" smtClean="0"/>
-              <a:t>2019-11-14</a:t>
+              <a:t>2019-11-15</a:t>
             </a:fld>
             <a:endParaRPr lang="ko-KR" altLang="en-US"/>
           </a:p>
@@ -878,7 +878,7 @@
           <a:p>
             <a:fld id="{EB44E886-23E1-4ADA-9C75-D80585AEE320}" type="datetimeFigureOut">
               <a:rPr lang="ko-KR" altLang="en-US" smtClean="0"/>
-              <a:t>2019-11-14</a:t>
+              <a:t>2019-11-15</a:t>
             </a:fld>
             <a:endParaRPr lang="ko-KR" altLang="en-US"/>
           </a:p>
@@ -1153,7 +1153,7 @@
           <a:p>
             <a:fld id="{EB44E886-23E1-4ADA-9C75-D80585AEE320}" type="datetimeFigureOut">
               <a:rPr lang="ko-KR" altLang="en-US" smtClean="0"/>
-              <a:t>2019-11-14</a:t>
+              <a:t>2019-11-15</a:t>
             </a:fld>
             <a:endParaRPr lang="ko-KR" altLang="en-US"/>
           </a:p>
@@ -1418,7 +1418,7 @@
           <a:p>
             <a:fld id="{EB44E886-23E1-4ADA-9C75-D80585AEE320}" type="datetimeFigureOut">
               <a:rPr lang="ko-KR" altLang="en-US" smtClean="0"/>
-              <a:t>2019-11-14</a:t>
+              <a:t>2019-11-15</a:t>
             </a:fld>
             <a:endParaRPr lang="ko-KR" altLang="en-US"/>
           </a:p>
@@ -1830,7 +1830,7 @@
           <a:p>
             <a:fld id="{EB44E886-23E1-4ADA-9C75-D80585AEE320}" type="datetimeFigureOut">
               <a:rPr lang="ko-KR" altLang="en-US" smtClean="0"/>
-              <a:t>2019-11-14</a:t>
+              <a:t>2019-11-15</a:t>
             </a:fld>
             <a:endParaRPr lang="ko-KR" altLang="en-US"/>
           </a:p>
@@ -1971,7 +1971,7 @@
           <a:p>
             <a:fld id="{EB44E886-23E1-4ADA-9C75-D80585AEE320}" type="datetimeFigureOut">
               <a:rPr lang="ko-KR" altLang="en-US" smtClean="0"/>
-              <a:t>2019-11-14</a:t>
+              <a:t>2019-11-15</a:t>
             </a:fld>
             <a:endParaRPr lang="ko-KR" altLang="en-US"/>
           </a:p>
@@ -2084,7 +2084,7 @@
           <a:p>
             <a:fld id="{EB44E886-23E1-4ADA-9C75-D80585AEE320}" type="datetimeFigureOut">
               <a:rPr lang="ko-KR" altLang="en-US" smtClean="0"/>
-              <a:t>2019-11-14</a:t>
+              <a:t>2019-11-15</a:t>
             </a:fld>
             <a:endParaRPr lang="ko-KR" altLang="en-US"/>
           </a:p>
@@ -2395,7 +2395,7 @@
           <a:p>
             <a:fld id="{EB44E886-23E1-4ADA-9C75-D80585AEE320}" type="datetimeFigureOut">
               <a:rPr lang="ko-KR" altLang="en-US" smtClean="0"/>
-              <a:t>2019-11-14</a:t>
+              <a:t>2019-11-15</a:t>
             </a:fld>
             <a:endParaRPr lang="ko-KR" altLang="en-US"/>
           </a:p>
@@ -2683,7 +2683,7 @@
           <a:p>
             <a:fld id="{EB44E886-23E1-4ADA-9C75-D80585AEE320}" type="datetimeFigureOut">
               <a:rPr lang="ko-KR" altLang="en-US" smtClean="0"/>
-              <a:t>2019-11-14</a:t>
+              <a:t>2019-11-15</a:t>
             </a:fld>
             <a:endParaRPr lang="ko-KR" altLang="en-US"/>
           </a:p>
@@ -2924,7 +2924,7 @@
           <a:p>
             <a:fld id="{EB44E886-23E1-4ADA-9C75-D80585AEE320}" type="datetimeFigureOut">
               <a:rPr lang="ko-KR" altLang="en-US" smtClean="0"/>
-              <a:t>2019-11-14</a:t>
+              <a:t>2019-11-15</a:t>
             </a:fld>
             <a:endParaRPr lang="ko-KR" altLang="en-US"/>
           </a:p>
@@ -14278,7 +14278,7 @@
           <a:lstStyle/>
           <a:p>
             <a:r>
-              <a:rPr lang="en-US" altLang="ko-KR" sz="2000" b="1" dirty="0" smtClean="0">
+              <a:rPr lang="en-US" altLang="ko-KR" sz="2000" b="1" dirty="0">
                 <a:solidFill>
                   <a:schemeClr val="bg1">
                     <a:lumMod val="85000"/>
@@ -14292,7 +14292,7 @@
           </a:p>
           <a:p>
             <a:r>
-              <a:rPr lang="en-US" altLang="ko-KR" sz="2000" b="1" dirty="0" smtClean="0">
+              <a:rPr lang="en-US" altLang="ko-KR" sz="2000" b="1" dirty="0">
                 <a:solidFill>
                   <a:schemeClr val="bg1">
                     <a:lumMod val="85000"/>
@@ -14344,7 +14344,7 @@
           <a:lstStyle/>
           <a:p>
             <a:r>
-              <a:rPr lang="en-US" altLang="ko-KR" sz="2000" b="1" dirty="0" smtClean="0">
+              <a:rPr lang="en-US" altLang="ko-KR" sz="2000" b="1" dirty="0">
                 <a:solidFill>
                   <a:schemeClr val="bg1">
                     <a:lumMod val="85000"/>
@@ -14358,7 +14358,7 @@
           </a:p>
           <a:p>
             <a:r>
-              <a:rPr lang="en-US" altLang="ko-KR" sz="2000" b="1" dirty="0" smtClean="0">
+              <a:rPr lang="en-US" altLang="ko-KR" sz="2000" b="1" dirty="0">
                 <a:solidFill>
                   <a:schemeClr val="bg1">
                     <a:lumMod val="85000"/>
@@ -14368,6 +14368,110 @@
                 <a:cs typeface="Calibri" panose="020F0502020204030204" pitchFamily="34" charset="0"/>
               </a:rPr>
               <a:t>RECOVERY</a:t>
+            </a:r>
+            <a:endParaRPr lang="ko-KR" altLang="en-US" sz="2000" b="1" dirty="0">
+              <a:solidFill>
+                <a:schemeClr val="bg1">
+                  <a:lumMod val="85000"/>
+                </a:schemeClr>
+              </a:solidFill>
+              <a:latin typeface="Calibri" panose="020F0502020204030204" pitchFamily="34" charset="0"/>
+              <a:cs typeface="Calibri" panose="020F0502020204030204" pitchFamily="34" charset="0"/>
+            </a:endParaRPr>
+          </a:p>
+        </p:txBody>
+      </p:sp>
+      <p:sp>
+        <p:nvSpPr>
+          <p:cNvPr id="29" name="TextBox 28">
+            <a:extLst>
+              <a:ext uri="{FF2B5EF4-FFF2-40B4-BE49-F238E27FC236}">
+                <a16:creationId xmlns:a16="http://schemas.microsoft.com/office/drawing/2014/main" id="{2BD0FD6E-F2E1-4F1C-A5E3-6FC0FA9E7CDC}"/>
+              </a:ext>
+            </a:extLst>
+          </p:cNvPr>
+          <p:cNvSpPr txBox="1"/>
+          <p:nvPr/>
+        </p:nvSpPr>
+        <p:spPr>
+          <a:xfrm>
+            <a:off x="1995627" y="1862807"/>
+            <a:ext cx="792205" cy="400110"/>
+          </a:xfrm>
+          <a:prstGeom prst="rect">
+            <a:avLst/>
+          </a:prstGeom>
+          <a:noFill/>
+        </p:spPr>
+        <p:txBody>
+          <a:bodyPr wrap="none" rtlCol="0">
+            <a:spAutoFit/>
+          </a:bodyPr>
+          <a:lstStyle/>
+          <a:p>
+            <a:r>
+              <a:rPr lang="en-US" altLang="ko-KR" sz="2000" b="1" dirty="0">
+                <a:solidFill>
+                  <a:schemeClr val="bg1">
+                    <a:lumMod val="85000"/>
+                  </a:schemeClr>
+                </a:solidFill>
+                <a:latin typeface="Calibri" panose="020F0502020204030204" pitchFamily="34" charset="0"/>
+                <a:cs typeface="Calibri" panose="020F0502020204030204" pitchFamily="34" charset="0"/>
+              </a:rPr>
+              <a:t>GOLD</a:t>
+            </a:r>
+            <a:endParaRPr lang="ko-KR" altLang="en-US" sz="2000" b="1" dirty="0">
+              <a:solidFill>
+                <a:schemeClr val="bg1">
+                  <a:lumMod val="85000"/>
+                </a:schemeClr>
+              </a:solidFill>
+              <a:latin typeface="Calibri" panose="020F0502020204030204" pitchFamily="34" charset="0"/>
+              <a:cs typeface="Calibri" panose="020F0502020204030204" pitchFamily="34" charset="0"/>
+            </a:endParaRPr>
+          </a:p>
+        </p:txBody>
+      </p:sp>
+      <p:sp>
+        <p:nvSpPr>
+          <p:cNvPr id="30" name="TextBox 29">
+            <a:extLst>
+              <a:ext uri="{FF2B5EF4-FFF2-40B4-BE49-F238E27FC236}">
+                <a16:creationId xmlns:a16="http://schemas.microsoft.com/office/drawing/2014/main" id="{B7BA7FB0-1F30-42CD-87E2-F406B937A0C5}"/>
+              </a:ext>
+            </a:extLst>
+          </p:cNvPr>
+          <p:cNvSpPr txBox="1"/>
+          <p:nvPr/>
+        </p:nvSpPr>
+        <p:spPr>
+          <a:xfrm>
+            <a:off x="3117317" y="1872895"/>
+            <a:ext cx="819455" cy="400110"/>
+          </a:xfrm>
+          <a:prstGeom prst="rect">
+            <a:avLst/>
+          </a:prstGeom>
+          <a:noFill/>
+        </p:spPr>
+        <p:txBody>
+          <a:bodyPr wrap="none" rtlCol="0">
+            <a:spAutoFit/>
+          </a:bodyPr>
+          <a:lstStyle/>
+          <a:p>
+            <a:r>
+              <a:rPr lang="en-US" altLang="ko-KR" sz="2000" b="1" dirty="0">
+                <a:solidFill>
+                  <a:schemeClr val="bg1">
+                    <a:lumMod val="85000"/>
+                  </a:schemeClr>
+                </a:solidFill>
+                <a:latin typeface="Calibri" panose="020F0502020204030204" pitchFamily="34" charset="0"/>
+                <a:cs typeface="Calibri" panose="020F0502020204030204" pitchFamily="34" charset="0"/>
+              </a:rPr>
+              <a:t>GEMS</a:t>
             </a:r>
             <a:endParaRPr lang="ko-KR" altLang="en-US" sz="2000" b="1" dirty="0">
               <a:solidFill>

</xml_diff>

<commit_message>
Added Gem and interactive Gold with User
</commit_message>
<xml_diff>
--- a/Projects/SW_Design/UI/UI_design.pptx
+++ b/Projects/SW_Design/UI/UI_design.pptx
@@ -18,12 +18,13 @@
     <p:sldId id="266" r:id="rId12"/>
     <p:sldId id="269" r:id="rId13"/>
     <p:sldId id="270" r:id="rId14"/>
-    <p:sldId id="263" r:id="rId15"/>
-    <p:sldId id="264" r:id="rId16"/>
-    <p:sldId id="271" r:id="rId17"/>
-    <p:sldId id="272" r:id="rId18"/>
-    <p:sldId id="273" r:id="rId19"/>
-    <p:sldId id="274" r:id="rId20"/>
+    <p:sldId id="275" r:id="rId15"/>
+    <p:sldId id="263" r:id="rId16"/>
+    <p:sldId id="264" r:id="rId17"/>
+    <p:sldId id="271" r:id="rId18"/>
+    <p:sldId id="272" r:id="rId19"/>
+    <p:sldId id="273" r:id="rId20"/>
+    <p:sldId id="274" r:id="rId21"/>
   </p:sldIdLst>
   <p:sldSz cx="12192000" cy="6858000"/>
   <p:notesSz cx="6858000" cy="9144000"/>
@@ -277,7 +278,7 @@
           <a:p>
             <a:fld id="{EB44E886-23E1-4ADA-9C75-D80585AEE320}" type="datetimeFigureOut">
               <a:rPr lang="ko-KR" altLang="en-US" smtClean="0"/>
-              <a:t>2019-11-19</a:t>
+              <a:t>2019-11-21</a:t>
             </a:fld>
             <a:endParaRPr lang="ko-KR" altLang="en-US"/>
           </a:p>
@@ -475,7 +476,7 @@
           <a:p>
             <a:fld id="{EB44E886-23E1-4ADA-9C75-D80585AEE320}" type="datetimeFigureOut">
               <a:rPr lang="ko-KR" altLang="en-US" smtClean="0"/>
-              <a:t>2019-11-19</a:t>
+              <a:t>2019-11-21</a:t>
             </a:fld>
             <a:endParaRPr lang="ko-KR" altLang="en-US"/>
           </a:p>
@@ -683,7 +684,7 @@
           <a:p>
             <a:fld id="{EB44E886-23E1-4ADA-9C75-D80585AEE320}" type="datetimeFigureOut">
               <a:rPr lang="ko-KR" altLang="en-US" smtClean="0"/>
-              <a:t>2019-11-19</a:t>
+              <a:t>2019-11-21</a:t>
             </a:fld>
             <a:endParaRPr lang="ko-KR" altLang="en-US"/>
           </a:p>
@@ -881,7 +882,7 @@
           <a:p>
             <a:fld id="{EB44E886-23E1-4ADA-9C75-D80585AEE320}" type="datetimeFigureOut">
               <a:rPr lang="ko-KR" altLang="en-US" smtClean="0"/>
-              <a:t>2019-11-19</a:t>
+              <a:t>2019-11-21</a:t>
             </a:fld>
             <a:endParaRPr lang="ko-KR" altLang="en-US"/>
           </a:p>
@@ -1156,7 +1157,7 @@
           <a:p>
             <a:fld id="{EB44E886-23E1-4ADA-9C75-D80585AEE320}" type="datetimeFigureOut">
               <a:rPr lang="ko-KR" altLang="en-US" smtClean="0"/>
-              <a:t>2019-11-19</a:t>
+              <a:t>2019-11-21</a:t>
             </a:fld>
             <a:endParaRPr lang="ko-KR" altLang="en-US"/>
           </a:p>
@@ -1421,7 +1422,7 @@
           <a:p>
             <a:fld id="{EB44E886-23E1-4ADA-9C75-D80585AEE320}" type="datetimeFigureOut">
               <a:rPr lang="ko-KR" altLang="en-US" smtClean="0"/>
-              <a:t>2019-11-19</a:t>
+              <a:t>2019-11-21</a:t>
             </a:fld>
             <a:endParaRPr lang="ko-KR" altLang="en-US"/>
           </a:p>
@@ -1833,7 +1834,7 @@
           <a:p>
             <a:fld id="{EB44E886-23E1-4ADA-9C75-D80585AEE320}" type="datetimeFigureOut">
               <a:rPr lang="ko-KR" altLang="en-US" smtClean="0"/>
-              <a:t>2019-11-19</a:t>
+              <a:t>2019-11-21</a:t>
             </a:fld>
             <a:endParaRPr lang="ko-KR" altLang="en-US"/>
           </a:p>
@@ -1974,7 +1975,7 @@
           <a:p>
             <a:fld id="{EB44E886-23E1-4ADA-9C75-D80585AEE320}" type="datetimeFigureOut">
               <a:rPr lang="ko-KR" altLang="en-US" smtClean="0"/>
-              <a:t>2019-11-19</a:t>
+              <a:t>2019-11-21</a:t>
             </a:fld>
             <a:endParaRPr lang="ko-KR" altLang="en-US"/>
           </a:p>
@@ -2087,7 +2088,7 @@
           <a:p>
             <a:fld id="{EB44E886-23E1-4ADA-9C75-D80585AEE320}" type="datetimeFigureOut">
               <a:rPr lang="ko-KR" altLang="en-US" smtClean="0"/>
-              <a:t>2019-11-19</a:t>
+              <a:t>2019-11-21</a:t>
             </a:fld>
             <a:endParaRPr lang="ko-KR" altLang="en-US"/>
           </a:p>
@@ -2398,7 +2399,7 @@
           <a:p>
             <a:fld id="{EB44E886-23E1-4ADA-9C75-D80585AEE320}" type="datetimeFigureOut">
               <a:rPr lang="ko-KR" altLang="en-US" smtClean="0"/>
-              <a:t>2019-11-19</a:t>
+              <a:t>2019-11-21</a:t>
             </a:fld>
             <a:endParaRPr lang="ko-KR" altLang="en-US"/>
           </a:p>
@@ -2686,7 +2687,7 @@
           <a:p>
             <a:fld id="{EB44E886-23E1-4ADA-9C75-D80585AEE320}" type="datetimeFigureOut">
               <a:rPr lang="ko-KR" altLang="en-US" smtClean="0"/>
-              <a:t>2019-11-19</a:t>
+              <a:t>2019-11-21</a:t>
             </a:fld>
             <a:endParaRPr lang="ko-KR" altLang="en-US"/>
           </a:p>
@@ -2927,7 +2928,7 @@
           <a:p>
             <a:fld id="{EB44E886-23E1-4ADA-9C75-D80585AEE320}" type="datetimeFigureOut">
               <a:rPr lang="ko-KR" altLang="en-US" smtClean="0"/>
-              <a:t>2019-11-19</a:t>
+              <a:t>2019-11-21</a:t>
             </a:fld>
             <a:endParaRPr lang="ko-KR" altLang="en-US"/>
           </a:p>
@@ -12963,6 +12964,36 @@
           <a:chExt cx="0" cy="0"/>
         </a:xfrm>
       </p:grpSpPr>
+    </p:spTree>
+    <p:extLst>
+      <p:ext uri="{BB962C8B-B14F-4D97-AF65-F5344CB8AC3E}">
+        <p14:creationId xmlns:p14="http://schemas.microsoft.com/office/powerpoint/2010/main" val="426701443"/>
+      </p:ext>
+    </p:extLst>
+  </p:cSld>
+  <p:clrMapOvr>
+    <a:masterClrMapping/>
+  </p:clrMapOvr>
+</p:sld>
+</file>
+
+<file path=ppt/slides/slide15.xml><?xml version="1.0" encoding="utf-8"?>
+<p:sld xmlns:a="http://schemas.openxmlformats.org/drawingml/2006/main" xmlns:r="http://schemas.openxmlformats.org/officeDocument/2006/relationships" xmlns:p="http://schemas.openxmlformats.org/presentationml/2006/main">
+  <p:cSld>
+    <p:spTree>
+      <p:nvGrpSpPr>
+        <p:cNvPr id="1" name=""/>
+        <p:cNvGrpSpPr/>
+        <p:nvPr/>
+      </p:nvGrpSpPr>
+      <p:grpSpPr>
+        <a:xfrm>
+          <a:off x="0" y="0"/>
+          <a:ext cx="0" cy="0"/>
+          <a:chOff x="0" y="0"/>
+          <a:chExt cx="0" cy="0"/>
+        </a:xfrm>
+      </p:grpSpPr>
       <p:sp>
         <p:nvSpPr>
           <p:cNvPr id="4" name="직사각형 3">
@@ -13245,7 +13276,7 @@
 </p:sld>
 </file>
 
-<file path=ppt/slides/slide15.xml><?xml version="1.0" encoding="utf-8"?>
+<file path=ppt/slides/slide16.xml><?xml version="1.0" encoding="utf-8"?>
 <p:sld xmlns:a="http://schemas.openxmlformats.org/drawingml/2006/main" xmlns:r="http://schemas.openxmlformats.org/officeDocument/2006/relationships" xmlns:p="http://schemas.openxmlformats.org/presentationml/2006/main">
   <p:cSld>
     <p:spTree>
@@ -14501,7 +14532,7 @@
 </p:sld>
 </file>
 
-<file path=ppt/slides/slide16.xml><?xml version="1.0" encoding="utf-8"?>
+<file path=ppt/slides/slide17.xml><?xml version="1.0" encoding="utf-8"?>
 <p:sld xmlns:a="http://schemas.openxmlformats.org/drawingml/2006/main" xmlns:r="http://schemas.openxmlformats.org/officeDocument/2006/relationships" xmlns:p="http://schemas.openxmlformats.org/presentationml/2006/main">
   <p:cSld>
     <p:spTree>
@@ -14615,7 +14646,7 @@
         </p:nvSpPr>
         <p:spPr>
           <a:xfrm>
-            <a:off x="10207328" y="917691"/>
+            <a:off x="10098271" y="875784"/>
             <a:ext cx="983722" cy="853788"/>
           </a:xfrm>
           <a:prstGeom prst="hexagon">
@@ -14736,6 +14767,69 @@
           </a:p>
         </p:txBody>
       </p:sp>
+      <p:sp>
+        <p:nvSpPr>
+          <p:cNvPr id="7" name="육각형 6">
+            <a:extLst>
+              <a:ext uri="{FF2B5EF4-FFF2-40B4-BE49-F238E27FC236}">
+                <a16:creationId xmlns:a16="http://schemas.microsoft.com/office/drawing/2014/main" id="{37B0A8F6-B8E4-412D-9865-1C69687A35FC}"/>
+              </a:ext>
+            </a:extLst>
+          </p:cNvPr>
+          <p:cNvSpPr/>
+          <p:nvPr/>
+        </p:nvSpPr>
+        <p:spPr>
+          <a:xfrm>
+            <a:off x="5730589" y="959598"/>
+            <a:ext cx="983722" cy="853788"/>
+          </a:xfrm>
+          <a:prstGeom prst="hexagon">
+            <a:avLst>
+              <a:gd name="adj" fmla="val 32860"/>
+              <a:gd name="vf" fmla="val 115470"/>
+            </a:avLst>
+          </a:prstGeom>
+          <a:solidFill>
+            <a:srgbClr val="00B050"/>
+          </a:solidFill>
+          <a:ln>
+            <a:noFill/>
+          </a:ln>
+          <a:scene3d>
+            <a:camera prst="perspectiveHeroicExtremeLeftFacing"/>
+            <a:lightRig rig="threePt" dir="t"/>
+          </a:scene3d>
+          <a:sp3d prstMaterial="metal">
+            <a:bevelT w="393700" h="88900" prst="angle"/>
+            <a:bevelB w="0"/>
+          </a:sp3d>
+        </p:spPr>
+        <p:style>
+          <a:lnRef idx="2">
+            <a:schemeClr val="accent1">
+              <a:shade val="50000"/>
+            </a:schemeClr>
+          </a:lnRef>
+          <a:fillRef idx="1">
+            <a:schemeClr val="accent1"/>
+          </a:fillRef>
+          <a:effectRef idx="0">
+            <a:schemeClr val="accent1"/>
+          </a:effectRef>
+          <a:fontRef idx="minor">
+            <a:schemeClr val="lt1"/>
+          </a:fontRef>
+        </p:style>
+        <p:txBody>
+          <a:bodyPr rtlCol="0" anchor="ctr"/>
+          <a:lstStyle/>
+          <a:p>
+            <a:pPr algn="ctr"/>
+            <a:endParaRPr lang="ko-KR" altLang="en-US"/>
+          </a:p>
+        </p:txBody>
+      </p:sp>
     </p:spTree>
     <p:extLst>
       <p:ext uri="{BB962C8B-B14F-4D97-AF65-F5344CB8AC3E}">
@@ -14749,7 +14843,7 @@
 </p:sld>
 </file>
 
-<file path=ppt/slides/slide17.xml><?xml version="1.0" encoding="utf-8"?>
+<file path=ppt/slides/slide18.xml><?xml version="1.0" encoding="utf-8"?>
 <p:sld xmlns:a="http://schemas.openxmlformats.org/drawingml/2006/main" xmlns:r="http://schemas.openxmlformats.org/officeDocument/2006/relationships" xmlns:p="http://schemas.openxmlformats.org/presentationml/2006/main">
   <p:cSld>
     <p:spTree>
@@ -20576,7 +20670,7 @@
 </p:sld>
 </file>
 
-<file path=ppt/slides/slide18.xml><?xml version="1.0" encoding="utf-8"?>
+<file path=ppt/slides/slide19.xml><?xml version="1.0" encoding="utf-8"?>
 <p:sld xmlns:a="http://schemas.openxmlformats.org/drawingml/2006/main" xmlns:r="http://schemas.openxmlformats.org/officeDocument/2006/relationships" xmlns:p="http://schemas.openxmlformats.org/presentationml/2006/main">
   <p:cSld>
     <p:spTree>
@@ -24507,7 +24601,293 @@
 </p:sld>
 </file>
 
-<file path=ppt/slides/slide19.xml><?xml version="1.0" encoding="utf-8"?>
+<file path=ppt/slides/slide2.xml><?xml version="1.0" encoding="utf-8"?>
+<p:sld xmlns:a="http://schemas.openxmlformats.org/drawingml/2006/main" xmlns:r="http://schemas.openxmlformats.org/officeDocument/2006/relationships" xmlns:p="http://schemas.openxmlformats.org/presentationml/2006/main">
+  <p:cSld>
+    <p:spTree>
+      <p:nvGrpSpPr>
+        <p:cNvPr id="1" name=""/>
+        <p:cNvGrpSpPr/>
+        <p:nvPr/>
+      </p:nvGrpSpPr>
+      <p:grpSpPr>
+        <a:xfrm>
+          <a:off x="0" y="0"/>
+          <a:ext cx="0" cy="0"/>
+          <a:chOff x="0" y="0"/>
+          <a:chExt cx="0" cy="0"/>
+        </a:xfrm>
+      </p:grpSpPr>
+      <p:grpSp>
+        <p:nvGrpSpPr>
+          <p:cNvPr id="7" name="그룹 6">
+            <a:extLst>
+              <a:ext uri="{FF2B5EF4-FFF2-40B4-BE49-F238E27FC236}">
+                <a16:creationId xmlns:a16="http://schemas.microsoft.com/office/drawing/2014/main" id="{657B291C-73FB-41DA-BF2C-817F40C31946}"/>
+              </a:ext>
+            </a:extLst>
+          </p:cNvPr>
+          <p:cNvGrpSpPr/>
+          <p:nvPr/>
+        </p:nvGrpSpPr>
+        <p:grpSpPr>
+          <a:xfrm>
+            <a:off x="4780915" y="2936241"/>
+            <a:ext cx="1457325" cy="860612"/>
+            <a:chOff x="4486275" y="3048001"/>
+            <a:chExt cx="1457325" cy="860612"/>
+          </a:xfrm>
+          <a:solidFill>
+            <a:srgbClr val="B2B2B2">
+              <a:alpha val="47059"/>
+            </a:srgbClr>
+          </a:solidFill>
+        </p:grpSpPr>
+        <p:sp>
+          <p:nvSpPr>
+            <p:cNvPr id="8" name="평행 사변형 7">
+              <a:extLst>
+                <a:ext uri="{FF2B5EF4-FFF2-40B4-BE49-F238E27FC236}">
+                  <a16:creationId xmlns:a16="http://schemas.microsoft.com/office/drawing/2014/main" id="{06D131F4-339E-4C8B-A5A6-F612B8EA16D2}"/>
+                </a:ext>
+              </a:extLst>
+            </p:cNvPr>
+            <p:cNvSpPr/>
+            <p:nvPr/>
+          </p:nvSpPr>
+          <p:spPr>
+            <a:xfrm>
+              <a:off x="4486275" y="3048001"/>
+              <a:ext cx="1457325" cy="860612"/>
+            </a:xfrm>
+            <a:prstGeom prst="parallelogram">
+              <a:avLst/>
+            </a:prstGeom>
+            <a:grpFill/>
+            <a:ln>
+              <a:noFill/>
+            </a:ln>
+          </p:spPr>
+          <p:style>
+            <a:lnRef idx="2">
+              <a:schemeClr val="accent1">
+                <a:shade val="50000"/>
+              </a:schemeClr>
+            </a:lnRef>
+            <a:fillRef idx="1">
+              <a:schemeClr val="accent1"/>
+            </a:fillRef>
+            <a:effectRef idx="0">
+              <a:schemeClr val="accent1"/>
+            </a:effectRef>
+            <a:fontRef idx="minor">
+              <a:schemeClr val="lt1"/>
+            </a:fontRef>
+          </p:style>
+          <p:txBody>
+            <a:bodyPr rtlCol="0" anchor="ctr"/>
+            <a:lstStyle/>
+            <a:p>
+              <a:pPr algn="ctr"/>
+              <a:endParaRPr lang="ko-KR" altLang="en-US"/>
+            </a:p>
+          </p:txBody>
+        </p:sp>
+        <p:sp>
+          <p:nvSpPr>
+            <p:cNvPr id="9" name="평행 사변형 8">
+              <a:extLst>
+                <a:ext uri="{FF2B5EF4-FFF2-40B4-BE49-F238E27FC236}">
+                  <a16:creationId xmlns:a16="http://schemas.microsoft.com/office/drawing/2014/main" id="{89F8F831-467B-4535-BE81-010430526646}"/>
+                </a:ext>
+              </a:extLst>
+            </p:cNvPr>
+            <p:cNvSpPr/>
+            <p:nvPr/>
+          </p:nvSpPr>
+          <p:spPr>
+            <a:xfrm>
+              <a:off x="4518660" y="3048001"/>
+              <a:ext cx="1424940" cy="723899"/>
+            </a:xfrm>
+            <a:prstGeom prst="parallelogram">
+              <a:avLst/>
+            </a:prstGeom>
+            <a:grpFill/>
+            <a:ln>
+              <a:noFill/>
+            </a:ln>
+          </p:spPr>
+          <p:style>
+            <a:lnRef idx="2">
+              <a:schemeClr val="accent1">
+                <a:shade val="50000"/>
+              </a:schemeClr>
+            </a:lnRef>
+            <a:fillRef idx="1">
+              <a:schemeClr val="accent1"/>
+            </a:fillRef>
+            <a:effectRef idx="0">
+              <a:schemeClr val="accent1"/>
+            </a:effectRef>
+            <a:fontRef idx="minor">
+              <a:schemeClr val="lt1"/>
+            </a:fontRef>
+          </p:style>
+          <p:txBody>
+            <a:bodyPr rtlCol="0" anchor="ctr"/>
+            <a:lstStyle/>
+            <a:p>
+              <a:pPr algn="ctr"/>
+              <a:endParaRPr lang="ko-KR" altLang="en-US"/>
+            </a:p>
+          </p:txBody>
+        </p:sp>
+      </p:grpSp>
+      <p:grpSp>
+        <p:nvGrpSpPr>
+          <p:cNvPr id="10" name="그룹 9">
+            <a:extLst>
+              <a:ext uri="{FF2B5EF4-FFF2-40B4-BE49-F238E27FC236}">
+                <a16:creationId xmlns:a16="http://schemas.microsoft.com/office/drawing/2014/main" id="{93779094-E290-483D-B623-E9758F7C6EBB}"/>
+              </a:ext>
+            </a:extLst>
+          </p:cNvPr>
+          <p:cNvGrpSpPr/>
+          <p:nvPr/>
+        </p:nvGrpSpPr>
+        <p:grpSpPr>
+          <a:xfrm>
+            <a:off x="1848739" y="2867884"/>
+            <a:ext cx="1457325" cy="860612"/>
+            <a:chOff x="4486275" y="3048001"/>
+            <a:chExt cx="1457325" cy="860612"/>
+          </a:xfrm>
+        </p:grpSpPr>
+        <p:sp>
+          <p:nvSpPr>
+            <p:cNvPr id="11" name="평행 사변형 10">
+              <a:extLst>
+                <a:ext uri="{FF2B5EF4-FFF2-40B4-BE49-F238E27FC236}">
+                  <a16:creationId xmlns:a16="http://schemas.microsoft.com/office/drawing/2014/main" id="{744A4E64-2260-4315-9BC3-67CC96E827D0}"/>
+                </a:ext>
+              </a:extLst>
+            </p:cNvPr>
+            <p:cNvSpPr/>
+            <p:nvPr/>
+          </p:nvSpPr>
+          <p:spPr>
+            <a:xfrm>
+              <a:off x="4486275" y="3048001"/>
+              <a:ext cx="1457325" cy="860612"/>
+            </a:xfrm>
+            <a:prstGeom prst="parallelogram">
+              <a:avLst/>
+            </a:prstGeom>
+            <a:solidFill>
+              <a:schemeClr val="tx1">
+                <a:lumMod val="65000"/>
+                <a:lumOff val="35000"/>
+              </a:schemeClr>
+            </a:solidFill>
+            <a:ln>
+              <a:noFill/>
+            </a:ln>
+          </p:spPr>
+          <p:style>
+            <a:lnRef idx="2">
+              <a:schemeClr val="accent1">
+                <a:shade val="50000"/>
+              </a:schemeClr>
+            </a:lnRef>
+            <a:fillRef idx="1">
+              <a:schemeClr val="accent1"/>
+            </a:fillRef>
+            <a:effectRef idx="0">
+              <a:schemeClr val="accent1"/>
+            </a:effectRef>
+            <a:fontRef idx="minor">
+              <a:schemeClr val="lt1"/>
+            </a:fontRef>
+          </p:style>
+          <p:txBody>
+            <a:bodyPr rtlCol="0" anchor="ctr"/>
+            <a:lstStyle/>
+            <a:p>
+              <a:pPr algn="ctr"/>
+              <a:endParaRPr lang="ko-KR" altLang="en-US"/>
+            </a:p>
+          </p:txBody>
+        </p:sp>
+        <p:sp>
+          <p:nvSpPr>
+            <p:cNvPr id="12" name="평행 사변형 11">
+              <a:extLst>
+                <a:ext uri="{FF2B5EF4-FFF2-40B4-BE49-F238E27FC236}">
+                  <a16:creationId xmlns:a16="http://schemas.microsoft.com/office/drawing/2014/main" id="{51DAC25B-C49D-4E3E-9EB4-D113ED089201}"/>
+                </a:ext>
+              </a:extLst>
+            </p:cNvPr>
+            <p:cNvSpPr/>
+            <p:nvPr/>
+          </p:nvSpPr>
+          <p:spPr>
+            <a:xfrm>
+              <a:off x="4518660" y="3048001"/>
+              <a:ext cx="1424940" cy="723899"/>
+            </a:xfrm>
+            <a:prstGeom prst="parallelogram">
+              <a:avLst/>
+            </a:prstGeom>
+            <a:solidFill>
+              <a:srgbClr val="B0B0B0">
+                <a:alpha val="78824"/>
+              </a:srgbClr>
+            </a:solidFill>
+            <a:ln>
+              <a:noFill/>
+            </a:ln>
+          </p:spPr>
+          <p:style>
+            <a:lnRef idx="2">
+              <a:schemeClr val="accent1">
+                <a:shade val="50000"/>
+              </a:schemeClr>
+            </a:lnRef>
+            <a:fillRef idx="1">
+              <a:schemeClr val="accent1"/>
+            </a:fillRef>
+            <a:effectRef idx="0">
+              <a:schemeClr val="accent1"/>
+            </a:effectRef>
+            <a:fontRef idx="minor">
+              <a:schemeClr val="lt1"/>
+            </a:fontRef>
+          </p:style>
+          <p:txBody>
+            <a:bodyPr rtlCol="0" anchor="ctr"/>
+            <a:lstStyle/>
+            <a:p>
+              <a:pPr algn="ctr"/>
+              <a:endParaRPr lang="ko-KR" altLang="en-US"/>
+            </a:p>
+          </p:txBody>
+        </p:sp>
+      </p:grpSp>
+    </p:spTree>
+    <p:extLst>
+      <p:ext uri="{BB962C8B-B14F-4D97-AF65-F5344CB8AC3E}">
+        <p14:creationId xmlns:p14="http://schemas.microsoft.com/office/powerpoint/2010/main" val="2565668278"/>
+      </p:ext>
+    </p:extLst>
+  </p:cSld>
+  <p:clrMapOvr>
+    <a:masterClrMapping/>
+  </p:clrMapOvr>
+</p:sld>
+</file>
+
+<file path=ppt/slides/slide20.xml><?xml version="1.0" encoding="utf-8"?>
 <p:sld xmlns:a="http://schemas.openxmlformats.org/drawingml/2006/main" xmlns:r="http://schemas.openxmlformats.org/officeDocument/2006/relationships" xmlns:p="http://schemas.openxmlformats.org/presentationml/2006/main">
   <p:cSld>
     <p:spTree>
@@ -26096,292 +26476,6 @@
     <p:extLst>
       <p:ext uri="{BB962C8B-B14F-4D97-AF65-F5344CB8AC3E}">
         <p14:creationId xmlns:p14="http://schemas.microsoft.com/office/powerpoint/2010/main" val="2327054901"/>
-      </p:ext>
-    </p:extLst>
-  </p:cSld>
-  <p:clrMapOvr>
-    <a:masterClrMapping/>
-  </p:clrMapOvr>
-</p:sld>
-</file>
-
-<file path=ppt/slides/slide2.xml><?xml version="1.0" encoding="utf-8"?>
-<p:sld xmlns:a="http://schemas.openxmlformats.org/drawingml/2006/main" xmlns:r="http://schemas.openxmlformats.org/officeDocument/2006/relationships" xmlns:p="http://schemas.openxmlformats.org/presentationml/2006/main">
-  <p:cSld>
-    <p:spTree>
-      <p:nvGrpSpPr>
-        <p:cNvPr id="1" name=""/>
-        <p:cNvGrpSpPr/>
-        <p:nvPr/>
-      </p:nvGrpSpPr>
-      <p:grpSpPr>
-        <a:xfrm>
-          <a:off x="0" y="0"/>
-          <a:ext cx="0" cy="0"/>
-          <a:chOff x="0" y="0"/>
-          <a:chExt cx="0" cy="0"/>
-        </a:xfrm>
-      </p:grpSpPr>
-      <p:grpSp>
-        <p:nvGrpSpPr>
-          <p:cNvPr id="7" name="그룹 6">
-            <a:extLst>
-              <a:ext uri="{FF2B5EF4-FFF2-40B4-BE49-F238E27FC236}">
-                <a16:creationId xmlns:a16="http://schemas.microsoft.com/office/drawing/2014/main" id="{657B291C-73FB-41DA-BF2C-817F40C31946}"/>
-              </a:ext>
-            </a:extLst>
-          </p:cNvPr>
-          <p:cNvGrpSpPr/>
-          <p:nvPr/>
-        </p:nvGrpSpPr>
-        <p:grpSpPr>
-          <a:xfrm>
-            <a:off x="4780915" y="2936241"/>
-            <a:ext cx="1457325" cy="860612"/>
-            <a:chOff x="4486275" y="3048001"/>
-            <a:chExt cx="1457325" cy="860612"/>
-          </a:xfrm>
-          <a:solidFill>
-            <a:srgbClr val="B2B2B2">
-              <a:alpha val="47059"/>
-            </a:srgbClr>
-          </a:solidFill>
-        </p:grpSpPr>
-        <p:sp>
-          <p:nvSpPr>
-            <p:cNvPr id="8" name="평행 사변형 7">
-              <a:extLst>
-                <a:ext uri="{FF2B5EF4-FFF2-40B4-BE49-F238E27FC236}">
-                  <a16:creationId xmlns:a16="http://schemas.microsoft.com/office/drawing/2014/main" id="{06D131F4-339E-4C8B-A5A6-F612B8EA16D2}"/>
-                </a:ext>
-              </a:extLst>
-            </p:cNvPr>
-            <p:cNvSpPr/>
-            <p:nvPr/>
-          </p:nvSpPr>
-          <p:spPr>
-            <a:xfrm>
-              <a:off x="4486275" y="3048001"/>
-              <a:ext cx="1457325" cy="860612"/>
-            </a:xfrm>
-            <a:prstGeom prst="parallelogram">
-              <a:avLst/>
-            </a:prstGeom>
-            <a:grpFill/>
-            <a:ln>
-              <a:noFill/>
-            </a:ln>
-          </p:spPr>
-          <p:style>
-            <a:lnRef idx="2">
-              <a:schemeClr val="accent1">
-                <a:shade val="50000"/>
-              </a:schemeClr>
-            </a:lnRef>
-            <a:fillRef idx="1">
-              <a:schemeClr val="accent1"/>
-            </a:fillRef>
-            <a:effectRef idx="0">
-              <a:schemeClr val="accent1"/>
-            </a:effectRef>
-            <a:fontRef idx="minor">
-              <a:schemeClr val="lt1"/>
-            </a:fontRef>
-          </p:style>
-          <p:txBody>
-            <a:bodyPr rtlCol="0" anchor="ctr"/>
-            <a:lstStyle/>
-            <a:p>
-              <a:pPr algn="ctr"/>
-              <a:endParaRPr lang="ko-KR" altLang="en-US"/>
-            </a:p>
-          </p:txBody>
-        </p:sp>
-        <p:sp>
-          <p:nvSpPr>
-            <p:cNvPr id="9" name="평행 사변형 8">
-              <a:extLst>
-                <a:ext uri="{FF2B5EF4-FFF2-40B4-BE49-F238E27FC236}">
-                  <a16:creationId xmlns:a16="http://schemas.microsoft.com/office/drawing/2014/main" id="{89F8F831-467B-4535-BE81-010430526646}"/>
-                </a:ext>
-              </a:extLst>
-            </p:cNvPr>
-            <p:cNvSpPr/>
-            <p:nvPr/>
-          </p:nvSpPr>
-          <p:spPr>
-            <a:xfrm>
-              <a:off x="4518660" y="3048001"/>
-              <a:ext cx="1424940" cy="723899"/>
-            </a:xfrm>
-            <a:prstGeom prst="parallelogram">
-              <a:avLst/>
-            </a:prstGeom>
-            <a:grpFill/>
-            <a:ln>
-              <a:noFill/>
-            </a:ln>
-          </p:spPr>
-          <p:style>
-            <a:lnRef idx="2">
-              <a:schemeClr val="accent1">
-                <a:shade val="50000"/>
-              </a:schemeClr>
-            </a:lnRef>
-            <a:fillRef idx="1">
-              <a:schemeClr val="accent1"/>
-            </a:fillRef>
-            <a:effectRef idx="0">
-              <a:schemeClr val="accent1"/>
-            </a:effectRef>
-            <a:fontRef idx="minor">
-              <a:schemeClr val="lt1"/>
-            </a:fontRef>
-          </p:style>
-          <p:txBody>
-            <a:bodyPr rtlCol="0" anchor="ctr"/>
-            <a:lstStyle/>
-            <a:p>
-              <a:pPr algn="ctr"/>
-              <a:endParaRPr lang="ko-KR" altLang="en-US"/>
-            </a:p>
-          </p:txBody>
-        </p:sp>
-      </p:grpSp>
-      <p:grpSp>
-        <p:nvGrpSpPr>
-          <p:cNvPr id="10" name="그룹 9">
-            <a:extLst>
-              <a:ext uri="{FF2B5EF4-FFF2-40B4-BE49-F238E27FC236}">
-                <a16:creationId xmlns:a16="http://schemas.microsoft.com/office/drawing/2014/main" id="{93779094-E290-483D-B623-E9758F7C6EBB}"/>
-              </a:ext>
-            </a:extLst>
-          </p:cNvPr>
-          <p:cNvGrpSpPr/>
-          <p:nvPr/>
-        </p:nvGrpSpPr>
-        <p:grpSpPr>
-          <a:xfrm>
-            <a:off x="1848739" y="2867884"/>
-            <a:ext cx="1457325" cy="860612"/>
-            <a:chOff x="4486275" y="3048001"/>
-            <a:chExt cx="1457325" cy="860612"/>
-          </a:xfrm>
-        </p:grpSpPr>
-        <p:sp>
-          <p:nvSpPr>
-            <p:cNvPr id="11" name="평행 사변형 10">
-              <a:extLst>
-                <a:ext uri="{FF2B5EF4-FFF2-40B4-BE49-F238E27FC236}">
-                  <a16:creationId xmlns:a16="http://schemas.microsoft.com/office/drawing/2014/main" id="{744A4E64-2260-4315-9BC3-67CC96E827D0}"/>
-                </a:ext>
-              </a:extLst>
-            </p:cNvPr>
-            <p:cNvSpPr/>
-            <p:nvPr/>
-          </p:nvSpPr>
-          <p:spPr>
-            <a:xfrm>
-              <a:off x="4486275" y="3048001"/>
-              <a:ext cx="1457325" cy="860612"/>
-            </a:xfrm>
-            <a:prstGeom prst="parallelogram">
-              <a:avLst/>
-            </a:prstGeom>
-            <a:solidFill>
-              <a:schemeClr val="tx1">
-                <a:lumMod val="65000"/>
-                <a:lumOff val="35000"/>
-              </a:schemeClr>
-            </a:solidFill>
-            <a:ln>
-              <a:noFill/>
-            </a:ln>
-          </p:spPr>
-          <p:style>
-            <a:lnRef idx="2">
-              <a:schemeClr val="accent1">
-                <a:shade val="50000"/>
-              </a:schemeClr>
-            </a:lnRef>
-            <a:fillRef idx="1">
-              <a:schemeClr val="accent1"/>
-            </a:fillRef>
-            <a:effectRef idx="0">
-              <a:schemeClr val="accent1"/>
-            </a:effectRef>
-            <a:fontRef idx="minor">
-              <a:schemeClr val="lt1"/>
-            </a:fontRef>
-          </p:style>
-          <p:txBody>
-            <a:bodyPr rtlCol="0" anchor="ctr"/>
-            <a:lstStyle/>
-            <a:p>
-              <a:pPr algn="ctr"/>
-              <a:endParaRPr lang="ko-KR" altLang="en-US"/>
-            </a:p>
-          </p:txBody>
-        </p:sp>
-        <p:sp>
-          <p:nvSpPr>
-            <p:cNvPr id="12" name="평행 사변형 11">
-              <a:extLst>
-                <a:ext uri="{FF2B5EF4-FFF2-40B4-BE49-F238E27FC236}">
-                  <a16:creationId xmlns:a16="http://schemas.microsoft.com/office/drawing/2014/main" id="{51DAC25B-C49D-4E3E-9EB4-D113ED089201}"/>
-                </a:ext>
-              </a:extLst>
-            </p:cNvPr>
-            <p:cNvSpPr/>
-            <p:nvPr/>
-          </p:nvSpPr>
-          <p:spPr>
-            <a:xfrm>
-              <a:off x="4518660" y="3048001"/>
-              <a:ext cx="1424940" cy="723899"/>
-            </a:xfrm>
-            <a:prstGeom prst="parallelogram">
-              <a:avLst/>
-            </a:prstGeom>
-            <a:solidFill>
-              <a:srgbClr val="B0B0B0">
-                <a:alpha val="78824"/>
-              </a:srgbClr>
-            </a:solidFill>
-            <a:ln>
-              <a:noFill/>
-            </a:ln>
-          </p:spPr>
-          <p:style>
-            <a:lnRef idx="2">
-              <a:schemeClr val="accent1">
-                <a:shade val="50000"/>
-              </a:schemeClr>
-            </a:lnRef>
-            <a:fillRef idx="1">
-              <a:schemeClr val="accent1"/>
-            </a:fillRef>
-            <a:effectRef idx="0">
-              <a:schemeClr val="accent1"/>
-            </a:effectRef>
-            <a:fontRef idx="minor">
-              <a:schemeClr val="lt1"/>
-            </a:fontRef>
-          </p:style>
-          <p:txBody>
-            <a:bodyPr rtlCol="0" anchor="ctr"/>
-            <a:lstStyle/>
-            <a:p>
-              <a:pPr algn="ctr"/>
-              <a:endParaRPr lang="ko-KR" altLang="en-US"/>
-            </a:p>
-          </p:txBody>
-        </p:sp>
-      </p:grpSp>
-    </p:spTree>
-    <p:extLst>
-      <p:ext uri="{BB962C8B-B14F-4D97-AF65-F5344CB8AC3E}">
-        <p14:creationId xmlns:p14="http://schemas.microsoft.com/office/powerpoint/2010/main" val="2565668278"/>
       </p:ext>
     </p:extLst>
   </p:cSld>

</xml_diff>

<commit_message>
Attributes point when player level up
</commit_message>
<xml_diff>
--- a/Projects/SW_Design/UI/UI_design.pptx
+++ b/Projects/SW_Design/UI/UI_design.pptx
@@ -278,7 +278,7 @@
           <a:p>
             <a:fld id="{EB44E886-23E1-4ADA-9C75-D80585AEE320}" type="datetimeFigureOut">
               <a:rPr lang="ko-KR" altLang="en-US" smtClean="0"/>
-              <a:t>2019-11-21</a:t>
+              <a:t>2019-11-22</a:t>
             </a:fld>
             <a:endParaRPr lang="ko-KR" altLang="en-US"/>
           </a:p>
@@ -476,7 +476,7 @@
           <a:p>
             <a:fld id="{EB44E886-23E1-4ADA-9C75-D80585AEE320}" type="datetimeFigureOut">
               <a:rPr lang="ko-KR" altLang="en-US" smtClean="0"/>
-              <a:t>2019-11-21</a:t>
+              <a:t>2019-11-22</a:t>
             </a:fld>
             <a:endParaRPr lang="ko-KR" altLang="en-US"/>
           </a:p>
@@ -684,7 +684,7 @@
           <a:p>
             <a:fld id="{EB44E886-23E1-4ADA-9C75-D80585AEE320}" type="datetimeFigureOut">
               <a:rPr lang="ko-KR" altLang="en-US" smtClean="0"/>
-              <a:t>2019-11-21</a:t>
+              <a:t>2019-11-22</a:t>
             </a:fld>
             <a:endParaRPr lang="ko-KR" altLang="en-US"/>
           </a:p>
@@ -882,7 +882,7 @@
           <a:p>
             <a:fld id="{EB44E886-23E1-4ADA-9C75-D80585AEE320}" type="datetimeFigureOut">
               <a:rPr lang="ko-KR" altLang="en-US" smtClean="0"/>
-              <a:t>2019-11-21</a:t>
+              <a:t>2019-11-22</a:t>
             </a:fld>
             <a:endParaRPr lang="ko-KR" altLang="en-US"/>
           </a:p>
@@ -1157,7 +1157,7 @@
           <a:p>
             <a:fld id="{EB44E886-23E1-4ADA-9C75-D80585AEE320}" type="datetimeFigureOut">
               <a:rPr lang="ko-KR" altLang="en-US" smtClean="0"/>
-              <a:t>2019-11-21</a:t>
+              <a:t>2019-11-22</a:t>
             </a:fld>
             <a:endParaRPr lang="ko-KR" altLang="en-US"/>
           </a:p>
@@ -1422,7 +1422,7 @@
           <a:p>
             <a:fld id="{EB44E886-23E1-4ADA-9C75-D80585AEE320}" type="datetimeFigureOut">
               <a:rPr lang="ko-KR" altLang="en-US" smtClean="0"/>
-              <a:t>2019-11-21</a:t>
+              <a:t>2019-11-22</a:t>
             </a:fld>
             <a:endParaRPr lang="ko-KR" altLang="en-US"/>
           </a:p>
@@ -1834,7 +1834,7 @@
           <a:p>
             <a:fld id="{EB44E886-23E1-4ADA-9C75-D80585AEE320}" type="datetimeFigureOut">
               <a:rPr lang="ko-KR" altLang="en-US" smtClean="0"/>
-              <a:t>2019-11-21</a:t>
+              <a:t>2019-11-22</a:t>
             </a:fld>
             <a:endParaRPr lang="ko-KR" altLang="en-US"/>
           </a:p>
@@ -1975,7 +1975,7 @@
           <a:p>
             <a:fld id="{EB44E886-23E1-4ADA-9C75-D80585AEE320}" type="datetimeFigureOut">
               <a:rPr lang="ko-KR" altLang="en-US" smtClean="0"/>
-              <a:t>2019-11-21</a:t>
+              <a:t>2019-11-22</a:t>
             </a:fld>
             <a:endParaRPr lang="ko-KR" altLang="en-US"/>
           </a:p>
@@ -2088,7 +2088,7 @@
           <a:p>
             <a:fld id="{EB44E886-23E1-4ADA-9C75-D80585AEE320}" type="datetimeFigureOut">
               <a:rPr lang="ko-KR" altLang="en-US" smtClean="0"/>
-              <a:t>2019-11-21</a:t>
+              <a:t>2019-11-22</a:t>
             </a:fld>
             <a:endParaRPr lang="ko-KR" altLang="en-US"/>
           </a:p>
@@ -2399,7 +2399,7 @@
           <a:p>
             <a:fld id="{EB44E886-23E1-4ADA-9C75-D80585AEE320}" type="datetimeFigureOut">
               <a:rPr lang="ko-KR" altLang="en-US" smtClean="0"/>
-              <a:t>2019-11-21</a:t>
+              <a:t>2019-11-22</a:t>
             </a:fld>
             <a:endParaRPr lang="ko-KR" altLang="en-US"/>
           </a:p>
@@ -2687,7 +2687,7 @@
           <a:p>
             <a:fld id="{EB44E886-23E1-4ADA-9C75-D80585AEE320}" type="datetimeFigureOut">
               <a:rPr lang="ko-KR" altLang="en-US" smtClean="0"/>
-              <a:t>2019-11-21</a:t>
+              <a:t>2019-11-22</a:t>
             </a:fld>
             <a:endParaRPr lang="ko-KR" altLang="en-US"/>
           </a:p>
@@ -2928,7 +2928,7 @@
           <a:p>
             <a:fld id="{EB44E886-23E1-4ADA-9C75-D80585AEE320}" type="datetimeFigureOut">
               <a:rPr lang="ko-KR" altLang="en-US" smtClean="0"/>
-              <a:t>2019-11-21</a:t>
+              <a:t>2019-11-22</a:t>
             </a:fld>
             <a:endParaRPr lang="ko-KR" altLang="en-US"/>
           </a:p>
@@ -5540,6 +5540,70 @@
             <a:srgbClr val="000000">
               <a:alpha val="69804"/>
             </a:srgbClr>
+          </a:solidFill>
+          <a:ln>
+            <a:noFill/>
+          </a:ln>
+          <a:scene3d>
+            <a:camera prst="orthographicFront"/>
+            <a:lightRig rig="threePt" dir="t"/>
+          </a:scene3d>
+          <a:sp3d>
+            <a:bevelT/>
+          </a:sp3d>
+        </p:spPr>
+        <p:style>
+          <a:lnRef idx="2">
+            <a:schemeClr val="accent1">
+              <a:shade val="50000"/>
+            </a:schemeClr>
+          </a:lnRef>
+          <a:fillRef idx="1">
+            <a:schemeClr val="accent1"/>
+          </a:fillRef>
+          <a:effectRef idx="0">
+            <a:schemeClr val="accent1"/>
+          </a:effectRef>
+          <a:fontRef idx="minor">
+            <a:schemeClr val="lt1"/>
+          </a:fontRef>
+        </p:style>
+        <p:txBody>
+          <a:bodyPr rtlCol="0" anchor="ctr"/>
+          <a:lstStyle/>
+          <a:p>
+            <a:pPr algn="ctr"/>
+            <a:endParaRPr lang="en-US"/>
+          </a:p>
+        </p:txBody>
+      </p:sp>
+      <p:sp>
+        <p:nvSpPr>
+          <p:cNvPr id="51" name="Snip Diagonal Corner Rectangle 7">
+            <a:extLst>
+              <a:ext uri="{FF2B5EF4-FFF2-40B4-BE49-F238E27FC236}">
+                <a16:creationId xmlns:a16="http://schemas.microsoft.com/office/drawing/2014/main" id="{DCA3F6D8-FDC5-448C-AA32-B087DA0626D0}"/>
+              </a:ext>
+            </a:extLst>
+          </p:cNvPr>
+          <p:cNvSpPr/>
+          <p:nvPr/>
+        </p:nvSpPr>
+        <p:spPr>
+          <a:xfrm>
+            <a:off x="2043432" y="3184085"/>
+            <a:ext cx="3409950" cy="3063404"/>
+          </a:xfrm>
+          <a:prstGeom prst="snip2DiagRect">
+            <a:avLst>
+              <a:gd name="adj1" fmla="val 0"/>
+              <a:gd name="adj2" fmla="val 15315"/>
+            </a:avLst>
+          </a:prstGeom>
+          <a:solidFill>
+            <a:schemeClr val="bg1">
+              <a:alpha val="69804"/>
+            </a:schemeClr>
           </a:solidFill>
           <a:ln>
             <a:noFill/>

</xml_diff>

<commit_message>
Image and reward scene
</commit_message>
<xml_diff>
--- a/Projects/SW_Design/UI/UI_design.pptx
+++ b/Projects/SW_Design/UI/UI_design.pptx
@@ -13028,6 +13028,260 @@
           <a:chExt cx="0" cy="0"/>
         </a:xfrm>
       </p:grpSpPr>
+      <p:sp>
+        <p:nvSpPr>
+          <p:cNvPr id="3" name="직사각형 9">
+            <a:extLst>
+              <a:ext uri="{FF2B5EF4-FFF2-40B4-BE49-F238E27FC236}">
+                <a16:creationId xmlns:a16="http://schemas.microsoft.com/office/drawing/2014/main" id="{242180D3-26D3-4B23-9A8C-AC150521A362}"/>
+              </a:ext>
+            </a:extLst>
+          </p:cNvPr>
+          <p:cNvSpPr/>
+          <p:nvPr/>
+        </p:nvSpPr>
+        <p:spPr>
+          <a:xfrm>
+            <a:off x="487680" y="1143000"/>
+            <a:ext cx="9509760" cy="5455920"/>
+          </a:xfrm>
+          <a:prstGeom prst="rect">
+            <a:avLst/>
+          </a:prstGeom>
+        </p:spPr>
+        <p:style>
+          <a:lnRef idx="2">
+            <a:schemeClr val="accent1">
+              <a:shade val="50000"/>
+            </a:schemeClr>
+          </a:lnRef>
+          <a:fillRef idx="1">
+            <a:schemeClr val="accent1"/>
+          </a:fillRef>
+          <a:effectRef idx="0">
+            <a:schemeClr val="accent1"/>
+          </a:effectRef>
+          <a:fontRef idx="minor">
+            <a:schemeClr val="lt1"/>
+          </a:fontRef>
+        </p:style>
+        <p:txBody>
+          <a:bodyPr rtlCol="0" anchor="ctr"/>
+          <a:lstStyle/>
+          <a:p>
+            <a:pPr algn="ctr"/>
+            <a:endParaRPr lang="ko-KR" altLang="en-US"/>
+          </a:p>
+        </p:txBody>
+      </p:sp>
+      <p:sp>
+        <p:nvSpPr>
+          <p:cNvPr id="4" name="TextBox 3">
+            <a:extLst>
+              <a:ext uri="{FF2B5EF4-FFF2-40B4-BE49-F238E27FC236}">
+                <a16:creationId xmlns:a16="http://schemas.microsoft.com/office/drawing/2014/main" id="{7F49495D-F586-44ED-8B5D-3A46E7D6062B}"/>
+              </a:ext>
+            </a:extLst>
+          </p:cNvPr>
+          <p:cNvSpPr txBox="1"/>
+          <p:nvPr/>
+        </p:nvSpPr>
+        <p:spPr>
+          <a:xfrm>
+            <a:off x="790984" y="1397272"/>
+            <a:ext cx="1542858" cy="400110"/>
+          </a:xfrm>
+          <a:prstGeom prst="rect">
+            <a:avLst/>
+          </a:prstGeom>
+          <a:noFill/>
+        </p:spPr>
+        <p:txBody>
+          <a:bodyPr wrap="none" rtlCol="0">
+            <a:spAutoFit/>
+          </a:bodyPr>
+          <a:lstStyle/>
+          <a:p>
+            <a:r>
+              <a:rPr lang="en-US" altLang="ko-KR" sz="2000" b="1" dirty="0" smtClean="0">
+                <a:solidFill>
+                  <a:schemeClr val="bg1">
+                    <a:lumMod val="85000"/>
+                  </a:schemeClr>
+                </a:solidFill>
+                <a:latin typeface="Calibri" panose="020F0502020204030204" pitchFamily="34" charset="0"/>
+                <a:cs typeface="Calibri" panose="020F0502020204030204" pitchFamily="34" charset="0"/>
+              </a:rPr>
+              <a:t>Dungeon 1-1</a:t>
+            </a:r>
+            <a:endParaRPr lang="ko-KR" altLang="en-US" sz="2000" b="1" dirty="0">
+              <a:solidFill>
+                <a:schemeClr val="bg1">
+                  <a:lumMod val="85000"/>
+                </a:schemeClr>
+              </a:solidFill>
+              <a:latin typeface="Calibri" panose="020F0502020204030204" pitchFamily="34" charset="0"/>
+              <a:cs typeface="Calibri" panose="020F0502020204030204" pitchFamily="34" charset="0"/>
+            </a:endParaRPr>
+          </a:p>
+        </p:txBody>
+      </p:sp>
+      <p:sp>
+        <p:nvSpPr>
+          <p:cNvPr id="5" name="TextBox 4">
+            <a:extLst>
+              <a:ext uri="{FF2B5EF4-FFF2-40B4-BE49-F238E27FC236}">
+                <a16:creationId xmlns:a16="http://schemas.microsoft.com/office/drawing/2014/main" id="{7F49495D-F586-44ED-8B5D-3A46E7D6062B}"/>
+              </a:ext>
+            </a:extLst>
+          </p:cNvPr>
+          <p:cNvSpPr txBox="1"/>
+          <p:nvPr/>
+        </p:nvSpPr>
+        <p:spPr>
+          <a:xfrm>
+            <a:off x="790984" y="1797382"/>
+            <a:ext cx="1542858" cy="400110"/>
+          </a:xfrm>
+          <a:prstGeom prst="rect">
+            <a:avLst/>
+          </a:prstGeom>
+          <a:noFill/>
+        </p:spPr>
+        <p:txBody>
+          <a:bodyPr wrap="none" rtlCol="0">
+            <a:spAutoFit/>
+          </a:bodyPr>
+          <a:lstStyle/>
+          <a:p>
+            <a:r>
+              <a:rPr lang="en-US" altLang="ko-KR" sz="2000" b="1" dirty="0" smtClean="0">
+                <a:solidFill>
+                  <a:schemeClr val="bg1">
+                    <a:lumMod val="85000"/>
+                  </a:schemeClr>
+                </a:solidFill>
+                <a:latin typeface="Calibri" panose="020F0502020204030204" pitchFamily="34" charset="0"/>
+                <a:cs typeface="Calibri" panose="020F0502020204030204" pitchFamily="34" charset="0"/>
+              </a:rPr>
+              <a:t>Dungeon 1-2</a:t>
+            </a:r>
+            <a:endParaRPr lang="ko-KR" altLang="en-US" sz="2000" b="1" dirty="0">
+              <a:solidFill>
+                <a:schemeClr val="bg1">
+                  <a:lumMod val="85000"/>
+                </a:schemeClr>
+              </a:solidFill>
+              <a:latin typeface="Calibri" panose="020F0502020204030204" pitchFamily="34" charset="0"/>
+              <a:cs typeface="Calibri" panose="020F0502020204030204" pitchFamily="34" charset="0"/>
+            </a:endParaRPr>
+          </a:p>
+        </p:txBody>
+      </p:sp>
+      <p:sp>
+        <p:nvSpPr>
+          <p:cNvPr id="6" name="TextBox 5">
+            <a:extLst>
+              <a:ext uri="{FF2B5EF4-FFF2-40B4-BE49-F238E27FC236}">
+                <a16:creationId xmlns:a16="http://schemas.microsoft.com/office/drawing/2014/main" id="{7F49495D-F586-44ED-8B5D-3A46E7D6062B}"/>
+              </a:ext>
+            </a:extLst>
+          </p:cNvPr>
+          <p:cNvSpPr txBox="1"/>
+          <p:nvPr/>
+        </p:nvSpPr>
+        <p:spPr>
+          <a:xfrm>
+            <a:off x="790984" y="2197492"/>
+            <a:ext cx="1542858" cy="400110"/>
+          </a:xfrm>
+          <a:prstGeom prst="rect">
+            <a:avLst/>
+          </a:prstGeom>
+          <a:noFill/>
+        </p:spPr>
+        <p:txBody>
+          <a:bodyPr wrap="none" rtlCol="0">
+            <a:spAutoFit/>
+          </a:bodyPr>
+          <a:lstStyle/>
+          <a:p>
+            <a:r>
+              <a:rPr lang="en-US" altLang="ko-KR" sz="2000" b="1" dirty="0" smtClean="0">
+                <a:solidFill>
+                  <a:schemeClr val="bg1">
+                    <a:lumMod val="85000"/>
+                  </a:schemeClr>
+                </a:solidFill>
+                <a:latin typeface="Calibri" panose="020F0502020204030204" pitchFamily="34" charset="0"/>
+                <a:cs typeface="Calibri" panose="020F0502020204030204" pitchFamily="34" charset="0"/>
+              </a:rPr>
+              <a:t>Dungeon 2-1</a:t>
+            </a:r>
+            <a:endParaRPr lang="ko-KR" altLang="en-US" sz="2000" b="1" dirty="0">
+              <a:solidFill>
+                <a:schemeClr val="bg1">
+                  <a:lumMod val="85000"/>
+                </a:schemeClr>
+              </a:solidFill>
+              <a:latin typeface="Calibri" panose="020F0502020204030204" pitchFamily="34" charset="0"/>
+              <a:cs typeface="Calibri" panose="020F0502020204030204" pitchFamily="34" charset="0"/>
+            </a:endParaRPr>
+          </a:p>
+        </p:txBody>
+      </p:sp>
+      <p:sp>
+        <p:nvSpPr>
+          <p:cNvPr id="7" name="TextBox 6">
+            <a:extLst>
+              <a:ext uri="{FF2B5EF4-FFF2-40B4-BE49-F238E27FC236}">
+                <a16:creationId xmlns:a16="http://schemas.microsoft.com/office/drawing/2014/main" id="{7F49495D-F586-44ED-8B5D-3A46E7D6062B}"/>
+              </a:ext>
+            </a:extLst>
+          </p:cNvPr>
+          <p:cNvSpPr txBox="1"/>
+          <p:nvPr/>
+        </p:nvSpPr>
+        <p:spPr>
+          <a:xfrm>
+            <a:off x="790984" y="2597602"/>
+            <a:ext cx="1542858" cy="400110"/>
+          </a:xfrm>
+          <a:prstGeom prst="rect">
+            <a:avLst/>
+          </a:prstGeom>
+          <a:noFill/>
+        </p:spPr>
+        <p:txBody>
+          <a:bodyPr wrap="none" rtlCol="0">
+            <a:spAutoFit/>
+          </a:bodyPr>
+          <a:lstStyle/>
+          <a:p>
+            <a:r>
+              <a:rPr lang="en-US" altLang="ko-KR" sz="2000" b="1" dirty="0" smtClean="0">
+                <a:solidFill>
+                  <a:schemeClr val="bg1">
+                    <a:lumMod val="85000"/>
+                  </a:schemeClr>
+                </a:solidFill>
+                <a:latin typeface="Calibri" panose="020F0502020204030204" pitchFamily="34" charset="0"/>
+                <a:cs typeface="Calibri" panose="020F0502020204030204" pitchFamily="34" charset="0"/>
+              </a:rPr>
+              <a:t>Dungeon 2-2</a:t>
+            </a:r>
+            <a:endParaRPr lang="ko-KR" altLang="en-US" sz="2000" b="1" dirty="0">
+              <a:solidFill>
+                <a:schemeClr val="bg1">
+                  <a:lumMod val="85000"/>
+                </a:schemeClr>
+              </a:solidFill>
+              <a:latin typeface="Calibri" panose="020F0502020204030204" pitchFamily="34" charset="0"/>
+              <a:cs typeface="Calibri" panose="020F0502020204030204" pitchFamily="34" charset="0"/>
+            </a:endParaRPr>
+          </a:p>
+        </p:txBody>
+      </p:sp>
     </p:spTree>
     <p:extLst>
       <p:ext uri="{BB962C8B-B14F-4D97-AF65-F5344CB8AC3E}">

</xml_diff>

<commit_message>
icons and HP bar
</commit_message>
<xml_diff>
--- a/Projects/SW_Design/UI/UI_design.pptx
+++ b/Projects/SW_Design/UI/UI_design.pptx
@@ -278,7 +278,7 @@
           <a:p>
             <a:fld id="{EB44E886-23E1-4ADA-9C75-D80585AEE320}" type="datetimeFigureOut">
               <a:rPr lang="ko-KR" altLang="en-US" smtClean="0"/>
-              <a:t>2019-11-22</a:t>
+              <a:t>2019-11-26</a:t>
             </a:fld>
             <a:endParaRPr lang="ko-KR" altLang="en-US"/>
           </a:p>
@@ -476,7 +476,7 @@
           <a:p>
             <a:fld id="{EB44E886-23E1-4ADA-9C75-D80585AEE320}" type="datetimeFigureOut">
               <a:rPr lang="ko-KR" altLang="en-US" smtClean="0"/>
-              <a:t>2019-11-22</a:t>
+              <a:t>2019-11-26</a:t>
             </a:fld>
             <a:endParaRPr lang="ko-KR" altLang="en-US"/>
           </a:p>
@@ -684,7 +684,7 @@
           <a:p>
             <a:fld id="{EB44E886-23E1-4ADA-9C75-D80585AEE320}" type="datetimeFigureOut">
               <a:rPr lang="ko-KR" altLang="en-US" smtClean="0"/>
-              <a:t>2019-11-22</a:t>
+              <a:t>2019-11-26</a:t>
             </a:fld>
             <a:endParaRPr lang="ko-KR" altLang="en-US"/>
           </a:p>
@@ -882,7 +882,7 @@
           <a:p>
             <a:fld id="{EB44E886-23E1-4ADA-9C75-D80585AEE320}" type="datetimeFigureOut">
               <a:rPr lang="ko-KR" altLang="en-US" smtClean="0"/>
-              <a:t>2019-11-22</a:t>
+              <a:t>2019-11-26</a:t>
             </a:fld>
             <a:endParaRPr lang="ko-KR" altLang="en-US"/>
           </a:p>
@@ -1157,7 +1157,7 @@
           <a:p>
             <a:fld id="{EB44E886-23E1-4ADA-9C75-D80585AEE320}" type="datetimeFigureOut">
               <a:rPr lang="ko-KR" altLang="en-US" smtClean="0"/>
-              <a:t>2019-11-22</a:t>
+              <a:t>2019-11-26</a:t>
             </a:fld>
             <a:endParaRPr lang="ko-KR" altLang="en-US"/>
           </a:p>
@@ -1422,7 +1422,7 @@
           <a:p>
             <a:fld id="{EB44E886-23E1-4ADA-9C75-D80585AEE320}" type="datetimeFigureOut">
               <a:rPr lang="ko-KR" altLang="en-US" smtClean="0"/>
-              <a:t>2019-11-22</a:t>
+              <a:t>2019-11-26</a:t>
             </a:fld>
             <a:endParaRPr lang="ko-KR" altLang="en-US"/>
           </a:p>
@@ -1834,7 +1834,7 @@
           <a:p>
             <a:fld id="{EB44E886-23E1-4ADA-9C75-D80585AEE320}" type="datetimeFigureOut">
               <a:rPr lang="ko-KR" altLang="en-US" smtClean="0"/>
-              <a:t>2019-11-22</a:t>
+              <a:t>2019-11-26</a:t>
             </a:fld>
             <a:endParaRPr lang="ko-KR" altLang="en-US"/>
           </a:p>
@@ -1975,7 +1975,7 @@
           <a:p>
             <a:fld id="{EB44E886-23E1-4ADA-9C75-D80585AEE320}" type="datetimeFigureOut">
               <a:rPr lang="ko-KR" altLang="en-US" smtClean="0"/>
-              <a:t>2019-11-22</a:t>
+              <a:t>2019-11-26</a:t>
             </a:fld>
             <a:endParaRPr lang="ko-KR" altLang="en-US"/>
           </a:p>
@@ -2088,7 +2088,7 @@
           <a:p>
             <a:fld id="{EB44E886-23E1-4ADA-9C75-D80585AEE320}" type="datetimeFigureOut">
               <a:rPr lang="ko-KR" altLang="en-US" smtClean="0"/>
-              <a:t>2019-11-22</a:t>
+              <a:t>2019-11-26</a:t>
             </a:fld>
             <a:endParaRPr lang="ko-KR" altLang="en-US"/>
           </a:p>
@@ -2399,7 +2399,7 @@
           <a:p>
             <a:fld id="{EB44E886-23E1-4ADA-9C75-D80585AEE320}" type="datetimeFigureOut">
               <a:rPr lang="ko-KR" altLang="en-US" smtClean="0"/>
-              <a:t>2019-11-22</a:t>
+              <a:t>2019-11-26</a:t>
             </a:fld>
             <a:endParaRPr lang="ko-KR" altLang="en-US"/>
           </a:p>
@@ -2687,7 +2687,7 @@
           <a:p>
             <a:fld id="{EB44E886-23E1-4ADA-9C75-D80585AEE320}" type="datetimeFigureOut">
               <a:rPr lang="ko-KR" altLang="en-US" smtClean="0"/>
-              <a:t>2019-11-22</a:t>
+              <a:t>2019-11-26</a:t>
             </a:fld>
             <a:endParaRPr lang="ko-KR" altLang="en-US"/>
           </a:p>
@@ -2928,7 +2928,7 @@
           <a:p>
             <a:fld id="{EB44E886-23E1-4ADA-9C75-D80585AEE320}" type="datetimeFigureOut">
               <a:rPr lang="ko-KR" altLang="en-US" smtClean="0"/>
-              <a:t>2019-11-22</a:t>
+              <a:t>2019-11-26</a:t>
             </a:fld>
             <a:endParaRPr lang="ko-KR" altLang="en-US"/>
           </a:p>
@@ -13269,6 +13269,198 @@
                 <a:cs typeface="Calibri" panose="020F0502020204030204" pitchFamily="34" charset="0"/>
               </a:rPr>
               <a:t>Dungeon 2-2</a:t>
+            </a:r>
+            <a:endParaRPr lang="ko-KR" altLang="en-US" sz="2000" b="1" dirty="0">
+              <a:solidFill>
+                <a:schemeClr val="bg1">
+                  <a:lumMod val="85000"/>
+                </a:schemeClr>
+              </a:solidFill>
+              <a:latin typeface="Calibri" panose="020F0502020204030204" pitchFamily="34" charset="0"/>
+              <a:cs typeface="Calibri" panose="020F0502020204030204" pitchFamily="34" charset="0"/>
+            </a:endParaRPr>
+          </a:p>
+        </p:txBody>
+      </p:sp>
+      <p:sp>
+        <p:nvSpPr>
+          <p:cNvPr id="8" name="TextBox 7">
+            <a:extLst>
+              <a:ext uri="{FF2B5EF4-FFF2-40B4-BE49-F238E27FC236}">
+                <a16:creationId xmlns:a16="http://schemas.microsoft.com/office/drawing/2014/main" id="{7F49495D-F586-44ED-8B5D-3A46E7D6062B}"/>
+              </a:ext>
+            </a:extLst>
+          </p:cNvPr>
+          <p:cNvSpPr txBox="1"/>
+          <p:nvPr/>
+        </p:nvSpPr>
+        <p:spPr>
+          <a:xfrm>
+            <a:off x="790984" y="2997712"/>
+            <a:ext cx="1542858" cy="400110"/>
+          </a:xfrm>
+          <a:prstGeom prst="rect">
+            <a:avLst/>
+          </a:prstGeom>
+          <a:noFill/>
+        </p:spPr>
+        <p:txBody>
+          <a:bodyPr wrap="none" rtlCol="0">
+            <a:spAutoFit/>
+          </a:bodyPr>
+          <a:lstStyle/>
+          <a:p>
+            <a:r>
+              <a:rPr lang="en-US" altLang="ko-KR" sz="2000" b="1" dirty="0" smtClean="0">
+                <a:solidFill>
+                  <a:schemeClr val="bg1">
+                    <a:lumMod val="85000"/>
+                  </a:schemeClr>
+                </a:solidFill>
+                <a:latin typeface="Calibri" panose="020F0502020204030204" pitchFamily="34" charset="0"/>
+                <a:cs typeface="Calibri" panose="020F0502020204030204" pitchFamily="34" charset="0"/>
+              </a:rPr>
+              <a:t>Dungeon </a:t>
+            </a:r>
+            <a:r>
+              <a:rPr lang="en-US" altLang="ko-KR" sz="2000" b="1" dirty="0" smtClean="0">
+                <a:solidFill>
+                  <a:schemeClr val="bg1">
+                    <a:lumMod val="85000"/>
+                  </a:schemeClr>
+                </a:solidFill>
+                <a:latin typeface="Calibri" panose="020F0502020204030204" pitchFamily="34" charset="0"/>
+                <a:cs typeface="Calibri" panose="020F0502020204030204" pitchFamily="34" charset="0"/>
+              </a:rPr>
+              <a:t>3-1</a:t>
+            </a:r>
+            <a:endParaRPr lang="ko-KR" altLang="en-US" sz="2000" b="1" dirty="0">
+              <a:solidFill>
+                <a:schemeClr val="bg1">
+                  <a:lumMod val="85000"/>
+                </a:schemeClr>
+              </a:solidFill>
+              <a:latin typeface="Calibri" panose="020F0502020204030204" pitchFamily="34" charset="0"/>
+              <a:cs typeface="Calibri" panose="020F0502020204030204" pitchFamily="34" charset="0"/>
+            </a:endParaRPr>
+          </a:p>
+        </p:txBody>
+      </p:sp>
+      <p:sp>
+        <p:nvSpPr>
+          <p:cNvPr id="9" name="TextBox 8">
+            <a:extLst>
+              <a:ext uri="{FF2B5EF4-FFF2-40B4-BE49-F238E27FC236}">
+                <a16:creationId xmlns:a16="http://schemas.microsoft.com/office/drawing/2014/main" id="{7F49495D-F586-44ED-8B5D-3A46E7D6062B}"/>
+              </a:ext>
+            </a:extLst>
+          </p:cNvPr>
+          <p:cNvSpPr txBox="1"/>
+          <p:nvPr/>
+        </p:nvSpPr>
+        <p:spPr>
+          <a:xfrm>
+            <a:off x="790984" y="3397931"/>
+            <a:ext cx="1542858" cy="400110"/>
+          </a:xfrm>
+          <a:prstGeom prst="rect">
+            <a:avLst/>
+          </a:prstGeom>
+          <a:noFill/>
+        </p:spPr>
+        <p:txBody>
+          <a:bodyPr wrap="none" rtlCol="0">
+            <a:spAutoFit/>
+          </a:bodyPr>
+          <a:lstStyle/>
+          <a:p>
+            <a:r>
+              <a:rPr lang="en-US" altLang="ko-KR" sz="2000" b="1" smtClean="0">
+                <a:solidFill>
+                  <a:schemeClr val="bg1">
+                    <a:lumMod val="85000"/>
+                  </a:schemeClr>
+                </a:solidFill>
+                <a:latin typeface="Calibri" panose="020F0502020204030204" pitchFamily="34" charset="0"/>
+                <a:cs typeface="Calibri" panose="020F0502020204030204" pitchFamily="34" charset="0"/>
+              </a:rPr>
+              <a:t>Dungeon </a:t>
+            </a:r>
+            <a:r>
+              <a:rPr lang="en-US" altLang="ko-KR" sz="2000" b="1" smtClean="0">
+                <a:solidFill>
+                  <a:schemeClr val="bg1">
+                    <a:lumMod val="85000"/>
+                  </a:schemeClr>
+                </a:solidFill>
+                <a:latin typeface="Calibri" panose="020F0502020204030204" pitchFamily="34" charset="0"/>
+                <a:cs typeface="Calibri" panose="020F0502020204030204" pitchFamily="34" charset="0"/>
+              </a:rPr>
+              <a:t>3-2</a:t>
+            </a:r>
+            <a:endParaRPr lang="ko-KR" altLang="en-US" sz="2000" b="1" dirty="0">
+              <a:solidFill>
+                <a:schemeClr val="bg1">
+                  <a:lumMod val="85000"/>
+                </a:schemeClr>
+              </a:solidFill>
+              <a:latin typeface="Calibri" panose="020F0502020204030204" pitchFamily="34" charset="0"/>
+              <a:cs typeface="Calibri" panose="020F0502020204030204" pitchFamily="34" charset="0"/>
+            </a:endParaRPr>
+          </a:p>
+        </p:txBody>
+      </p:sp>
+      <p:sp>
+        <p:nvSpPr>
+          <p:cNvPr id="10" name="TextBox 9">
+            <a:extLst>
+              <a:ext uri="{FF2B5EF4-FFF2-40B4-BE49-F238E27FC236}">
+                <a16:creationId xmlns:a16="http://schemas.microsoft.com/office/drawing/2014/main" id="{7F49495D-F586-44ED-8B5D-3A46E7D6062B}"/>
+              </a:ext>
+            </a:extLst>
+          </p:cNvPr>
+          <p:cNvSpPr txBox="1"/>
+          <p:nvPr/>
+        </p:nvSpPr>
+        <p:spPr>
+          <a:xfrm>
+            <a:off x="790984" y="3788635"/>
+            <a:ext cx="1542858" cy="400110"/>
+          </a:xfrm>
+          <a:prstGeom prst="rect">
+            <a:avLst/>
+          </a:prstGeom>
+          <a:noFill/>
+        </p:spPr>
+        <p:txBody>
+          <a:bodyPr wrap="none" rtlCol="0">
+            <a:spAutoFit/>
+          </a:bodyPr>
+          <a:lstStyle/>
+          <a:p>
+            <a:r>
+              <a:rPr lang="en-US" altLang="ko-KR" sz="2000" b="1" dirty="0" smtClean="0">
+                <a:solidFill>
+                  <a:schemeClr val="bg1">
+                    <a:lumMod val="85000"/>
+                  </a:schemeClr>
+                </a:solidFill>
+                <a:latin typeface="Calibri" panose="020F0502020204030204" pitchFamily="34" charset="0"/>
+                <a:cs typeface="Calibri" panose="020F0502020204030204" pitchFamily="34" charset="0"/>
+              </a:rPr>
+              <a:t>Dungeon </a:t>
+            </a:r>
+            <a:r>
+              <a:rPr lang="en-US" altLang="ko-KR" sz="2000" b="1" dirty="0" smtClean="0">
+                <a:solidFill>
+                  <a:schemeClr val="bg1">
+                    <a:lumMod val="85000"/>
+                  </a:schemeClr>
+                </a:solidFill>
+                <a:latin typeface="Calibri" panose="020F0502020204030204" pitchFamily="34" charset="0"/>
+                <a:cs typeface="Calibri" panose="020F0502020204030204" pitchFamily="34" charset="0"/>
+              </a:rPr>
+              <a:t>3-3</a:t>
             </a:r>
             <a:endParaRPr lang="ko-KR" altLang="en-US" sz="2000" b="1" dirty="0">
               <a:solidFill>
@@ -29035,6 +29227,49 @@
           </a:p>
         </p:txBody>
       </p:sp>
+      <p:sp>
+        <p:nvSpPr>
+          <p:cNvPr id="5" name="Rounded Rectangle 4"/>
+          <p:cNvSpPr/>
+          <p:nvPr/>
+        </p:nvSpPr>
+        <p:spPr>
+          <a:xfrm>
+            <a:off x="856210" y="5098477"/>
+            <a:ext cx="2394065" cy="277089"/>
+          </a:xfrm>
+          <a:prstGeom prst="roundRect">
+            <a:avLst/>
+          </a:prstGeom>
+          <a:solidFill>
+            <a:srgbClr val="C00000"/>
+          </a:solidFill>
+        </p:spPr>
+        <p:style>
+          <a:lnRef idx="2">
+            <a:schemeClr val="accent1">
+              <a:shade val="50000"/>
+            </a:schemeClr>
+          </a:lnRef>
+          <a:fillRef idx="1">
+            <a:schemeClr val="accent1"/>
+          </a:fillRef>
+          <a:effectRef idx="0">
+            <a:schemeClr val="accent1"/>
+          </a:effectRef>
+          <a:fontRef idx="minor">
+            <a:schemeClr val="lt1"/>
+          </a:fontRef>
+        </p:style>
+        <p:txBody>
+          <a:bodyPr rtlCol="0" anchor="ctr"/>
+          <a:lstStyle/>
+          <a:p>
+            <a:pPr algn="ctr"/>
+            <a:endParaRPr lang="en-US"/>
+          </a:p>
+        </p:txBody>
+      </p:sp>
     </p:spTree>
     <p:extLst>
       <p:ext uri="{BB962C8B-B14F-4D97-AF65-F5344CB8AC3E}">

</xml_diff>

<commit_message>
Fixed Window scale problem and added Icon Dungeon3
Cheat code pg UP and pg DOWN
</commit_message>
<xml_diff>
--- a/Projects/SW_Design/UI/UI_design.pptx
+++ b/Projects/SW_Design/UI/UI_design.pptx
@@ -278,7 +278,7 @@
           <a:p>
             <a:fld id="{EB44E886-23E1-4ADA-9C75-D80585AEE320}" type="datetimeFigureOut">
               <a:rPr lang="ko-KR" altLang="en-US" smtClean="0"/>
-              <a:t>2019-11-26</a:t>
+              <a:t>2019-12-03</a:t>
             </a:fld>
             <a:endParaRPr lang="ko-KR" altLang="en-US"/>
           </a:p>
@@ -476,7 +476,7 @@
           <a:p>
             <a:fld id="{EB44E886-23E1-4ADA-9C75-D80585AEE320}" type="datetimeFigureOut">
               <a:rPr lang="ko-KR" altLang="en-US" smtClean="0"/>
-              <a:t>2019-11-26</a:t>
+              <a:t>2019-12-03</a:t>
             </a:fld>
             <a:endParaRPr lang="ko-KR" altLang="en-US"/>
           </a:p>
@@ -684,7 +684,7 @@
           <a:p>
             <a:fld id="{EB44E886-23E1-4ADA-9C75-D80585AEE320}" type="datetimeFigureOut">
               <a:rPr lang="ko-KR" altLang="en-US" smtClean="0"/>
-              <a:t>2019-11-26</a:t>
+              <a:t>2019-12-03</a:t>
             </a:fld>
             <a:endParaRPr lang="ko-KR" altLang="en-US"/>
           </a:p>
@@ -882,7 +882,7 @@
           <a:p>
             <a:fld id="{EB44E886-23E1-4ADA-9C75-D80585AEE320}" type="datetimeFigureOut">
               <a:rPr lang="ko-KR" altLang="en-US" smtClean="0"/>
-              <a:t>2019-11-26</a:t>
+              <a:t>2019-12-03</a:t>
             </a:fld>
             <a:endParaRPr lang="ko-KR" altLang="en-US"/>
           </a:p>
@@ -1157,7 +1157,7 @@
           <a:p>
             <a:fld id="{EB44E886-23E1-4ADA-9C75-D80585AEE320}" type="datetimeFigureOut">
               <a:rPr lang="ko-KR" altLang="en-US" smtClean="0"/>
-              <a:t>2019-11-26</a:t>
+              <a:t>2019-12-03</a:t>
             </a:fld>
             <a:endParaRPr lang="ko-KR" altLang="en-US"/>
           </a:p>
@@ -1422,7 +1422,7 @@
           <a:p>
             <a:fld id="{EB44E886-23E1-4ADA-9C75-D80585AEE320}" type="datetimeFigureOut">
               <a:rPr lang="ko-KR" altLang="en-US" smtClean="0"/>
-              <a:t>2019-11-26</a:t>
+              <a:t>2019-12-03</a:t>
             </a:fld>
             <a:endParaRPr lang="ko-KR" altLang="en-US"/>
           </a:p>
@@ -1834,7 +1834,7 @@
           <a:p>
             <a:fld id="{EB44E886-23E1-4ADA-9C75-D80585AEE320}" type="datetimeFigureOut">
               <a:rPr lang="ko-KR" altLang="en-US" smtClean="0"/>
-              <a:t>2019-11-26</a:t>
+              <a:t>2019-12-03</a:t>
             </a:fld>
             <a:endParaRPr lang="ko-KR" altLang="en-US"/>
           </a:p>
@@ -1975,7 +1975,7 @@
           <a:p>
             <a:fld id="{EB44E886-23E1-4ADA-9C75-D80585AEE320}" type="datetimeFigureOut">
               <a:rPr lang="ko-KR" altLang="en-US" smtClean="0"/>
-              <a:t>2019-11-26</a:t>
+              <a:t>2019-12-03</a:t>
             </a:fld>
             <a:endParaRPr lang="ko-KR" altLang="en-US"/>
           </a:p>
@@ -2088,7 +2088,7 @@
           <a:p>
             <a:fld id="{EB44E886-23E1-4ADA-9C75-D80585AEE320}" type="datetimeFigureOut">
               <a:rPr lang="ko-KR" altLang="en-US" smtClean="0"/>
-              <a:t>2019-11-26</a:t>
+              <a:t>2019-12-03</a:t>
             </a:fld>
             <a:endParaRPr lang="ko-KR" altLang="en-US"/>
           </a:p>
@@ -2399,7 +2399,7 @@
           <a:p>
             <a:fld id="{EB44E886-23E1-4ADA-9C75-D80585AEE320}" type="datetimeFigureOut">
               <a:rPr lang="ko-KR" altLang="en-US" smtClean="0"/>
-              <a:t>2019-11-26</a:t>
+              <a:t>2019-12-03</a:t>
             </a:fld>
             <a:endParaRPr lang="ko-KR" altLang="en-US"/>
           </a:p>
@@ -2687,7 +2687,7 @@
           <a:p>
             <a:fld id="{EB44E886-23E1-4ADA-9C75-D80585AEE320}" type="datetimeFigureOut">
               <a:rPr lang="ko-KR" altLang="en-US" smtClean="0"/>
-              <a:t>2019-11-26</a:t>
+              <a:t>2019-12-03</a:t>
             </a:fld>
             <a:endParaRPr lang="ko-KR" altLang="en-US"/>
           </a:p>
@@ -2928,7 +2928,7 @@
           <a:p>
             <a:fld id="{EB44E886-23E1-4ADA-9C75-D80585AEE320}" type="datetimeFigureOut">
               <a:rPr lang="ko-KR" altLang="en-US" smtClean="0"/>
-              <a:t>2019-11-26</a:t>
+              <a:t>2019-12-03</a:t>
             </a:fld>
             <a:endParaRPr lang="ko-KR" altLang="en-US"/>
           </a:p>
@@ -13320,19 +13320,7 @@
                 <a:latin typeface="Calibri" panose="020F0502020204030204" pitchFamily="34" charset="0"/>
                 <a:cs typeface="Calibri" panose="020F0502020204030204" pitchFamily="34" charset="0"/>
               </a:rPr>
-              <a:t>Dungeon </a:t>
-            </a:r>
-            <a:r>
-              <a:rPr lang="en-US" altLang="ko-KR" sz="2000" b="1" dirty="0" smtClean="0">
-                <a:solidFill>
-                  <a:schemeClr val="bg1">
-                    <a:lumMod val="85000"/>
-                  </a:schemeClr>
-                </a:solidFill>
-                <a:latin typeface="Calibri" panose="020F0502020204030204" pitchFamily="34" charset="0"/>
-                <a:cs typeface="Calibri" panose="020F0502020204030204" pitchFamily="34" charset="0"/>
-              </a:rPr>
-              <a:t>3-1</a:t>
+              <a:t>Dungeon 3-1</a:t>
             </a:r>
             <a:endParaRPr lang="ko-KR" altLang="en-US" sz="2000" b="1" dirty="0">
               <a:solidFill>
@@ -13384,19 +13372,7 @@
                 <a:latin typeface="Calibri" panose="020F0502020204030204" pitchFamily="34" charset="0"/>
                 <a:cs typeface="Calibri" panose="020F0502020204030204" pitchFamily="34" charset="0"/>
               </a:rPr>
-              <a:t>Dungeon </a:t>
-            </a:r>
-            <a:r>
-              <a:rPr lang="en-US" altLang="ko-KR" sz="2000" b="1" smtClean="0">
-                <a:solidFill>
-                  <a:schemeClr val="bg1">
-                    <a:lumMod val="85000"/>
-                  </a:schemeClr>
-                </a:solidFill>
-                <a:latin typeface="Calibri" panose="020F0502020204030204" pitchFamily="34" charset="0"/>
-                <a:cs typeface="Calibri" panose="020F0502020204030204" pitchFamily="34" charset="0"/>
-              </a:rPr>
-              <a:t>3-2</a:t>
+              <a:t>Dungeon 3-2</a:t>
             </a:r>
             <a:endParaRPr lang="ko-KR" altLang="en-US" sz="2000" b="1" dirty="0">
               <a:solidFill>
@@ -13448,19 +13424,7 @@
                 <a:latin typeface="Calibri" panose="020F0502020204030204" pitchFamily="34" charset="0"/>
                 <a:cs typeface="Calibri" panose="020F0502020204030204" pitchFamily="34" charset="0"/>
               </a:rPr>
-              <a:t>Dungeon </a:t>
-            </a:r>
-            <a:r>
-              <a:rPr lang="en-US" altLang="ko-KR" sz="2000" b="1" dirty="0" smtClean="0">
-                <a:solidFill>
-                  <a:schemeClr val="bg1">
-                    <a:lumMod val="85000"/>
-                  </a:schemeClr>
-                </a:solidFill>
-                <a:latin typeface="Calibri" panose="020F0502020204030204" pitchFamily="34" charset="0"/>
-                <a:cs typeface="Calibri" panose="020F0502020204030204" pitchFamily="34" charset="0"/>
-              </a:rPr>
-              <a:t>3-3</a:t>
+              <a:t>Dungeon 3-3</a:t>
             </a:r>
             <a:endParaRPr lang="ko-KR" altLang="en-US" sz="2000" b="1" dirty="0">
               <a:solidFill>
@@ -15016,6 +14980,70 @@
                 <a:cs typeface="Calibri" panose="020F0502020204030204" pitchFamily="34" charset="0"/>
               </a:rPr>
               <a:t>GEMS</a:t>
+            </a:r>
+            <a:endParaRPr lang="ko-KR" altLang="en-US" sz="2000" b="1" dirty="0">
+              <a:solidFill>
+                <a:schemeClr val="bg1">
+                  <a:lumMod val="85000"/>
+                </a:schemeClr>
+              </a:solidFill>
+              <a:latin typeface="Calibri" panose="020F0502020204030204" pitchFamily="34" charset="0"/>
+              <a:cs typeface="Calibri" panose="020F0502020204030204" pitchFamily="34" charset="0"/>
+            </a:endParaRPr>
+          </a:p>
+        </p:txBody>
+      </p:sp>
+      <p:sp>
+        <p:nvSpPr>
+          <p:cNvPr id="31" name="TextBox 30">
+            <a:extLst>
+              <a:ext uri="{FF2B5EF4-FFF2-40B4-BE49-F238E27FC236}">
+                <a16:creationId xmlns:a16="http://schemas.microsoft.com/office/drawing/2014/main" id="{D98C9B6A-888D-4F62-ACC5-210E69B867A5}"/>
+              </a:ext>
+            </a:extLst>
+          </p:cNvPr>
+          <p:cNvSpPr txBox="1"/>
+          <p:nvPr/>
+        </p:nvSpPr>
+        <p:spPr>
+          <a:xfrm>
+            <a:off x="8266872" y="4020503"/>
+            <a:ext cx="1494768" cy="400110"/>
+          </a:xfrm>
+          <a:prstGeom prst="rect">
+            <a:avLst/>
+          </a:prstGeom>
+          <a:noFill/>
+        </p:spPr>
+        <p:txBody>
+          <a:bodyPr wrap="none" rtlCol="0">
+            <a:spAutoFit/>
+          </a:bodyPr>
+          <a:lstStyle/>
+          <a:p>
+            <a:r>
+              <a:rPr lang="en-US" altLang="ko-KR" sz="2000" b="1" dirty="0">
+                <a:solidFill>
+                  <a:schemeClr val="bg1">
+                    <a:lumMod val="85000"/>
+                  </a:schemeClr>
+                </a:solidFill>
+                <a:latin typeface="Calibri" panose="020F0502020204030204" pitchFamily="34" charset="0"/>
+                <a:cs typeface="Calibri" panose="020F0502020204030204" pitchFamily="34" charset="0"/>
+              </a:rPr>
+              <a:t>DUNGEON </a:t>
+            </a:r>
+            <a:r>
+              <a:rPr lang="en-US" altLang="ko-KR" sz="2000" b="1" dirty="0" smtClean="0">
+                <a:solidFill>
+                  <a:schemeClr val="bg1">
+                    <a:lumMod val="85000"/>
+                  </a:schemeClr>
+                </a:solidFill>
+                <a:latin typeface="Calibri" panose="020F0502020204030204" pitchFamily="34" charset="0"/>
+                <a:cs typeface="Calibri" panose="020F0502020204030204" pitchFamily="34" charset="0"/>
+              </a:rPr>
+              <a:t>3</a:t>
             </a:r>
             <a:endParaRPr lang="ko-KR" altLang="en-US" sz="2000" b="1" dirty="0">
               <a:solidFill>

</xml_diff>